<commit_message>
Added my current attempt to solve for linearization conditions. New Function (trimCondFinderwithAssu) assumes all 12 states are known based on quasistatic model. A dummy model (dummyModelForFindingDeflections) was also created to try to find ctrl surf defls based on calculated states
</commit_message>
<xml_diff>
--- a/rappStuff/rappLinearizedEquations.pptx
+++ b/rappStuff/rappLinearizedEquations.pptx
@@ -12,6 +12,7 @@
     <p:sldId id="260" r:id="rId6"/>
     <p:sldId id="261" r:id="rId7"/>
     <p:sldId id="262" r:id="rId8"/>
+    <p:sldId id="263" r:id="rId9"/>
   </p:sldIdLst>
   <p:sldSz cx="12192000" cy="6858000"/>
   <p:notesSz cx="6858000" cy="9144000"/>
@@ -110,7 +111,103 @@
       </a:defRPr>
     </a:lvl9pPr>
   </p:defaultTextStyle>
+  <p:extLst>
+    <p:ext uri="{EFAFB233-063F-42B5-8137-9DF3F51BA10A}">
+      <p15:sldGuideLst xmlns:p15="http://schemas.microsoft.com/office/powerpoint/2012/main"/>
+    </p:ext>
+  </p:extLst>
 </p:presentation>
+</file>
+
+<file path=ppt/revisionInfo.xml><?xml version="1.0" encoding="utf-8"?>
+<p1510:revInfo xmlns:a="http://schemas.openxmlformats.org/drawingml/2006/main" xmlns:r="http://schemas.openxmlformats.org/officeDocument/2006/relationships" xmlns:p1510="http://schemas.microsoft.com/office/powerpoint/2015/10/main">
+  <p1510:revLst>
+    <p1510:client id="{FBA49C5B-85D7-4182-BFBB-632C38800DBC}" v="22" dt="2022-10-11T14:41:25.857"/>
+  </p1510:revLst>
+</p1510:revInfo>
+</file>
+
+<file path=ppt/changesInfos/changesInfo1.xml><?xml version="1.0" encoding="utf-8"?>
+<pc:chgInfo xmlns:a="http://schemas.openxmlformats.org/drawingml/2006/main" xmlns:r="http://schemas.openxmlformats.org/officeDocument/2006/relationships" xmlns:ac="http://schemas.microsoft.com/office/drawing/2013/main/command" xmlns:pc="http://schemas.microsoft.com/office/powerpoint/2013/main/command">
+  <pc:docChgLst>
+    <pc:chgData name="Jacob Fine" userId="01647bc0d57d62c9" providerId="LiveId" clId="{FBA49C5B-85D7-4182-BFBB-632C38800DBC}"/>
+    <pc:docChg chg="undo redo custSel addSld delSld modSld">
+      <pc:chgData name="Jacob Fine" userId="01647bc0d57d62c9" providerId="LiveId" clId="{FBA49C5B-85D7-4182-BFBB-632C38800DBC}" dt="2022-10-11T14:41:26.913" v="47" actId="27636"/>
+      <pc:docMkLst>
+        <pc:docMk/>
+      </pc:docMkLst>
+      <pc:sldChg chg="addSp delSp modSp mod">
+        <pc:chgData name="Jacob Fine" userId="01647bc0d57d62c9" providerId="LiveId" clId="{FBA49C5B-85D7-4182-BFBB-632C38800DBC}" dt="2022-10-11T14:40:11.880" v="23" actId="6549"/>
+        <pc:sldMkLst>
+          <pc:docMk/>
+          <pc:sldMk cId="4212465254" sldId="258"/>
+        </pc:sldMkLst>
+        <pc:spChg chg="mod">
+          <ac:chgData name="Jacob Fine" userId="01647bc0d57d62c9" providerId="LiveId" clId="{FBA49C5B-85D7-4182-BFBB-632C38800DBC}" dt="2022-10-11T14:40:11.880" v="23" actId="6549"/>
+          <ac:spMkLst>
+            <pc:docMk/>
+            <pc:sldMk cId="4212465254" sldId="258"/>
+            <ac:spMk id="3" creationId="{00000000-0000-0000-0000-000000000000}"/>
+          </ac:spMkLst>
+        </pc:spChg>
+        <pc:spChg chg="add del mod">
+          <ac:chgData name="Jacob Fine" userId="01647bc0d57d62c9" providerId="LiveId" clId="{FBA49C5B-85D7-4182-BFBB-632C38800DBC}" dt="2022-10-11T14:40:04.014" v="20"/>
+          <ac:spMkLst>
+            <pc:docMk/>
+            <pc:sldMk cId="4212465254" sldId="258"/>
+            <ac:spMk id="4" creationId="{5A9B640D-C6FE-76C9-36F8-AF0061DBC8CA}"/>
+          </ac:spMkLst>
+        </pc:spChg>
+      </pc:sldChg>
+      <pc:sldChg chg="modSp mod">
+        <pc:chgData name="Jacob Fine" userId="01647bc0d57d62c9" providerId="LiveId" clId="{FBA49C5B-85D7-4182-BFBB-632C38800DBC}" dt="2022-10-11T14:40:13.494" v="24" actId="14100"/>
+        <pc:sldMkLst>
+          <pc:docMk/>
+          <pc:sldMk cId="3010916531" sldId="260"/>
+        </pc:sldMkLst>
+        <pc:spChg chg="mod">
+          <ac:chgData name="Jacob Fine" userId="01647bc0d57d62c9" providerId="LiveId" clId="{FBA49C5B-85D7-4182-BFBB-632C38800DBC}" dt="2022-10-11T14:40:13.494" v="24" actId="14100"/>
+          <ac:spMkLst>
+            <pc:docMk/>
+            <pc:sldMk cId="3010916531" sldId="260"/>
+            <ac:spMk id="3" creationId="{00000000-0000-0000-0000-000000000000}"/>
+          </ac:spMkLst>
+        </pc:spChg>
+      </pc:sldChg>
+      <pc:sldChg chg="addSp delSp modSp new add del mod">
+        <pc:chgData name="Jacob Fine" userId="01647bc0d57d62c9" providerId="LiveId" clId="{FBA49C5B-85D7-4182-BFBB-632C38800DBC}" dt="2022-10-11T14:41:26.913" v="47" actId="27636"/>
+        <pc:sldMkLst>
+          <pc:docMk/>
+          <pc:sldMk cId="736599594" sldId="263"/>
+        </pc:sldMkLst>
+        <pc:spChg chg="add del">
+          <ac:chgData name="Jacob Fine" userId="01647bc0d57d62c9" providerId="LiveId" clId="{FBA49C5B-85D7-4182-BFBB-632C38800DBC}" dt="2022-10-11T14:40:21.901" v="29" actId="478"/>
+          <ac:spMkLst>
+            <pc:docMk/>
+            <pc:sldMk cId="736599594" sldId="263"/>
+            <ac:spMk id="2" creationId="{EB67F3B9-A9B5-5A78-4B1F-EA2FA1869026}"/>
+          </ac:spMkLst>
+        </pc:spChg>
+        <pc:spChg chg="add del mod">
+          <ac:chgData name="Jacob Fine" userId="01647bc0d57d62c9" providerId="LiveId" clId="{FBA49C5B-85D7-4182-BFBB-632C38800DBC}" dt="2022-10-11T14:41:26.913" v="47" actId="27636"/>
+          <ac:spMkLst>
+            <pc:docMk/>
+            <pc:sldMk cId="736599594" sldId="263"/>
+            <ac:spMk id="3" creationId="{296B5D46-5A79-EB7D-76A6-0AAD08B77740}"/>
+          </ac:spMkLst>
+        </pc:spChg>
+        <pc:spChg chg="add del mod">
+          <ac:chgData name="Jacob Fine" userId="01647bc0d57d62c9" providerId="LiveId" clId="{FBA49C5B-85D7-4182-BFBB-632C38800DBC}" dt="2022-10-11T14:40:21.459" v="28"/>
+          <ac:spMkLst>
+            <pc:docMk/>
+            <pc:sldMk cId="736599594" sldId="263"/>
+            <ac:spMk id="4" creationId="{CF03559C-43D2-132A-7835-6565FEB48B87}"/>
+          </ac:spMkLst>
+        </pc:spChg>
+      </pc:sldChg>
+    </pc:docChg>
+  </pc:docChgLst>
+</pc:chgInfo>
 </file>
 
 <file path=ppt/slideLayouts/slideLayout1.xml><?xml version="1.0" encoding="utf-8"?>
@@ -155,10 +252,9 @@
           </a:lstStyle>
           <a:p>
             <a:r>
-              <a:rPr lang="en-US" smtClean="0"/>
+              <a:rPr lang="en-US"/>
               <a:t>Click to edit Master title style</a:t>
             </a:r>
-            <a:endParaRPr lang="en-US"/>
           </a:p>
         </p:txBody>
       </p:sp>
@@ -220,10 +316,9 @@
           </a:lstStyle>
           <a:p>
             <a:r>
-              <a:rPr lang="en-US" smtClean="0"/>
+              <a:rPr lang="en-US"/>
               <a:t>Click to edit Master subtitle style</a:t>
             </a:r>
-            <a:endParaRPr lang="en-US"/>
           </a:p>
         </p:txBody>
       </p:sp>
@@ -244,7 +339,7 @@
           <a:p>
             <a:fld id="{9A70D4AC-E78A-491F-8F71-1DF07F826345}" type="datetimeFigureOut">
               <a:rPr lang="en-US" smtClean="0"/>
-              <a:t>10/5/2022</a:t>
+              <a:t>10/10/2022</a:t>
             </a:fld>
             <a:endParaRPr lang="en-US"/>
           </a:p>
@@ -338,10 +433,9 @@
           <a:lstStyle/>
           <a:p>
             <a:r>
-              <a:rPr lang="en-US" smtClean="0"/>
+              <a:rPr lang="en-US"/>
               <a:t>Click to edit Master title style</a:t>
             </a:r>
-            <a:endParaRPr lang="en-US"/>
           </a:p>
         </p:txBody>
       </p:sp>
@@ -362,38 +456,37 @@
           <a:p>
             <a:pPr lvl="0"/>
             <a:r>
-              <a:rPr lang="en-US" smtClean="0"/>
+              <a:rPr lang="en-US"/>
               <a:t>Edit Master text styles</a:t>
             </a:r>
           </a:p>
           <a:p>
             <a:pPr lvl="1"/>
             <a:r>
-              <a:rPr lang="en-US" smtClean="0"/>
+              <a:rPr lang="en-US"/>
               <a:t>Second level</a:t>
             </a:r>
           </a:p>
           <a:p>
             <a:pPr lvl="2"/>
             <a:r>
-              <a:rPr lang="en-US" smtClean="0"/>
+              <a:rPr lang="en-US"/>
               <a:t>Third level</a:t>
             </a:r>
           </a:p>
           <a:p>
             <a:pPr lvl="3"/>
             <a:r>
-              <a:rPr lang="en-US" smtClean="0"/>
+              <a:rPr lang="en-US"/>
               <a:t>Fourth level</a:t>
             </a:r>
           </a:p>
           <a:p>
             <a:pPr lvl="4"/>
             <a:r>
-              <a:rPr lang="en-US" smtClean="0"/>
+              <a:rPr lang="en-US"/>
               <a:t>Fifth level</a:t>
             </a:r>
-            <a:endParaRPr lang="en-US"/>
           </a:p>
         </p:txBody>
       </p:sp>
@@ -414,7 +507,7 @@
           <a:p>
             <a:fld id="{9A70D4AC-E78A-491F-8F71-1DF07F826345}" type="datetimeFigureOut">
               <a:rPr lang="en-US" smtClean="0"/>
-              <a:t>10/5/2022</a:t>
+              <a:t>10/10/2022</a:t>
             </a:fld>
             <a:endParaRPr lang="en-US"/>
           </a:p>
@@ -513,10 +606,9 @@
           <a:lstStyle/>
           <a:p>
             <a:r>
-              <a:rPr lang="en-US" smtClean="0"/>
+              <a:rPr lang="en-US"/>
               <a:t>Click to edit Master title style</a:t>
             </a:r>
-            <a:endParaRPr lang="en-US"/>
           </a:p>
         </p:txBody>
       </p:sp>
@@ -542,38 +634,37 @@
           <a:p>
             <a:pPr lvl="0"/>
             <a:r>
-              <a:rPr lang="en-US" smtClean="0"/>
+              <a:rPr lang="en-US"/>
               <a:t>Edit Master text styles</a:t>
             </a:r>
           </a:p>
           <a:p>
             <a:pPr lvl="1"/>
             <a:r>
-              <a:rPr lang="en-US" smtClean="0"/>
+              <a:rPr lang="en-US"/>
               <a:t>Second level</a:t>
             </a:r>
           </a:p>
           <a:p>
             <a:pPr lvl="2"/>
             <a:r>
-              <a:rPr lang="en-US" smtClean="0"/>
+              <a:rPr lang="en-US"/>
               <a:t>Third level</a:t>
             </a:r>
           </a:p>
           <a:p>
             <a:pPr lvl="3"/>
             <a:r>
-              <a:rPr lang="en-US" smtClean="0"/>
+              <a:rPr lang="en-US"/>
               <a:t>Fourth level</a:t>
             </a:r>
           </a:p>
           <a:p>
             <a:pPr lvl="4"/>
             <a:r>
-              <a:rPr lang="en-US" smtClean="0"/>
+              <a:rPr lang="en-US"/>
               <a:t>Fifth level</a:t>
             </a:r>
-            <a:endParaRPr lang="en-US"/>
           </a:p>
         </p:txBody>
       </p:sp>
@@ -594,7 +685,7 @@
           <a:p>
             <a:fld id="{9A70D4AC-E78A-491F-8F71-1DF07F826345}" type="datetimeFigureOut">
               <a:rPr lang="en-US" smtClean="0"/>
-              <a:t>10/5/2022</a:t>
+              <a:t>10/10/2022</a:t>
             </a:fld>
             <a:endParaRPr lang="en-US"/>
           </a:p>
@@ -688,10 +779,9 @@
           <a:lstStyle/>
           <a:p>
             <a:r>
-              <a:rPr lang="en-US" smtClean="0"/>
+              <a:rPr lang="en-US"/>
               <a:t>Click to edit Master title style</a:t>
             </a:r>
-            <a:endParaRPr lang="en-US"/>
           </a:p>
         </p:txBody>
       </p:sp>
@@ -712,38 +802,37 @@
           <a:p>
             <a:pPr lvl="0"/>
             <a:r>
-              <a:rPr lang="en-US" smtClean="0"/>
+              <a:rPr lang="en-US"/>
               <a:t>Edit Master text styles</a:t>
             </a:r>
           </a:p>
           <a:p>
             <a:pPr lvl="1"/>
             <a:r>
-              <a:rPr lang="en-US" smtClean="0"/>
+              <a:rPr lang="en-US"/>
               <a:t>Second level</a:t>
             </a:r>
           </a:p>
           <a:p>
             <a:pPr lvl="2"/>
             <a:r>
-              <a:rPr lang="en-US" smtClean="0"/>
+              <a:rPr lang="en-US"/>
               <a:t>Third level</a:t>
             </a:r>
           </a:p>
           <a:p>
             <a:pPr lvl="3"/>
             <a:r>
-              <a:rPr lang="en-US" smtClean="0"/>
+              <a:rPr lang="en-US"/>
               <a:t>Fourth level</a:t>
             </a:r>
           </a:p>
           <a:p>
             <a:pPr lvl="4"/>
             <a:r>
-              <a:rPr lang="en-US" smtClean="0"/>
+              <a:rPr lang="en-US"/>
               <a:t>Fifth level</a:t>
             </a:r>
-            <a:endParaRPr lang="en-US"/>
           </a:p>
         </p:txBody>
       </p:sp>
@@ -764,7 +853,7 @@
           <a:p>
             <a:fld id="{9A70D4AC-E78A-491F-8F71-1DF07F826345}" type="datetimeFigureOut">
               <a:rPr lang="en-US" smtClean="0"/>
-              <a:t>10/5/2022</a:t>
+              <a:t>10/10/2022</a:t>
             </a:fld>
             <a:endParaRPr lang="en-US"/>
           </a:p>
@@ -867,10 +956,9 @@
           </a:lstStyle>
           <a:p>
             <a:r>
-              <a:rPr lang="en-US" smtClean="0"/>
+              <a:rPr lang="en-US"/>
               <a:t>Click to edit Master title style</a:t>
             </a:r>
-            <a:endParaRPr lang="en-US"/>
           </a:p>
         </p:txBody>
       </p:sp>
@@ -987,7 +1075,7 @@
           <a:p>
             <a:pPr lvl="0"/>
             <a:r>
-              <a:rPr lang="en-US" smtClean="0"/>
+              <a:rPr lang="en-US"/>
               <a:t>Edit Master text styles</a:t>
             </a:r>
           </a:p>
@@ -1010,7 +1098,7 @@
           <a:p>
             <a:fld id="{9A70D4AC-E78A-491F-8F71-1DF07F826345}" type="datetimeFigureOut">
               <a:rPr lang="en-US" smtClean="0"/>
-              <a:t>10/5/2022</a:t>
+              <a:t>10/10/2022</a:t>
             </a:fld>
             <a:endParaRPr lang="en-US"/>
           </a:p>
@@ -1104,10 +1192,9 @@
           <a:lstStyle/>
           <a:p>
             <a:r>
-              <a:rPr lang="en-US" smtClean="0"/>
+              <a:rPr lang="en-US"/>
               <a:t>Click to edit Master title style</a:t>
             </a:r>
-            <a:endParaRPr lang="en-US"/>
           </a:p>
         </p:txBody>
       </p:sp>
@@ -1133,38 +1220,37 @@
           <a:p>
             <a:pPr lvl="0"/>
             <a:r>
-              <a:rPr lang="en-US" smtClean="0"/>
+              <a:rPr lang="en-US"/>
               <a:t>Edit Master text styles</a:t>
             </a:r>
           </a:p>
           <a:p>
             <a:pPr lvl="1"/>
             <a:r>
-              <a:rPr lang="en-US" smtClean="0"/>
+              <a:rPr lang="en-US"/>
               <a:t>Second level</a:t>
             </a:r>
           </a:p>
           <a:p>
             <a:pPr lvl="2"/>
             <a:r>
-              <a:rPr lang="en-US" smtClean="0"/>
+              <a:rPr lang="en-US"/>
               <a:t>Third level</a:t>
             </a:r>
           </a:p>
           <a:p>
             <a:pPr lvl="3"/>
             <a:r>
-              <a:rPr lang="en-US" smtClean="0"/>
+              <a:rPr lang="en-US"/>
               <a:t>Fourth level</a:t>
             </a:r>
           </a:p>
           <a:p>
             <a:pPr lvl="4"/>
             <a:r>
-              <a:rPr lang="en-US" smtClean="0"/>
+              <a:rPr lang="en-US"/>
               <a:t>Fifth level</a:t>
             </a:r>
-            <a:endParaRPr lang="en-US"/>
           </a:p>
         </p:txBody>
       </p:sp>
@@ -1190,38 +1276,37 @@
           <a:p>
             <a:pPr lvl="0"/>
             <a:r>
-              <a:rPr lang="en-US" smtClean="0"/>
+              <a:rPr lang="en-US"/>
               <a:t>Edit Master text styles</a:t>
             </a:r>
           </a:p>
           <a:p>
             <a:pPr lvl="1"/>
             <a:r>
-              <a:rPr lang="en-US" smtClean="0"/>
+              <a:rPr lang="en-US"/>
               <a:t>Second level</a:t>
             </a:r>
           </a:p>
           <a:p>
             <a:pPr lvl="2"/>
             <a:r>
-              <a:rPr lang="en-US" smtClean="0"/>
+              <a:rPr lang="en-US"/>
               <a:t>Third level</a:t>
             </a:r>
           </a:p>
           <a:p>
             <a:pPr lvl="3"/>
             <a:r>
-              <a:rPr lang="en-US" smtClean="0"/>
+              <a:rPr lang="en-US"/>
               <a:t>Fourth level</a:t>
             </a:r>
           </a:p>
           <a:p>
             <a:pPr lvl="4"/>
             <a:r>
-              <a:rPr lang="en-US" smtClean="0"/>
+              <a:rPr lang="en-US"/>
               <a:t>Fifth level</a:t>
             </a:r>
-            <a:endParaRPr lang="en-US"/>
           </a:p>
         </p:txBody>
       </p:sp>
@@ -1242,7 +1327,7 @@
           <a:p>
             <a:fld id="{9A70D4AC-E78A-491F-8F71-1DF07F826345}" type="datetimeFigureOut">
               <a:rPr lang="en-US" smtClean="0"/>
-              <a:t>10/5/2022</a:t>
+              <a:t>10/10/2022</a:t>
             </a:fld>
             <a:endParaRPr lang="en-US"/>
           </a:p>
@@ -1341,10 +1426,9 @@
           <a:lstStyle/>
           <a:p>
             <a:r>
-              <a:rPr lang="en-US" smtClean="0"/>
+              <a:rPr lang="en-US"/>
               <a:t>Click to edit Master title style</a:t>
             </a:r>
-            <a:endParaRPr lang="en-US"/>
           </a:p>
         </p:txBody>
       </p:sp>
@@ -1407,7 +1491,7 @@
           <a:p>
             <a:pPr lvl="0"/>
             <a:r>
-              <a:rPr lang="en-US" smtClean="0"/>
+              <a:rPr lang="en-US"/>
               <a:t>Edit Master text styles</a:t>
             </a:r>
           </a:p>
@@ -1435,38 +1519,37 @@
           <a:p>
             <a:pPr lvl="0"/>
             <a:r>
-              <a:rPr lang="en-US" smtClean="0"/>
+              <a:rPr lang="en-US"/>
               <a:t>Edit Master text styles</a:t>
             </a:r>
           </a:p>
           <a:p>
             <a:pPr lvl="1"/>
             <a:r>
-              <a:rPr lang="en-US" smtClean="0"/>
+              <a:rPr lang="en-US"/>
               <a:t>Second level</a:t>
             </a:r>
           </a:p>
           <a:p>
             <a:pPr lvl="2"/>
             <a:r>
-              <a:rPr lang="en-US" smtClean="0"/>
+              <a:rPr lang="en-US"/>
               <a:t>Third level</a:t>
             </a:r>
           </a:p>
           <a:p>
             <a:pPr lvl="3"/>
             <a:r>
-              <a:rPr lang="en-US" smtClean="0"/>
+              <a:rPr lang="en-US"/>
               <a:t>Fourth level</a:t>
             </a:r>
           </a:p>
           <a:p>
             <a:pPr lvl="4"/>
             <a:r>
-              <a:rPr lang="en-US" smtClean="0"/>
+              <a:rPr lang="en-US"/>
               <a:t>Fifth level</a:t>
             </a:r>
-            <a:endParaRPr lang="en-US"/>
           </a:p>
         </p:txBody>
       </p:sp>
@@ -1529,7 +1612,7 @@
           <a:p>
             <a:pPr lvl="0"/>
             <a:r>
-              <a:rPr lang="en-US" smtClean="0"/>
+              <a:rPr lang="en-US"/>
               <a:t>Edit Master text styles</a:t>
             </a:r>
           </a:p>
@@ -1557,38 +1640,37 @@
           <a:p>
             <a:pPr lvl="0"/>
             <a:r>
-              <a:rPr lang="en-US" smtClean="0"/>
+              <a:rPr lang="en-US"/>
               <a:t>Edit Master text styles</a:t>
             </a:r>
           </a:p>
           <a:p>
             <a:pPr lvl="1"/>
             <a:r>
-              <a:rPr lang="en-US" smtClean="0"/>
+              <a:rPr lang="en-US"/>
               <a:t>Second level</a:t>
             </a:r>
           </a:p>
           <a:p>
             <a:pPr lvl="2"/>
             <a:r>
-              <a:rPr lang="en-US" smtClean="0"/>
+              <a:rPr lang="en-US"/>
               <a:t>Third level</a:t>
             </a:r>
           </a:p>
           <a:p>
             <a:pPr lvl="3"/>
             <a:r>
-              <a:rPr lang="en-US" smtClean="0"/>
+              <a:rPr lang="en-US"/>
               <a:t>Fourth level</a:t>
             </a:r>
           </a:p>
           <a:p>
             <a:pPr lvl="4"/>
             <a:r>
-              <a:rPr lang="en-US" smtClean="0"/>
+              <a:rPr lang="en-US"/>
               <a:t>Fifth level</a:t>
             </a:r>
-            <a:endParaRPr lang="en-US"/>
           </a:p>
         </p:txBody>
       </p:sp>
@@ -1609,7 +1691,7 @@
           <a:p>
             <a:fld id="{9A70D4AC-E78A-491F-8F71-1DF07F826345}" type="datetimeFigureOut">
               <a:rPr lang="en-US" smtClean="0"/>
-              <a:t>10/5/2022</a:t>
+              <a:t>10/10/2022</a:t>
             </a:fld>
             <a:endParaRPr lang="en-US"/>
           </a:p>
@@ -1703,10 +1785,9 @@
           <a:lstStyle/>
           <a:p>
             <a:r>
-              <a:rPr lang="en-US" smtClean="0"/>
+              <a:rPr lang="en-US"/>
               <a:t>Click to edit Master title style</a:t>
             </a:r>
-            <a:endParaRPr lang="en-US"/>
           </a:p>
         </p:txBody>
       </p:sp>
@@ -1727,7 +1808,7 @@
           <a:p>
             <a:fld id="{9A70D4AC-E78A-491F-8F71-1DF07F826345}" type="datetimeFigureOut">
               <a:rPr lang="en-US" smtClean="0"/>
-              <a:t>10/5/2022</a:t>
+              <a:t>10/10/2022</a:t>
             </a:fld>
             <a:endParaRPr lang="en-US"/>
           </a:p>
@@ -1822,7 +1903,7 @@
           <a:p>
             <a:fld id="{9A70D4AC-E78A-491F-8F71-1DF07F826345}" type="datetimeFigureOut">
               <a:rPr lang="en-US" smtClean="0"/>
-              <a:t>10/5/2022</a:t>
+              <a:t>10/10/2022</a:t>
             </a:fld>
             <a:endParaRPr lang="en-US"/>
           </a:p>
@@ -1925,10 +2006,9 @@
           </a:lstStyle>
           <a:p>
             <a:r>
-              <a:rPr lang="en-US" smtClean="0"/>
+              <a:rPr lang="en-US"/>
               <a:t>Click to edit Master title style</a:t>
             </a:r>
-            <a:endParaRPr lang="en-US"/>
           </a:p>
         </p:txBody>
       </p:sp>
@@ -1982,38 +2062,37 @@
           <a:p>
             <a:pPr lvl="0"/>
             <a:r>
-              <a:rPr lang="en-US" smtClean="0"/>
+              <a:rPr lang="en-US"/>
               <a:t>Edit Master text styles</a:t>
             </a:r>
           </a:p>
           <a:p>
             <a:pPr lvl="1"/>
             <a:r>
-              <a:rPr lang="en-US" smtClean="0"/>
+              <a:rPr lang="en-US"/>
               <a:t>Second level</a:t>
             </a:r>
           </a:p>
           <a:p>
             <a:pPr lvl="2"/>
             <a:r>
-              <a:rPr lang="en-US" smtClean="0"/>
+              <a:rPr lang="en-US"/>
               <a:t>Third level</a:t>
             </a:r>
           </a:p>
           <a:p>
             <a:pPr lvl="3"/>
             <a:r>
-              <a:rPr lang="en-US" smtClean="0"/>
+              <a:rPr lang="en-US"/>
               <a:t>Fourth level</a:t>
             </a:r>
           </a:p>
           <a:p>
             <a:pPr lvl="4"/>
             <a:r>
-              <a:rPr lang="en-US" smtClean="0"/>
+              <a:rPr lang="en-US"/>
               <a:t>Fifth level</a:t>
             </a:r>
-            <a:endParaRPr lang="en-US"/>
           </a:p>
         </p:txBody>
       </p:sp>
@@ -2076,7 +2155,7 @@
           <a:p>
             <a:pPr lvl="0"/>
             <a:r>
-              <a:rPr lang="en-US" smtClean="0"/>
+              <a:rPr lang="en-US"/>
               <a:t>Edit Master text styles</a:t>
             </a:r>
           </a:p>
@@ -2099,7 +2178,7 @@
           <a:p>
             <a:fld id="{9A70D4AC-E78A-491F-8F71-1DF07F826345}" type="datetimeFigureOut">
               <a:rPr lang="en-US" smtClean="0"/>
-              <a:t>10/5/2022</a:t>
+              <a:t>10/10/2022</a:t>
             </a:fld>
             <a:endParaRPr lang="en-US"/>
           </a:p>
@@ -2202,10 +2281,9 @@
           </a:lstStyle>
           <a:p>
             <a:r>
-              <a:rPr lang="en-US" smtClean="0"/>
+              <a:rPr lang="en-US"/>
               <a:t>Click to edit Master title style</a:t>
             </a:r>
-            <a:endParaRPr lang="en-US"/>
           </a:p>
         </p:txBody>
       </p:sp>
@@ -2329,7 +2407,7 @@
           <a:p>
             <a:pPr lvl="0"/>
             <a:r>
-              <a:rPr lang="en-US" smtClean="0"/>
+              <a:rPr lang="en-US"/>
               <a:t>Edit Master text styles</a:t>
             </a:r>
           </a:p>
@@ -2352,7 +2430,7 @@
           <a:p>
             <a:fld id="{9A70D4AC-E78A-491F-8F71-1DF07F826345}" type="datetimeFigureOut">
               <a:rPr lang="en-US" smtClean="0"/>
-              <a:t>10/5/2022</a:t>
+              <a:t>10/10/2022</a:t>
             </a:fld>
             <a:endParaRPr lang="en-US"/>
           </a:p>
@@ -2461,10 +2539,9 @@
           <a:lstStyle/>
           <a:p>
             <a:r>
-              <a:rPr lang="en-US" smtClean="0"/>
+              <a:rPr lang="en-US"/>
               <a:t>Click to edit Master title style</a:t>
             </a:r>
-            <a:endParaRPr lang="en-US"/>
           </a:p>
         </p:txBody>
       </p:sp>
@@ -2495,38 +2572,37 @@
           <a:p>
             <a:pPr lvl="0"/>
             <a:r>
-              <a:rPr lang="en-US" smtClean="0"/>
+              <a:rPr lang="en-US"/>
               <a:t>Edit Master text styles</a:t>
             </a:r>
           </a:p>
           <a:p>
             <a:pPr lvl="1"/>
             <a:r>
-              <a:rPr lang="en-US" smtClean="0"/>
+              <a:rPr lang="en-US"/>
               <a:t>Second level</a:t>
             </a:r>
           </a:p>
           <a:p>
             <a:pPr lvl="2"/>
             <a:r>
-              <a:rPr lang="en-US" smtClean="0"/>
+              <a:rPr lang="en-US"/>
               <a:t>Third level</a:t>
             </a:r>
           </a:p>
           <a:p>
             <a:pPr lvl="3"/>
             <a:r>
-              <a:rPr lang="en-US" smtClean="0"/>
+              <a:rPr lang="en-US"/>
               <a:t>Fourth level</a:t>
             </a:r>
           </a:p>
           <a:p>
             <a:pPr lvl="4"/>
             <a:r>
-              <a:rPr lang="en-US" smtClean="0"/>
+              <a:rPr lang="en-US"/>
               <a:t>Fifth level</a:t>
             </a:r>
-            <a:endParaRPr lang="en-US"/>
           </a:p>
         </p:txBody>
       </p:sp>
@@ -2565,7 +2641,7 @@
           <a:p>
             <a:fld id="{9A70D4AC-E78A-491F-8F71-1DF07F826345}" type="datetimeFigureOut">
               <a:rPr lang="en-US" smtClean="0"/>
-              <a:t>10/5/2022</a:t>
+              <a:t>10/10/2022</a:t>
             </a:fld>
             <a:endParaRPr lang="en-US"/>
           </a:p>
@@ -2986,10 +3062,9 @@
           <a:lstStyle/>
           <a:p>
             <a:r>
-              <a:rPr lang="en-US" dirty="0" smtClean="0"/>
+              <a:rPr lang="en-US" dirty="0"/>
               <a:t>Rapp Linearized Equations</a:t>
             </a:r>
-            <a:endParaRPr lang="en-US" dirty="0"/>
           </a:p>
         </p:txBody>
       </p:sp>
@@ -3058,10 +3133,9 @@
           <a:lstStyle/>
           <a:p>
             <a:r>
-              <a:rPr lang="en-US" dirty="0" smtClean="0"/>
+              <a:rPr lang="en-US" dirty="0"/>
               <a:t>Rotations</a:t>
             </a:r>
-            <a:endParaRPr lang="en-US" dirty="0"/>
           </a:p>
         </p:txBody>
       </p:sp>
@@ -3081,25 +3155,25 @@
           <a:lstStyle/>
           <a:p>
             <a:r>
-              <a:rPr lang="en-US" dirty="0" smtClean="0"/>
+              <a:rPr lang="en-US" dirty="0"/>
               <a:t>Ground to Body</a:t>
             </a:r>
           </a:p>
           <a:p>
             <a:r>
-              <a:rPr lang="en-US" dirty="0" smtClean="0"/>
+              <a:rPr lang="en-US" dirty="0"/>
               <a:t>Body to Aerodynamic</a:t>
             </a:r>
           </a:p>
           <a:p>
             <a:r>
-              <a:rPr lang="en-US" dirty="0" smtClean="0"/>
+              <a:rPr lang="en-US" dirty="0"/>
               <a:t>Body to tangent</a:t>
             </a:r>
           </a:p>
           <a:p>
             <a:r>
-              <a:rPr lang="en-US" dirty="0" smtClean="0"/>
+              <a:rPr lang="en-US" dirty="0"/>
               <a:t>Wind to tangent</a:t>
             </a:r>
           </a:p>
@@ -3250,15 +3324,14 @@
           <a:lstStyle/>
           <a:p>
             <a:r>
-              <a:rPr lang="en-US" dirty="0" smtClean="0"/>
+              <a:rPr lang="en-US" dirty="0"/>
               <a:t>Other definitions</a:t>
             </a:r>
-            <a:endParaRPr lang="en-US" dirty="0"/>
           </a:p>
         </p:txBody>
       </p:sp>
-      <mc:AlternateContent xmlns:mc="http://schemas.openxmlformats.org/markup-compatibility/2006">
-        <mc:Choice xmlns:a14="http://schemas.microsoft.com/office/drawing/2010/main" Requires="a14">
+      <mc:AlternateContent xmlns:mc="http://schemas.openxmlformats.org/markup-compatibility/2006" xmlns:a14="http://schemas.microsoft.com/office/drawing/2010/main">
+        <mc:Choice Requires="a14">
           <p:sp>
             <p:nvSpPr>
               <p:cNvPr id="3" name="Content Placeholder 2"/>
@@ -3344,7 +3417,7 @@
                   </m:oMath>
                 </a14:m>
                 <a:r>
-                  <a:rPr lang="en-US" dirty="0" smtClean="0"/>
+                  <a:rPr lang="en-US" dirty="0"/>
                   <a:t>= </a:t>
                 </a:r>
                 <a14:m>
@@ -3408,7 +3481,7 @@
                     </m:sSub>
                   </m:oMath>
                 </a14:m>
-                <a:endParaRPr lang="en-US" dirty="0" smtClean="0"/>
+                <a:endParaRPr lang="en-US" dirty="0"/>
               </a:p>
               <a:p>
                 <a14:m>
@@ -3484,15 +3557,14 @@
                   </m:oMath>
                 </a14:m>
                 <a:r>
-                  <a:rPr lang="en-US" dirty="0" smtClean="0"/>
+                  <a:rPr lang="en-US" dirty="0"/>
                   <a:t>= longitude, latitude, and radial position</a:t>
                 </a:r>
-                <a:endParaRPr lang="en-US" dirty="0"/>
               </a:p>
             </p:txBody>
           </p:sp>
         </mc:Choice>
-        <mc:Fallback>
+        <mc:Fallback xmlns="">
           <p:sp>
             <p:nvSpPr>
               <p:cNvPr id="3" name="Content Placeholder 2"/>
@@ -3572,10 +3644,9 @@
           <a:lstStyle/>
           <a:p>
             <a:r>
-              <a:rPr lang="en-US" dirty="0" smtClean="0"/>
+              <a:rPr lang="en-US" dirty="0"/>
               <a:t>State equations (1-3)</a:t>
             </a:r>
-            <a:endParaRPr lang="en-US" dirty="0"/>
           </a:p>
         </p:txBody>
       </p:sp>
@@ -3756,7 +3827,7 @@
                   </m:oMath>
                 </a14:m>
                 <a:r>
-                  <a:rPr lang="en-US" dirty="0" smtClean="0"/>
+                  <a:rPr lang="en-US" dirty="0"/>
                   <a:t> </a:t>
                 </a:r>
               </a:p>
@@ -4117,7 +4188,7 @@
                     </m:f>
                   </m:oMath>
                 </a14:m>
-                <a:endParaRPr lang="en-US" dirty="0" smtClean="0"/>
+                <a:endParaRPr lang="en-US" dirty="0"/>
               </a:p>
               <a:p>
                 <a14:m>
@@ -4614,17 +4685,16 @@
                     </m:f>
                   </m:oMath>
                 </a14:m>
-                <a:endParaRPr lang="en-US" dirty="0" smtClean="0"/>
+                <a:endParaRPr lang="en-US" dirty="0"/>
               </a:p>
               <a:p>
                 <a:endParaRPr lang="en-US" dirty="0"/>
               </a:p>
               <a:p>
                 <a:r>
-                  <a:rPr lang="en-US" dirty="0" smtClean="0"/>
+                  <a:rPr lang="en-US" dirty="0"/>
                   <a:t>Requires forces in aerodynamic frame</a:t>
                 </a:r>
-                <a:endParaRPr lang="en-US" dirty="0"/>
               </a:p>
             </p:txBody>
           </p:sp>
@@ -4709,10 +4779,9 @@
           <a:lstStyle/>
           <a:p>
             <a:r>
-              <a:rPr lang="en-US" dirty="0" smtClean="0"/>
+              <a:rPr lang="en-US" dirty="0"/>
               <a:t>State equations (4-6)</a:t>
             </a:r>
-            <a:endParaRPr lang="en-US" dirty="0"/>
           </a:p>
         </p:txBody>
       </p:sp>
@@ -4881,7 +4950,7 @@
                     <m:d>
                       <m:dPr>
                         <m:ctrlPr>
-                          <a:rPr lang="en-US" sz="2000" b="0" i="0" smtClean="0">
+                          <a:rPr lang="en-US" sz="2000" b="0" i="1" smtClean="0">
                             <a:latin typeface="Cambria Math" panose="02040503050406030204" pitchFamily="18" charset="0"/>
                           </a:rPr>
                         </m:ctrlPr>
@@ -5449,7 +5518,7 @@
                     <m:sSub>
                       <m:sSubPr>
                         <m:ctrlPr>
-                          <a:rPr lang="en-US" sz="2000" b="0" i="0" smtClean="0">
+                          <a:rPr lang="en-US" sz="2000" b="0" i="1" smtClean="0">
                             <a:latin typeface="Cambria Math" panose="02040503050406030204" pitchFamily="18" charset="0"/>
                           </a:rPr>
                         </m:ctrlPr>
@@ -5521,7 +5590,7 @@
                     <m:sSup>
                       <m:sSupPr>
                         <m:ctrlPr>
-                          <a:rPr lang="en-US" sz="2000" b="0" i="0" smtClean="0">
+                          <a:rPr lang="en-US" sz="2000" b="0" i="1" smtClean="0">
                             <a:latin typeface="Cambria Math" panose="02040503050406030204" pitchFamily="18" charset="0"/>
                           </a:rPr>
                         </m:ctrlPr>
@@ -5532,7 +5601,7 @@
                             <m:begChr m:val="["/>
                             <m:endChr m:val="]"/>
                             <m:ctrlPr>
-                              <a:rPr lang="en-US" sz="2000" b="0" i="0" smtClean="0">
+                              <a:rPr lang="en-US" sz="2000" b="0" i="1" smtClean="0">
                                 <a:latin typeface="Cambria Math" panose="02040503050406030204" pitchFamily="18" charset="0"/>
                               </a:rPr>
                             </m:ctrlPr>
@@ -5565,7 +5634,7 @@
                     <m:d>
                       <m:dPr>
                         <m:ctrlPr>
-                          <a:rPr lang="en-US" sz="2000" b="0" i="0" smtClean="0">
+                          <a:rPr lang="en-US" sz="2000" b="0" i="1" smtClean="0">
                             <a:latin typeface="Cambria Math" panose="02040503050406030204" pitchFamily="18" charset="0"/>
                           </a:rPr>
                         </m:ctrlPr>
@@ -5641,7 +5710,7 @@
                               <m:accPr>
                                 <m:chr m:val="̇"/>
                                 <m:ctrlPr>
-                                  <a:rPr lang="en-US" sz="2000" b="0" smtClean="0">
+                                  <a:rPr lang="en-US" sz="2000" b="0" i="1" smtClean="0">
                                     <a:latin typeface="Cambria Math" panose="02040503050406030204" pitchFamily="18" charset="0"/>
                                   </a:rPr>
                                 </m:ctrlPr>
@@ -5812,15 +5881,14 @@
           <a:lstStyle/>
           <a:p>
             <a:r>
-              <a:rPr lang="en-US" dirty="0" smtClean="0"/>
+              <a:rPr lang="en-US" dirty="0"/>
               <a:t>State equation 7-9</a:t>
             </a:r>
-            <a:endParaRPr lang="en-US" dirty="0"/>
           </a:p>
         </p:txBody>
       </p:sp>
-      <mc:AlternateContent xmlns:mc="http://schemas.openxmlformats.org/markup-compatibility/2006">
-        <mc:Choice xmlns:a14="http://schemas.microsoft.com/office/drawing/2010/main" Requires="a14">
+      <mc:AlternateContent xmlns:mc="http://schemas.openxmlformats.org/markup-compatibility/2006" xmlns:a14="http://schemas.microsoft.com/office/drawing/2010/main">
+        <mc:Choice Requires="a14">
           <p:sp>
             <p:nvSpPr>
               <p:cNvPr id="3" name="Content Placeholder 2"/>
@@ -5946,7 +6014,7 @@
                     <m:sSup>
                       <m:sSupPr>
                         <m:ctrlPr>
-                          <a:rPr lang="en-US" b="0" i="0" smtClean="0">
+                          <a:rPr lang="en-US" b="0" i="1" smtClean="0">
                             <a:latin typeface="Cambria Math" panose="02040503050406030204" pitchFamily="18" charset="0"/>
                           </a:rPr>
                         </m:ctrlPr>
@@ -5989,7 +6057,7 @@
                         <m:d>
                           <m:dPr>
                             <m:ctrlPr>
-                              <a:rPr lang="en-US" b="0" i="0" smtClean="0">
+                              <a:rPr lang="en-US" b="0" i="1" smtClean="0">
                                 <a:latin typeface="Cambria Math" panose="02040503050406030204" pitchFamily="18" charset="0"/>
                               </a:rPr>
                             </m:ctrlPr>
@@ -6166,19 +6234,18 @@
                     </m:r>
                   </m:oMath>
                 </a14:m>
-                <a:endParaRPr lang="en-US" dirty="0" smtClean="0"/>
+                <a:endParaRPr lang="en-US" dirty="0"/>
               </a:p>
               <a:p>
                 <a:r>
-                  <a:rPr lang="en-US" dirty="0" smtClean="0"/>
+                  <a:rPr lang="en-US" dirty="0"/>
                   <a:t>Requires total moments in body frame</a:t>
                 </a:r>
-                <a:endParaRPr lang="en-US" dirty="0"/>
               </a:p>
             </p:txBody>
           </p:sp>
         </mc:Choice>
-        <mc:Fallback>
+        <mc:Fallback xmlns="">
           <p:sp>
             <p:nvSpPr>
               <p:cNvPr id="3" name="Content Placeholder 2"/>
@@ -6258,15 +6325,14 @@
           <a:lstStyle/>
           <a:p>
             <a:r>
-              <a:rPr lang="en-US" dirty="0" smtClean="0"/>
+              <a:rPr lang="en-US" dirty="0"/>
               <a:t>State equation 10-12</a:t>
             </a:r>
-            <a:endParaRPr lang="en-US" dirty="0"/>
           </a:p>
         </p:txBody>
       </p:sp>
-      <mc:AlternateContent xmlns:mc="http://schemas.openxmlformats.org/markup-compatibility/2006">
-        <mc:Choice xmlns:a14="http://schemas.microsoft.com/office/drawing/2010/main" Requires="a14">
+      <mc:AlternateContent xmlns:mc="http://schemas.openxmlformats.org/markup-compatibility/2006" xmlns:a14="http://schemas.microsoft.com/office/drawing/2010/main">
+        <mc:Choice Requires="a14">
           <p:sp>
             <p:nvSpPr>
               <p:cNvPr id="3" name="Content Placeholder 2"/>
@@ -6428,7 +6494,7 @@
                     </m:f>
                   </m:oMath>
                 </a14:m>
-                <a:endParaRPr lang="en-US" dirty="0" smtClean="0"/>
+                <a:endParaRPr lang="en-US" dirty="0"/>
               </a:p>
               <a:p>
                 <a14:m>
@@ -6549,7 +6615,7 @@
                     </m:f>
                   </m:oMath>
                 </a14:m>
-                <a:endParaRPr lang="en-US" dirty="0" smtClean="0"/>
+                <a:endParaRPr lang="en-US" dirty="0"/>
               </a:p>
               <a:p>
                 <a14:m>
@@ -6654,7 +6720,7 @@
                     </m:sSub>
                   </m:oMath>
                 </a14:m>
-                <a:endParaRPr lang="en-US" dirty="0" smtClean="0"/>
+                <a:endParaRPr lang="en-US" dirty="0"/>
               </a:p>
               <a:p>
                 <a:endParaRPr lang="en-US" dirty="0"/>
@@ -6962,7 +7028,7 @@
             </p:txBody>
           </p:sp>
         </mc:Choice>
-        <mc:Fallback>
+        <mc:Fallback xmlns="">
           <p:sp>
             <p:nvSpPr>
               <p:cNvPr id="3" name="Content Placeholder 2"/>
@@ -7000,6 +7066,2866 @@
     <p:extLst>
       <p:ext uri="{BB962C8B-B14F-4D97-AF65-F5344CB8AC3E}">
         <p14:creationId xmlns:p14="http://schemas.microsoft.com/office/powerpoint/2010/main" val="1169928149"/>
+      </p:ext>
+    </p:extLst>
+  </p:cSld>
+  <p:clrMapOvr>
+    <a:masterClrMapping/>
+  </p:clrMapOvr>
+</p:sld>
+</file>
+
+<file path=ppt/slides/slide8.xml><?xml version="1.0" encoding="utf-8"?>
+<p:sld xmlns:a="http://schemas.openxmlformats.org/drawingml/2006/main" xmlns:r="http://schemas.openxmlformats.org/officeDocument/2006/relationships" xmlns:p="http://schemas.openxmlformats.org/presentationml/2006/main">
+  <p:cSld>
+    <p:spTree>
+      <p:nvGrpSpPr>
+        <p:cNvPr id="1" name=""/>
+        <p:cNvGrpSpPr/>
+        <p:nvPr/>
+      </p:nvGrpSpPr>
+      <p:grpSpPr>
+        <a:xfrm>
+          <a:off x="0" y="0"/>
+          <a:ext cx="0" cy="0"/>
+          <a:chOff x="0" y="0"/>
+          <a:chExt cx="0" cy="0"/>
+        </a:xfrm>
+      </p:grpSpPr>
+      <p:sp>
+        <p:nvSpPr>
+          <p:cNvPr id="2" name="Title 1">
+            <a:extLst>
+              <a:ext uri="{FF2B5EF4-FFF2-40B4-BE49-F238E27FC236}">
+                <a16:creationId xmlns:a16="http://schemas.microsoft.com/office/drawing/2014/main" id="{EB67F3B9-A9B5-5A78-4B1F-EA2FA1869026}"/>
+              </a:ext>
+            </a:extLst>
+          </p:cNvPr>
+          <p:cNvSpPr>
+            <a:spLocks noGrp="1"/>
+          </p:cNvSpPr>
+          <p:nvPr>
+            <p:ph type="title"/>
+          </p:nvPr>
+        </p:nvSpPr>
+        <p:spPr/>
+        <p:txBody>
+          <a:bodyPr/>
+          <a:lstStyle/>
+          <a:p>
+            <a:endParaRPr lang="en-US" dirty="0"/>
+          </a:p>
+        </p:txBody>
+      </p:sp>
+      <mc:AlternateContent xmlns:mc="http://schemas.openxmlformats.org/markup-compatibility/2006">
+        <mc:Choice xmlns:a14="http://schemas.microsoft.com/office/drawing/2010/main" Requires="a14">
+          <p:sp>
+            <p:nvSpPr>
+              <p:cNvPr id="3" name="Content Placeholder 2">
+                <a:extLst>
+                  <a:ext uri="{FF2B5EF4-FFF2-40B4-BE49-F238E27FC236}">
+                    <a16:creationId xmlns:a16="http://schemas.microsoft.com/office/drawing/2014/main" id="{296B5D46-5A79-EB7D-76A6-0AAD08B77740}"/>
+                  </a:ext>
+                </a:extLst>
+              </p:cNvPr>
+              <p:cNvSpPr>
+                <a:spLocks noGrp="1"/>
+              </p:cNvSpPr>
+              <p:nvPr>
+                <p:ph idx="1"/>
+              </p:nvPr>
+            </p:nvSpPr>
+            <p:spPr/>
+            <p:txBody>
+              <a:bodyPr>
+                <a:normAutofit fontScale="92500"/>
+              </a:bodyPr>
+              <a:lstStyle/>
+              <a:p>
+                <a14:m>
+                  <m:oMath xmlns:m="http://schemas.openxmlformats.org/officeDocument/2006/math">
+                    <m:sSub>
+                      <m:sSubPr>
+                        <m:ctrlPr>
+                          <a:rPr lang="en-US" sz="1600" b="0" i="1" smtClean="0">
+                            <a:latin typeface="Cambria Math" panose="02040503050406030204" pitchFamily="18" charset="0"/>
+                          </a:rPr>
+                        </m:ctrlPr>
+                      </m:sSubPr>
+                      <m:e>
+                        <m:acc>
+                          <m:accPr>
+                            <m:chr m:val="̇"/>
+                            <m:ctrlPr>
+                              <a:rPr lang="en-US" sz="1600" b="0" i="1" smtClean="0">
+                                <a:latin typeface="Cambria Math" panose="02040503050406030204" pitchFamily="18" charset="0"/>
+                              </a:rPr>
+                            </m:ctrlPr>
+                          </m:accPr>
+                          <m:e>
+                            <m:r>
+                              <a:rPr lang="en-US" sz="1600" b="0" i="1" smtClean="0">
+                                <a:latin typeface="Cambria Math" panose="02040503050406030204" pitchFamily="18" charset="0"/>
+                              </a:rPr>
+                              <m:t>𝑣</m:t>
+                            </m:r>
+                          </m:e>
+                        </m:acc>
+                      </m:e>
+                      <m:sub>
+                        <m:r>
+                          <a:rPr lang="en-US" sz="1600" b="0" i="1" smtClean="0">
+                            <a:latin typeface="Cambria Math" panose="02040503050406030204" pitchFamily="18" charset="0"/>
+                          </a:rPr>
+                          <m:t>𝑎</m:t>
+                        </m:r>
+                      </m:sub>
+                    </m:sSub>
+                    <m:r>
+                      <a:rPr lang="en-US" sz="1600" b="0" i="1" smtClean="0">
+                        <a:latin typeface="Cambria Math" panose="02040503050406030204" pitchFamily="18" charset="0"/>
+                      </a:rPr>
+                      <m:t>=</m:t>
+                    </m:r>
+                    <m:f>
+                      <m:fPr>
+                        <m:ctrlPr>
+                          <a:rPr lang="en-US" sz="1600" b="0" i="1" smtClean="0">
+                            <a:latin typeface="Cambria Math" panose="02040503050406030204" pitchFamily="18" charset="0"/>
+                          </a:rPr>
+                        </m:ctrlPr>
+                      </m:fPr>
+                      <m:num>
+                        <m:sSub>
+                          <m:sSubPr>
+                            <m:ctrlPr>
+                              <a:rPr lang="en-US" sz="1600" b="0" i="1" smtClean="0">
+                                <a:latin typeface="Cambria Math" panose="02040503050406030204" pitchFamily="18" charset="0"/>
+                              </a:rPr>
+                            </m:ctrlPr>
+                          </m:sSubPr>
+                          <m:e>
+                            <m:sSub>
+                              <m:sSubPr>
+                                <m:ctrlPr>
+                                  <a:rPr lang="en-US" sz="1600" b="0" i="1" smtClean="0">
+                                    <a:latin typeface="Cambria Math" panose="02040503050406030204" pitchFamily="18" charset="0"/>
+                                  </a:rPr>
+                                </m:ctrlPr>
+                              </m:sSubPr>
+                              <m:e>
+                                <m:r>
+                                  <a:rPr lang="en-US" sz="1600" b="0" i="1" smtClean="0">
+                                    <a:latin typeface="Cambria Math" panose="02040503050406030204" pitchFamily="18" charset="0"/>
+                                  </a:rPr>
+                                  <m:t>{</m:t>
+                                </m:r>
+                                <m:r>
+                                  <a:rPr lang="en-US" sz="1600" b="0" i="1" smtClean="0">
+                                    <a:latin typeface="Cambria Math" panose="02040503050406030204" pitchFamily="18" charset="0"/>
+                                  </a:rPr>
+                                  <m:t>𝐹</m:t>
+                                </m:r>
+                              </m:e>
+                              <m:sub>
+                                <m:r>
+                                  <a:rPr lang="en-US" sz="1600" b="0" i="1" smtClean="0">
+                                    <a:latin typeface="Cambria Math" panose="02040503050406030204" pitchFamily="18" charset="0"/>
+                                  </a:rPr>
+                                  <m:t>𝑡𝑜𝑡</m:t>
+                                </m:r>
+                                <m:r>
+                                  <a:rPr lang="en-US" sz="1600" b="0" i="1" smtClean="0">
+                                    <a:latin typeface="Cambria Math" panose="02040503050406030204" pitchFamily="18" charset="0"/>
+                                  </a:rPr>
+                                  <m:t>,</m:t>
+                                </m:r>
+                                <m:r>
+                                  <a:rPr lang="en-US" sz="1600" b="0" i="1" smtClean="0">
+                                    <a:latin typeface="Cambria Math" panose="02040503050406030204" pitchFamily="18" charset="0"/>
+                                  </a:rPr>
+                                  <m:t>𝑥</m:t>
+                                </m:r>
+                              </m:sub>
+                            </m:sSub>
+                            <m:r>
+                              <a:rPr lang="en-US" sz="1600" b="0" i="1" smtClean="0">
+                                <a:latin typeface="Cambria Math" panose="02040503050406030204" pitchFamily="18" charset="0"/>
+                              </a:rPr>
+                              <m:t>}</m:t>
+                            </m:r>
+                          </m:e>
+                          <m:sub>
+                            <m:r>
+                              <a:rPr lang="en-US" sz="1600" b="0" i="1" smtClean="0">
+                                <a:latin typeface="Cambria Math" panose="02040503050406030204" pitchFamily="18" charset="0"/>
+                              </a:rPr>
+                              <m:t>𝐴</m:t>
+                            </m:r>
+                          </m:sub>
+                        </m:sSub>
+                      </m:num>
+                      <m:den>
+                        <m:sSub>
+                          <m:sSubPr>
+                            <m:ctrlPr>
+                              <a:rPr lang="en-US" sz="1600" b="0" i="1" smtClean="0">
+                                <a:latin typeface="Cambria Math" panose="02040503050406030204" pitchFamily="18" charset="0"/>
+                              </a:rPr>
+                            </m:ctrlPr>
+                          </m:sSubPr>
+                          <m:e>
+                            <m:r>
+                              <a:rPr lang="en-US" sz="1600" b="0" i="1" smtClean="0">
+                                <a:latin typeface="Cambria Math" panose="02040503050406030204" pitchFamily="18" charset="0"/>
+                              </a:rPr>
+                              <m:t>𝑚</m:t>
+                            </m:r>
+                          </m:e>
+                          <m:sub>
+                            <m:r>
+                              <a:rPr lang="en-US" sz="1600" b="0" i="1" smtClean="0">
+                                <a:latin typeface="Cambria Math" panose="02040503050406030204" pitchFamily="18" charset="0"/>
+                              </a:rPr>
+                              <m:t> </m:t>
+                            </m:r>
+                          </m:sub>
+                        </m:sSub>
+                      </m:den>
+                    </m:f>
+                    <m:r>
+                      <a:rPr lang="en-US" sz="1600" b="0" i="1" smtClean="0">
+                        <a:latin typeface="Cambria Math" panose="02040503050406030204" pitchFamily="18" charset="0"/>
+                      </a:rPr>
+                      <m:t> </m:t>
+                    </m:r>
+                  </m:oMath>
+                </a14:m>
+                <a:r>
+                  <a:rPr lang="en-US" sz="1600" dirty="0"/>
+                  <a:t> </a:t>
+                </a:r>
+              </a:p>
+              <a:p>
+                <a14:m>
+                  <m:oMath xmlns:m="http://schemas.openxmlformats.org/officeDocument/2006/math">
+                    <m:acc>
+                      <m:accPr>
+                        <m:chr m:val="̇"/>
+                        <m:ctrlPr>
+                          <a:rPr lang="en-US" sz="1600" b="0" i="1" smtClean="0">
+                            <a:latin typeface="Cambria Math" panose="02040503050406030204" pitchFamily="18" charset="0"/>
+                          </a:rPr>
+                        </m:ctrlPr>
+                      </m:accPr>
+                      <m:e>
+                        <m:sSub>
+                          <m:sSubPr>
+                            <m:ctrlPr>
+                              <a:rPr lang="en-US" sz="1600" b="0" i="1" smtClean="0">
+                                <a:latin typeface="Cambria Math" panose="02040503050406030204" pitchFamily="18" charset="0"/>
+                              </a:rPr>
+                            </m:ctrlPr>
+                          </m:sSubPr>
+                          <m:e>
+                            <m:r>
+                              <a:rPr lang="en-US" sz="1600" b="0" i="1" smtClean="0">
+                                <a:latin typeface="Cambria Math" panose="02040503050406030204" pitchFamily="18" charset="0"/>
+                              </a:rPr>
+                              <m:t>𝛽</m:t>
+                            </m:r>
+                          </m:e>
+                          <m:sub>
+                            <m:r>
+                              <a:rPr lang="en-US" sz="1600" b="0" i="1" smtClean="0">
+                                <a:latin typeface="Cambria Math" panose="02040503050406030204" pitchFamily="18" charset="0"/>
+                              </a:rPr>
+                              <m:t>𝑎</m:t>
+                            </m:r>
+                          </m:sub>
+                        </m:sSub>
+                      </m:e>
+                    </m:acc>
+                    <m:r>
+                      <a:rPr lang="en-US" sz="1600" b="0" i="1" smtClean="0">
+                        <a:latin typeface="Cambria Math" panose="02040503050406030204" pitchFamily="18" charset="0"/>
+                      </a:rPr>
+                      <m:t>=</m:t>
+                    </m:r>
+                    <m:func>
+                      <m:funcPr>
+                        <m:ctrlPr>
+                          <a:rPr lang="en-US" sz="1600" b="0" i="1" smtClean="0">
+                            <a:latin typeface="Cambria Math" panose="02040503050406030204" pitchFamily="18" charset="0"/>
+                          </a:rPr>
+                        </m:ctrlPr>
+                      </m:funcPr>
+                      <m:fName>
+                        <m:r>
+                          <m:rPr>
+                            <m:sty m:val="p"/>
+                          </m:rPr>
+                          <a:rPr lang="en-US" sz="1600" b="0" i="0" smtClean="0">
+                            <a:latin typeface="Cambria Math" panose="02040503050406030204" pitchFamily="18" charset="0"/>
+                          </a:rPr>
+                          <m:t>sin</m:t>
+                        </m:r>
+                      </m:fName>
+                      <m:e>
+                        <m:d>
+                          <m:dPr>
+                            <m:ctrlPr>
+                              <a:rPr lang="en-US" sz="1600" b="0" i="1" smtClean="0">
+                                <a:latin typeface="Cambria Math" panose="02040503050406030204" pitchFamily="18" charset="0"/>
+                              </a:rPr>
+                            </m:ctrlPr>
+                          </m:dPr>
+                          <m:e>
+                            <m:sSub>
+                              <m:sSubPr>
+                                <m:ctrlPr>
+                                  <a:rPr lang="en-US" sz="1600" b="0" i="1" smtClean="0">
+                                    <a:latin typeface="Cambria Math" panose="02040503050406030204" pitchFamily="18" charset="0"/>
+                                  </a:rPr>
+                                </m:ctrlPr>
+                              </m:sSubPr>
+                              <m:e>
+                                <m:r>
+                                  <a:rPr lang="en-US" sz="1600" b="0" i="1" smtClean="0">
+                                    <a:latin typeface="Cambria Math" panose="02040503050406030204" pitchFamily="18" charset="0"/>
+                                  </a:rPr>
+                                  <m:t>𝛼</m:t>
+                                </m:r>
+                              </m:e>
+                              <m:sub>
+                                <m:r>
+                                  <a:rPr lang="en-US" sz="1600" b="0" i="1" smtClean="0">
+                                    <a:latin typeface="Cambria Math" panose="02040503050406030204" pitchFamily="18" charset="0"/>
+                                  </a:rPr>
+                                  <m:t>𝑎</m:t>
+                                </m:r>
+                              </m:sub>
+                            </m:sSub>
+                          </m:e>
+                        </m:d>
+                      </m:e>
+                    </m:func>
+                    <m:sSub>
+                      <m:sSubPr>
+                        <m:ctrlPr>
+                          <a:rPr lang="en-US" sz="1600" b="0" i="1" smtClean="0">
+                            <a:latin typeface="Cambria Math" panose="02040503050406030204" pitchFamily="18" charset="0"/>
+                          </a:rPr>
+                        </m:ctrlPr>
+                      </m:sSubPr>
+                      <m:e>
+                        <m:r>
+                          <a:rPr lang="en-US" sz="1600" b="0" i="1" smtClean="0">
+                            <a:latin typeface="Cambria Math" panose="02040503050406030204" pitchFamily="18" charset="0"/>
+                          </a:rPr>
+                          <m:t>𝑝</m:t>
+                        </m:r>
+                      </m:e>
+                      <m:sub>
+                        <m:r>
+                          <a:rPr lang="en-US" sz="1600" b="0" i="1" smtClean="0">
+                            <a:latin typeface="Cambria Math" panose="02040503050406030204" pitchFamily="18" charset="0"/>
+                          </a:rPr>
+                          <m:t>𝑎</m:t>
+                        </m:r>
+                      </m:sub>
+                    </m:sSub>
+                    <m:r>
+                      <a:rPr lang="en-US" sz="1600" b="0" i="1" smtClean="0">
+                        <a:latin typeface="Cambria Math" panose="02040503050406030204" pitchFamily="18" charset="0"/>
+                      </a:rPr>
+                      <m:t>−</m:t>
+                    </m:r>
+                    <m:func>
+                      <m:funcPr>
+                        <m:ctrlPr>
+                          <a:rPr lang="en-US" sz="1600" b="0" i="1" smtClean="0">
+                            <a:latin typeface="Cambria Math" panose="02040503050406030204" pitchFamily="18" charset="0"/>
+                          </a:rPr>
+                        </m:ctrlPr>
+                      </m:funcPr>
+                      <m:fName>
+                        <m:r>
+                          <m:rPr>
+                            <m:sty m:val="p"/>
+                          </m:rPr>
+                          <a:rPr lang="en-US" sz="1600" b="0" i="0" smtClean="0">
+                            <a:latin typeface="Cambria Math" panose="02040503050406030204" pitchFamily="18" charset="0"/>
+                          </a:rPr>
+                          <m:t>cos</m:t>
+                        </m:r>
+                      </m:fName>
+                      <m:e>
+                        <m:d>
+                          <m:dPr>
+                            <m:ctrlPr>
+                              <a:rPr lang="en-US" sz="1600" b="0" i="1" smtClean="0">
+                                <a:latin typeface="Cambria Math" panose="02040503050406030204" pitchFamily="18" charset="0"/>
+                              </a:rPr>
+                            </m:ctrlPr>
+                          </m:dPr>
+                          <m:e>
+                            <m:sSub>
+                              <m:sSubPr>
+                                <m:ctrlPr>
+                                  <a:rPr lang="en-US" sz="1600" b="0" i="1" smtClean="0">
+                                    <a:latin typeface="Cambria Math" panose="02040503050406030204" pitchFamily="18" charset="0"/>
+                                  </a:rPr>
+                                </m:ctrlPr>
+                              </m:sSubPr>
+                              <m:e>
+                                <m:r>
+                                  <a:rPr lang="en-US" sz="1600" b="0" i="1" smtClean="0">
+                                    <a:latin typeface="Cambria Math" panose="02040503050406030204" pitchFamily="18" charset="0"/>
+                                  </a:rPr>
+                                  <m:t>𝛼</m:t>
+                                </m:r>
+                              </m:e>
+                              <m:sub>
+                                <m:r>
+                                  <a:rPr lang="en-US" sz="1600" b="0" i="1" smtClean="0">
+                                    <a:latin typeface="Cambria Math" panose="02040503050406030204" pitchFamily="18" charset="0"/>
+                                  </a:rPr>
+                                  <m:t>𝑎</m:t>
+                                </m:r>
+                              </m:sub>
+                            </m:sSub>
+                          </m:e>
+                        </m:d>
+                        <m:sSub>
+                          <m:sSubPr>
+                            <m:ctrlPr>
+                              <a:rPr lang="en-US" sz="1600" b="0" i="1" smtClean="0">
+                                <a:latin typeface="Cambria Math" panose="02040503050406030204" pitchFamily="18" charset="0"/>
+                              </a:rPr>
+                            </m:ctrlPr>
+                          </m:sSubPr>
+                          <m:e>
+                            <m:r>
+                              <a:rPr lang="en-US" sz="1600" b="0" i="1" smtClean="0">
+                                <a:latin typeface="Cambria Math" panose="02040503050406030204" pitchFamily="18" charset="0"/>
+                              </a:rPr>
+                              <m:t>𝑟</m:t>
+                            </m:r>
+                          </m:e>
+                          <m:sub>
+                            <m:r>
+                              <a:rPr lang="en-US" sz="1600" b="0" i="1" smtClean="0">
+                                <a:latin typeface="Cambria Math" panose="02040503050406030204" pitchFamily="18" charset="0"/>
+                              </a:rPr>
+                              <m:t>𝑎</m:t>
+                            </m:r>
+                          </m:sub>
+                        </m:sSub>
+                        <m:r>
+                          <a:rPr lang="en-US" sz="1600" b="0" i="1" smtClean="0">
+                            <a:latin typeface="Cambria Math" panose="02040503050406030204" pitchFamily="18" charset="0"/>
+                          </a:rPr>
+                          <m:t>+</m:t>
+                        </m:r>
+                      </m:e>
+                    </m:func>
+                    <m:f>
+                      <m:fPr>
+                        <m:ctrlPr>
+                          <a:rPr lang="en-US" sz="1600" b="0" i="1" smtClean="0">
+                            <a:latin typeface="Cambria Math" panose="02040503050406030204" pitchFamily="18" charset="0"/>
+                          </a:rPr>
+                        </m:ctrlPr>
+                      </m:fPr>
+                      <m:num>
+                        <m:sSub>
+                          <m:sSubPr>
+                            <m:ctrlPr>
+                              <a:rPr lang="en-US" sz="1600" b="0" i="1" smtClean="0">
+                                <a:latin typeface="Cambria Math" panose="02040503050406030204" pitchFamily="18" charset="0"/>
+                              </a:rPr>
+                            </m:ctrlPr>
+                          </m:sSubPr>
+                          <m:e>
+                            <m:sSub>
+                              <m:sSubPr>
+                                <m:ctrlPr>
+                                  <a:rPr lang="en-US" sz="1600" b="0" i="1" smtClean="0">
+                                    <a:latin typeface="Cambria Math" panose="02040503050406030204" pitchFamily="18" charset="0"/>
+                                  </a:rPr>
+                                </m:ctrlPr>
+                              </m:sSubPr>
+                              <m:e>
+                                <m:r>
+                                  <a:rPr lang="en-US" sz="1600" b="0" i="1" smtClean="0">
+                                    <a:latin typeface="Cambria Math" panose="02040503050406030204" pitchFamily="18" charset="0"/>
+                                  </a:rPr>
+                                  <m:t>{</m:t>
+                                </m:r>
+                                <m:r>
+                                  <a:rPr lang="en-US" sz="1600" b="0" i="1" smtClean="0">
+                                    <a:latin typeface="Cambria Math" panose="02040503050406030204" pitchFamily="18" charset="0"/>
+                                  </a:rPr>
+                                  <m:t>𝐹</m:t>
+                                </m:r>
+                              </m:e>
+                              <m:sub>
+                                <m:r>
+                                  <a:rPr lang="en-US" sz="1600" b="0" i="1" smtClean="0">
+                                    <a:latin typeface="Cambria Math" panose="02040503050406030204" pitchFamily="18" charset="0"/>
+                                  </a:rPr>
+                                  <m:t>𝑡𝑜𝑡</m:t>
+                                </m:r>
+                                <m:r>
+                                  <a:rPr lang="en-US" sz="1600" b="0" i="1" smtClean="0">
+                                    <a:latin typeface="Cambria Math" panose="02040503050406030204" pitchFamily="18" charset="0"/>
+                                  </a:rPr>
+                                  <m:t>,</m:t>
+                                </m:r>
+                                <m:r>
+                                  <a:rPr lang="en-US" sz="1600" b="0" i="1" smtClean="0">
+                                    <a:latin typeface="Cambria Math" panose="02040503050406030204" pitchFamily="18" charset="0"/>
+                                  </a:rPr>
+                                  <m:t>𝑦</m:t>
+                                </m:r>
+                              </m:sub>
+                            </m:sSub>
+                            <m:r>
+                              <a:rPr lang="en-US" sz="1600" b="0" i="1" smtClean="0">
+                                <a:latin typeface="Cambria Math" panose="02040503050406030204" pitchFamily="18" charset="0"/>
+                              </a:rPr>
+                              <m:t>}</m:t>
+                            </m:r>
+                          </m:e>
+                          <m:sub>
+                            <m:r>
+                              <a:rPr lang="en-US" sz="1600" b="0" i="1" smtClean="0">
+                                <a:latin typeface="Cambria Math" panose="02040503050406030204" pitchFamily="18" charset="0"/>
+                              </a:rPr>
+                              <m:t>𝐴</m:t>
+                            </m:r>
+                          </m:sub>
+                        </m:sSub>
+                      </m:num>
+                      <m:den>
+                        <m:sSub>
+                          <m:sSubPr>
+                            <m:ctrlPr>
+                              <a:rPr lang="en-US" sz="1600" b="0" i="1" smtClean="0">
+                                <a:latin typeface="Cambria Math" panose="02040503050406030204" pitchFamily="18" charset="0"/>
+                              </a:rPr>
+                            </m:ctrlPr>
+                          </m:sSubPr>
+                          <m:e>
+                            <m:r>
+                              <a:rPr lang="en-US" sz="1600" b="0" i="1" smtClean="0">
+                                <a:latin typeface="Cambria Math" panose="02040503050406030204" pitchFamily="18" charset="0"/>
+                              </a:rPr>
+                              <m:t>𝑚</m:t>
+                            </m:r>
+                          </m:e>
+                          <m:sub>
+                            <m:r>
+                              <a:rPr lang="en-US" sz="1600" b="0" i="1" smtClean="0">
+                                <a:latin typeface="Cambria Math" panose="02040503050406030204" pitchFamily="18" charset="0"/>
+                              </a:rPr>
+                              <m:t> </m:t>
+                            </m:r>
+                          </m:sub>
+                        </m:sSub>
+                        <m:sSub>
+                          <m:sSubPr>
+                            <m:ctrlPr>
+                              <a:rPr lang="en-US" sz="1600" b="0" i="1" smtClean="0">
+                                <a:latin typeface="Cambria Math" panose="02040503050406030204" pitchFamily="18" charset="0"/>
+                              </a:rPr>
+                            </m:ctrlPr>
+                          </m:sSubPr>
+                          <m:e>
+                            <m:r>
+                              <a:rPr lang="en-US" sz="1600" b="0" i="1" smtClean="0">
+                                <a:latin typeface="Cambria Math" panose="02040503050406030204" pitchFamily="18" charset="0"/>
+                              </a:rPr>
+                              <m:t>𝑣</m:t>
+                            </m:r>
+                          </m:e>
+                          <m:sub>
+                            <m:r>
+                              <a:rPr lang="en-US" sz="1600" b="0" i="1" smtClean="0">
+                                <a:latin typeface="Cambria Math" panose="02040503050406030204" pitchFamily="18" charset="0"/>
+                              </a:rPr>
+                              <m:t>𝑎</m:t>
+                            </m:r>
+                          </m:sub>
+                        </m:sSub>
+                      </m:den>
+                    </m:f>
+                  </m:oMath>
+                </a14:m>
+                <a:endParaRPr lang="en-US" sz="1600" dirty="0"/>
+              </a:p>
+              <a:p>
+                <a14:m>
+                  <m:oMath xmlns:m="http://schemas.openxmlformats.org/officeDocument/2006/math">
+                    <m:sSub>
+                      <m:sSubPr>
+                        <m:ctrlPr>
+                          <a:rPr lang="en-US" sz="1600" b="0" i="1" smtClean="0">
+                            <a:latin typeface="Cambria Math" panose="02040503050406030204" pitchFamily="18" charset="0"/>
+                          </a:rPr>
+                        </m:ctrlPr>
+                      </m:sSubPr>
+                      <m:e>
+                        <m:acc>
+                          <m:accPr>
+                            <m:chr m:val="̇"/>
+                            <m:ctrlPr>
+                              <a:rPr lang="en-US" sz="1600" b="0" i="1" smtClean="0">
+                                <a:latin typeface="Cambria Math" panose="02040503050406030204" pitchFamily="18" charset="0"/>
+                              </a:rPr>
+                            </m:ctrlPr>
+                          </m:accPr>
+                          <m:e>
+                            <m:r>
+                              <a:rPr lang="en-US" sz="1600" b="0" i="1" smtClean="0">
+                                <a:latin typeface="Cambria Math" panose="02040503050406030204" pitchFamily="18" charset="0"/>
+                              </a:rPr>
+                              <m:t>𝛼</m:t>
+                            </m:r>
+                          </m:e>
+                        </m:acc>
+                      </m:e>
+                      <m:sub>
+                        <m:r>
+                          <a:rPr lang="en-US" sz="1600" b="0" i="1" smtClean="0">
+                            <a:latin typeface="Cambria Math" panose="02040503050406030204" pitchFamily="18" charset="0"/>
+                          </a:rPr>
+                          <m:t>𝑎</m:t>
+                        </m:r>
+                      </m:sub>
+                    </m:sSub>
+                    <m:r>
+                      <a:rPr lang="en-US" sz="1600" b="0" i="1" smtClean="0">
+                        <a:latin typeface="Cambria Math" panose="02040503050406030204" pitchFamily="18" charset="0"/>
+                      </a:rPr>
+                      <m:t>=</m:t>
+                    </m:r>
+                    <m:sSub>
+                      <m:sSubPr>
+                        <m:ctrlPr>
+                          <a:rPr lang="en-US" sz="1600" b="0" i="1" smtClean="0">
+                            <a:latin typeface="Cambria Math" panose="02040503050406030204" pitchFamily="18" charset="0"/>
+                          </a:rPr>
+                        </m:ctrlPr>
+                      </m:sSubPr>
+                      <m:e>
+                        <m:r>
+                          <a:rPr lang="en-US" sz="1600" b="0" i="1" smtClean="0">
+                            <a:latin typeface="Cambria Math" panose="02040503050406030204" pitchFamily="18" charset="0"/>
+                          </a:rPr>
+                          <m:t>𝑞</m:t>
+                        </m:r>
+                      </m:e>
+                      <m:sub>
+                        <m:r>
+                          <a:rPr lang="en-US" sz="1600" b="0" i="1" smtClean="0">
+                            <a:latin typeface="Cambria Math" panose="02040503050406030204" pitchFamily="18" charset="0"/>
+                          </a:rPr>
+                          <m:t>𝑎</m:t>
+                        </m:r>
+                      </m:sub>
+                    </m:sSub>
+                    <m:r>
+                      <a:rPr lang="en-US" sz="1600" b="0" i="1" smtClean="0">
+                        <a:latin typeface="Cambria Math" panose="02040503050406030204" pitchFamily="18" charset="0"/>
+                      </a:rPr>
+                      <m:t>−</m:t>
+                    </m:r>
+                    <m:func>
+                      <m:funcPr>
+                        <m:ctrlPr>
+                          <a:rPr lang="en-US" sz="1600" b="0" i="1" smtClean="0">
+                            <a:latin typeface="Cambria Math" panose="02040503050406030204" pitchFamily="18" charset="0"/>
+                          </a:rPr>
+                        </m:ctrlPr>
+                      </m:funcPr>
+                      <m:fName>
+                        <m:r>
+                          <m:rPr>
+                            <m:sty m:val="p"/>
+                          </m:rPr>
+                          <a:rPr lang="en-US" sz="1600" b="0" i="0" smtClean="0">
+                            <a:latin typeface="Cambria Math" panose="02040503050406030204" pitchFamily="18" charset="0"/>
+                          </a:rPr>
+                          <m:t>tan</m:t>
+                        </m:r>
+                      </m:fName>
+                      <m:e>
+                        <m:sSub>
+                          <m:sSubPr>
+                            <m:ctrlPr>
+                              <a:rPr lang="en-US" sz="1600" b="0" i="1" smtClean="0">
+                                <a:latin typeface="Cambria Math" panose="02040503050406030204" pitchFamily="18" charset="0"/>
+                              </a:rPr>
+                            </m:ctrlPr>
+                          </m:sSubPr>
+                          <m:e>
+                            <m:r>
+                              <a:rPr lang="en-US" sz="1600" b="0" i="1" smtClean="0">
+                                <a:latin typeface="Cambria Math" panose="02040503050406030204" pitchFamily="18" charset="0"/>
+                              </a:rPr>
+                              <m:t>(</m:t>
+                            </m:r>
+                            <m:r>
+                              <a:rPr lang="en-US" sz="1600" b="0" i="1" smtClean="0">
+                                <a:latin typeface="Cambria Math" panose="02040503050406030204" pitchFamily="18" charset="0"/>
+                              </a:rPr>
+                              <m:t>𝛽</m:t>
+                            </m:r>
+                          </m:e>
+                          <m:sub>
+                            <m:r>
+                              <a:rPr lang="en-US" sz="1600" b="0" i="1" smtClean="0">
+                                <a:latin typeface="Cambria Math" panose="02040503050406030204" pitchFamily="18" charset="0"/>
+                              </a:rPr>
+                              <m:t>𝑎</m:t>
+                            </m:r>
+                          </m:sub>
+                        </m:sSub>
+                        <m:r>
+                          <a:rPr lang="en-US" sz="1600" b="0" i="1" smtClean="0">
+                            <a:latin typeface="Cambria Math" panose="02040503050406030204" pitchFamily="18" charset="0"/>
+                          </a:rPr>
+                          <m:t>)(</m:t>
+                        </m:r>
+                        <m:func>
+                          <m:funcPr>
+                            <m:ctrlPr>
+                              <a:rPr lang="en-US" sz="1600" b="0" i="1" smtClean="0">
+                                <a:latin typeface="Cambria Math" panose="02040503050406030204" pitchFamily="18" charset="0"/>
+                              </a:rPr>
+                            </m:ctrlPr>
+                          </m:funcPr>
+                          <m:fName>
+                            <m:r>
+                              <m:rPr>
+                                <m:sty m:val="p"/>
+                              </m:rPr>
+                              <a:rPr lang="en-US" sz="1600" b="0" i="0" smtClean="0">
+                                <a:latin typeface="Cambria Math" panose="02040503050406030204" pitchFamily="18" charset="0"/>
+                              </a:rPr>
+                              <m:t>cos</m:t>
+                            </m:r>
+                          </m:fName>
+                          <m:e>
+                            <m:sSub>
+                              <m:sSubPr>
+                                <m:ctrlPr>
+                                  <a:rPr lang="en-US" sz="1600" b="0" i="1" smtClean="0">
+                                    <a:latin typeface="Cambria Math" panose="02040503050406030204" pitchFamily="18" charset="0"/>
+                                  </a:rPr>
+                                </m:ctrlPr>
+                              </m:sSubPr>
+                              <m:e>
+                                <m:r>
+                                  <a:rPr lang="en-US" sz="1600" b="0" i="1" smtClean="0">
+                                    <a:latin typeface="Cambria Math" panose="02040503050406030204" pitchFamily="18" charset="0"/>
+                                  </a:rPr>
+                                  <m:t>(</m:t>
+                                </m:r>
+                                <m:r>
+                                  <a:rPr lang="en-US" sz="1600" b="0" i="1" smtClean="0">
+                                    <a:latin typeface="Cambria Math" panose="02040503050406030204" pitchFamily="18" charset="0"/>
+                                  </a:rPr>
+                                  <m:t>𝛼</m:t>
+                                </m:r>
+                              </m:e>
+                              <m:sub>
+                                <m:r>
+                                  <a:rPr lang="en-US" sz="1600" b="0" i="1" smtClean="0">
+                                    <a:latin typeface="Cambria Math" panose="02040503050406030204" pitchFamily="18" charset="0"/>
+                                  </a:rPr>
+                                  <m:t>𝑎</m:t>
+                                </m:r>
+                              </m:sub>
+                            </m:sSub>
+                            <m:r>
+                              <a:rPr lang="en-US" sz="1600" b="0" i="1" smtClean="0">
+                                <a:latin typeface="Cambria Math" panose="02040503050406030204" pitchFamily="18" charset="0"/>
+                              </a:rPr>
+                              <m:t>)</m:t>
+                            </m:r>
+                            <m:sSub>
+                              <m:sSubPr>
+                                <m:ctrlPr>
+                                  <a:rPr lang="en-US" sz="1600" b="0" i="1" smtClean="0">
+                                    <a:latin typeface="Cambria Math" panose="02040503050406030204" pitchFamily="18" charset="0"/>
+                                  </a:rPr>
+                                </m:ctrlPr>
+                              </m:sSubPr>
+                              <m:e>
+                                <m:r>
+                                  <a:rPr lang="en-US" sz="1600" b="0" i="1" smtClean="0">
+                                    <a:latin typeface="Cambria Math" panose="02040503050406030204" pitchFamily="18" charset="0"/>
+                                  </a:rPr>
+                                  <m:t>𝑝</m:t>
+                                </m:r>
+                              </m:e>
+                              <m:sub>
+                                <m:r>
+                                  <a:rPr lang="en-US" sz="1600" b="0" i="1" smtClean="0">
+                                    <a:latin typeface="Cambria Math" panose="02040503050406030204" pitchFamily="18" charset="0"/>
+                                  </a:rPr>
+                                  <m:t>𝑎</m:t>
+                                </m:r>
+                              </m:sub>
+                            </m:sSub>
+                            <m:r>
+                              <a:rPr lang="en-US" sz="1600" b="0" i="1" smtClean="0">
+                                <a:latin typeface="Cambria Math" panose="02040503050406030204" pitchFamily="18" charset="0"/>
+                              </a:rPr>
+                              <m:t>+</m:t>
+                            </m:r>
+                            <m:func>
+                              <m:funcPr>
+                                <m:ctrlPr>
+                                  <a:rPr lang="en-US" sz="1600" b="0" i="1" smtClean="0">
+                                    <a:latin typeface="Cambria Math" panose="02040503050406030204" pitchFamily="18" charset="0"/>
+                                  </a:rPr>
+                                </m:ctrlPr>
+                              </m:funcPr>
+                              <m:fName>
+                                <m:r>
+                                  <m:rPr>
+                                    <m:sty m:val="p"/>
+                                  </m:rPr>
+                                  <a:rPr lang="en-US" sz="1600" b="0" i="0" smtClean="0">
+                                    <a:latin typeface="Cambria Math" panose="02040503050406030204" pitchFamily="18" charset="0"/>
+                                  </a:rPr>
+                                  <m:t>sin</m:t>
+                                </m:r>
+                              </m:fName>
+                              <m:e>
+                                <m:d>
+                                  <m:dPr>
+                                    <m:ctrlPr>
+                                      <a:rPr lang="en-US" sz="1600" b="0" i="1" smtClean="0">
+                                        <a:latin typeface="Cambria Math" panose="02040503050406030204" pitchFamily="18" charset="0"/>
+                                      </a:rPr>
+                                    </m:ctrlPr>
+                                  </m:dPr>
+                                  <m:e>
+                                    <m:sSub>
+                                      <m:sSubPr>
+                                        <m:ctrlPr>
+                                          <a:rPr lang="en-US" sz="1600" b="0" i="1" smtClean="0">
+                                            <a:latin typeface="Cambria Math" panose="02040503050406030204" pitchFamily="18" charset="0"/>
+                                          </a:rPr>
+                                        </m:ctrlPr>
+                                      </m:sSubPr>
+                                      <m:e>
+                                        <m:r>
+                                          <a:rPr lang="en-US" sz="1600" b="0" i="1" smtClean="0">
+                                            <a:latin typeface="Cambria Math" panose="02040503050406030204" pitchFamily="18" charset="0"/>
+                                          </a:rPr>
+                                          <m:t>𝛼</m:t>
+                                        </m:r>
+                                      </m:e>
+                                      <m:sub>
+                                        <m:r>
+                                          <a:rPr lang="en-US" sz="1600" b="0" i="1" smtClean="0">
+                                            <a:latin typeface="Cambria Math" panose="02040503050406030204" pitchFamily="18" charset="0"/>
+                                          </a:rPr>
+                                          <m:t>𝑎</m:t>
+                                        </m:r>
+                                      </m:sub>
+                                    </m:sSub>
+                                  </m:e>
+                                </m:d>
+                                <m:sSub>
+                                  <m:sSubPr>
+                                    <m:ctrlPr>
+                                      <a:rPr lang="en-US" sz="1600" b="0" i="1" smtClean="0">
+                                        <a:latin typeface="Cambria Math" panose="02040503050406030204" pitchFamily="18" charset="0"/>
+                                      </a:rPr>
+                                    </m:ctrlPr>
+                                  </m:sSubPr>
+                                  <m:e>
+                                    <m:r>
+                                      <a:rPr lang="en-US" sz="1600" b="0" i="1" smtClean="0">
+                                        <a:latin typeface="Cambria Math" panose="02040503050406030204" pitchFamily="18" charset="0"/>
+                                      </a:rPr>
+                                      <m:t>𝑟</m:t>
+                                    </m:r>
+                                  </m:e>
+                                  <m:sub>
+                                    <m:r>
+                                      <a:rPr lang="en-US" sz="1600" b="0" i="1" smtClean="0">
+                                        <a:latin typeface="Cambria Math" panose="02040503050406030204" pitchFamily="18" charset="0"/>
+                                      </a:rPr>
+                                      <m:t>𝑎</m:t>
+                                    </m:r>
+                                  </m:sub>
+                                </m:sSub>
+                                <m:r>
+                                  <a:rPr lang="en-US" sz="1600" b="0" i="1" smtClean="0">
+                                    <a:latin typeface="Cambria Math" panose="02040503050406030204" pitchFamily="18" charset="0"/>
+                                  </a:rPr>
+                                  <m:t>)+ </m:t>
+                                </m:r>
+                              </m:e>
+                            </m:func>
+                          </m:e>
+                        </m:func>
+                      </m:e>
+                    </m:func>
+                    <m:f>
+                      <m:fPr>
+                        <m:ctrlPr>
+                          <a:rPr lang="en-US" sz="1600" b="0" i="1" smtClean="0">
+                            <a:latin typeface="Cambria Math" panose="02040503050406030204" pitchFamily="18" charset="0"/>
+                          </a:rPr>
+                        </m:ctrlPr>
+                      </m:fPr>
+                      <m:num>
+                        <m:sSub>
+                          <m:sSubPr>
+                            <m:ctrlPr>
+                              <a:rPr lang="en-US" sz="1600" b="0" i="1" smtClean="0">
+                                <a:latin typeface="Cambria Math" panose="02040503050406030204" pitchFamily="18" charset="0"/>
+                              </a:rPr>
+                            </m:ctrlPr>
+                          </m:sSubPr>
+                          <m:e>
+                            <m:sSub>
+                              <m:sSubPr>
+                                <m:ctrlPr>
+                                  <a:rPr lang="en-US" sz="1600" b="0" i="1" smtClean="0">
+                                    <a:latin typeface="Cambria Math" panose="02040503050406030204" pitchFamily="18" charset="0"/>
+                                  </a:rPr>
+                                </m:ctrlPr>
+                              </m:sSubPr>
+                              <m:e>
+                                <m:r>
+                                  <a:rPr lang="en-US" sz="1600" b="0" i="1" smtClean="0">
+                                    <a:latin typeface="Cambria Math" panose="02040503050406030204" pitchFamily="18" charset="0"/>
+                                  </a:rPr>
+                                  <m:t>{</m:t>
+                                </m:r>
+                                <m:r>
+                                  <a:rPr lang="en-US" sz="1600" b="0" i="1" smtClean="0">
+                                    <a:latin typeface="Cambria Math" panose="02040503050406030204" pitchFamily="18" charset="0"/>
+                                  </a:rPr>
+                                  <m:t>𝐹</m:t>
+                                </m:r>
+                              </m:e>
+                              <m:sub>
+                                <m:r>
+                                  <a:rPr lang="en-US" sz="1600" b="0" i="1" smtClean="0">
+                                    <a:latin typeface="Cambria Math" panose="02040503050406030204" pitchFamily="18" charset="0"/>
+                                  </a:rPr>
+                                  <m:t>𝑡𝑜𝑡</m:t>
+                                </m:r>
+                                <m:r>
+                                  <a:rPr lang="en-US" sz="1600" b="0" i="1" smtClean="0">
+                                    <a:latin typeface="Cambria Math" panose="02040503050406030204" pitchFamily="18" charset="0"/>
+                                  </a:rPr>
+                                  <m:t>,</m:t>
+                                </m:r>
+                                <m:r>
+                                  <a:rPr lang="en-US" sz="1600" b="0" i="1" smtClean="0">
+                                    <a:latin typeface="Cambria Math" panose="02040503050406030204" pitchFamily="18" charset="0"/>
+                                  </a:rPr>
+                                  <m:t>𝑧</m:t>
+                                </m:r>
+                              </m:sub>
+                            </m:sSub>
+                            <m:r>
+                              <a:rPr lang="en-US" sz="1600" b="0" i="1" smtClean="0">
+                                <a:latin typeface="Cambria Math" panose="02040503050406030204" pitchFamily="18" charset="0"/>
+                              </a:rPr>
+                              <m:t>}</m:t>
+                            </m:r>
+                          </m:e>
+                          <m:sub>
+                            <m:r>
+                              <a:rPr lang="en-US" sz="1600" b="0" i="1" smtClean="0">
+                                <a:latin typeface="Cambria Math" panose="02040503050406030204" pitchFamily="18" charset="0"/>
+                              </a:rPr>
+                              <m:t>𝐴</m:t>
+                            </m:r>
+                          </m:sub>
+                        </m:sSub>
+                      </m:num>
+                      <m:den>
+                        <m:sSub>
+                          <m:sSubPr>
+                            <m:ctrlPr>
+                              <a:rPr lang="en-US" sz="1600" b="0" i="1" smtClean="0">
+                                <a:latin typeface="Cambria Math" panose="02040503050406030204" pitchFamily="18" charset="0"/>
+                              </a:rPr>
+                            </m:ctrlPr>
+                          </m:sSubPr>
+                          <m:e>
+                            <m:r>
+                              <a:rPr lang="en-US" sz="1600" b="0" i="1" smtClean="0">
+                                <a:latin typeface="Cambria Math" panose="02040503050406030204" pitchFamily="18" charset="0"/>
+                              </a:rPr>
+                              <m:t>𝑚</m:t>
+                            </m:r>
+                          </m:e>
+                          <m:sub>
+                            <m:r>
+                              <a:rPr lang="en-US" sz="1600" b="0" i="1" smtClean="0">
+                                <a:latin typeface="Cambria Math" panose="02040503050406030204" pitchFamily="18" charset="0"/>
+                              </a:rPr>
+                              <m:t> </m:t>
+                            </m:r>
+                          </m:sub>
+                        </m:sSub>
+                        <m:sSub>
+                          <m:sSubPr>
+                            <m:ctrlPr>
+                              <a:rPr lang="en-US" sz="1600" b="0" i="1" smtClean="0">
+                                <a:latin typeface="Cambria Math" panose="02040503050406030204" pitchFamily="18" charset="0"/>
+                              </a:rPr>
+                            </m:ctrlPr>
+                          </m:sSubPr>
+                          <m:e>
+                            <m:r>
+                              <a:rPr lang="en-US" sz="1600" b="0" i="1" smtClean="0">
+                                <a:latin typeface="Cambria Math" panose="02040503050406030204" pitchFamily="18" charset="0"/>
+                              </a:rPr>
+                              <m:t>𝑣</m:t>
+                            </m:r>
+                          </m:e>
+                          <m:sub>
+                            <m:r>
+                              <a:rPr lang="en-US" sz="1600" b="0" i="1" smtClean="0">
+                                <a:latin typeface="Cambria Math" panose="02040503050406030204" pitchFamily="18" charset="0"/>
+                              </a:rPr>
+                              <m:t>𝑎</m:t>
+                            </m:r>
+                          </m:sub>
+                        </m:sSub>
+                        <m:func>
+                          <m:funcPr>
+                            <m:ctrlPr>
+                              <a:rPr lang="en-US" sz="1600" b="0" i="1" smtClean="0">
+                                <a:latin typeface="Cambria Math" panose="02040503050406030204" pitchFamily="18" charset="0"/>
+                              </a:rPr>
+                            </m:ctrlPr>
+                          </m:funcPr>
+                          <m:fName>
+                            <m:r>
+                              <m:rPr>
+                                <m:sty m:val="p"/>
+                              </m:rPr>
+                              <a:rPr lang="en-US" sz="1600" b="0" i="0" smtClean="0">
+                                <a:latin typeface="Cambria Math" panose="02040503050406030204" pitchFamily="18" charset="0"/>
+                              </a:rPr>
+                              <m:t>cos</m:t>
+                            </m:r>
+                          </m:fName>
+                          <m:e>
+                            <m:sSub>
+                              <m:sSubPr>
+                                <m:ctrlPr>
+                                  <a:rPr lang="en-US" sz="1600" b="0" i="1" smtClean="0">
+                                    <a:latin typeface="Cambria Math" panose="02040503050406030204" pitchFamily="18" charset="0"/>
+                                  </a:rPr>
+                                </m:ctrlPr>
+                              </m:sSubPr>
+                              <m:e>
+                                <m:r>
+                                  <a:rPr lang="en-US" sz="1600" b="0" i="1" smtClean="0">
+                                    <a:latin typeface="Cambria Math" panose="02040503050406030204" pitchFamily="18" charset="0"/>
+                                  </a:rPr>
+                                  <m:t>𝛽</m:t>
+                                </m:r>
+                              </m:e>
+                              <m:sub>
+                                <m:r>
+                                  <a:rPr lang="en-US" sz="1600" b="0" i="1" smtClean="0">
+                                    <a:latin typeface="Cambria Math" panose="02040503050406030204" pitchFamily="18" charset="0"/>
+                                  </a:rPr>
+                                  <m:t>𝑎</m:t>
+                                </m:r>
+                              </m:sub>
+                            </m:sSub>
+                          </m:e>
+                        </m:func>
+                      </m:den>
+                    </m:f>
+                  </m:oMath>
+                </a14:m>
+                <a:endParaRPr lang="en-US" sz="1600" dirty="0"/>
+              </a:p>
+              <a:p>
+                <a14:m>
+                  <m:oMath xmlns:m="http://schemas.openxmlformats.org/officeDocument/2006/math">
+                    <m:d>
+                      <m:dPr>
+                        <m:ctrlPr>
+                          <a:rPr lang="en-US" sz="1600" b="0" i="1" smtClean="0">
+                            <a:latin typeface="Cambria Math" panose="02040503050406030204" pitchFamily="18" charset="0"/>
+                          </a:rPr>
+                        </m:ctrlPr>
+                      </m:dPr>
+                      <m:e>
+                        <m:eqArr>
+                          <m:eqArrPr>
+                            <m:ctrlPr>
+                              <a:rPr lang="en-US" sz="1600" b="0" i="1" smtClean="0">
+                                <a:latin typeface="Cambria Math" panose="02040503050406030204" pitchFamily="18" charset="0"/>
+                              </a:rPr>
+                            </m:ctrlPr>
+                          </m:eqArrPr>
+                          <m:e>
+                            <m:sSub>
+                              <m:sSubPr>
+                                <m:ctrlPr>
+                                  <a:rPr lang="en-US" sz="1600" b="0" i="1" smtClean="0">
+                                    <a:latin typeface="Cambria Math" panose="02040503050406030204" pitchFamily="18" charset="0"/>
+                                  </a:rPr>
+                                </m:ctrlPr>
+                              </m:sSubPr>
+                              <m:e>
+                                <m:acc>
+                                  <m:accPr>
+                                    <m:chr m:val="̇"/>
+                                    <m:ctrlPr>
+                                      <a:rPr lang="en-US" sz="1600" b="0" i="1" smtClean="0">
+                                        <a:latin typeface="Cambria Math" panose="02040503050406030204" pitchFamily="18" charset="0"/>
+                                      </a:rPr>
+                                    </m:ctrlPr>
+                                  </m:accPr>
+                                  <m:e>
+                                    <m:r>
+                                      <a:rPr lang="en-US" sz="1600" b="0" i="1" smtClean="0">
+                                        <a:latin typeface="Cambria Math" panose="02040503050406030204" pitchFamily="18" charset="0"/>
+                                      </a:rPr>
+                                      <m:t>𝜙</m:t>
+                                    </m:r>
+                                  </m:e>
+                                </m:acc>
+                              </m:e>
+                              <m:sub>
+                                <m:r>
+                                  <a:rPr lang="en-US" sz="1600" b="0" i="1" smtClean="0">
+                                    <a:latin typeface="Cambria Math" panose="02040503050406030204" pitchFamily="18" charset="0"/>
+                                  </a:rPr>
+                                  <m:t>𝑡</m:t>
+                                </m:r>
+                              </m:sub>
+                            </m:sSub>
+                          </m:e>
+                          <m:e>
+                            <m:sSub>
+                              <m:sSubPr>
+                                <m:ctrlPr>
+                                  <a:rPr lang="en-US" sz="1600" b="0" i="1" smtClean="0">
+                                    <a:latin typeface="Cambria Math" panose="02040503050406030204" pitchFamily="18" charset="0"/>
+                                  </a:rPr>
+                                </m:ctrlPr>
+                              </m:sSubPr>
+                              <m:e>
+                                <m:acc>
+                                  <m:accPr>
+                                    <m:chr m:val="̇"/>
+                                    <m:ctrlPr>
+                                      <a:rPr lang="en-US" sz="1600" b="0" i="1" smtClean="0">
+                                        <a:latin typeface="Cambria Math" panose="02040503050406030204" pitchFamily="18" charset="0"/>
+                                      </a:rPr>
+                                    </m:ctrlPr>
+                                  </m:accPr>
+                                  <m:e>
+                                    <m:r>
+                                      <a:rPr lang="en-US" sz="1600" b="0" i="1" smtClean="0">
+                                        <a:latin typeface="Cambria Math" panose="02040503050406030204" pitchFamily="18" charset="0"/>
+                                      </a:rPr>
+                                      <m:t>𝜃</m:t>
+                                    </m:r>
+                                  </m:e>
+                                </m:acc>
+                              </m:e>
+                              <m:sub>
+                                <m:r>
+                                  <a:rPr lang="en-US" sz="1600" b="0" i="1" smtClean="0">
+                                    <a:latin typeface="Cambria Math" panose="02040503050406030204" pitchFamily="18" charset="0"/>
+                                  </a:rPr>
+                                  <m:t>𝑡</m:t>
+                                </m:r>
+                              </m:sub>
+                            </m:sSub>
+                          </m:e>
+                          <m:e>
+                            <m:sSub>
+                              <m:sSubPr>
+                                <m:ctrlPr>
+                                  <a:rPr lang="en-US" sz="1600" b="0" i="1" smtClean="0">
+                                    <a:latin typeface="Cambria Math" panose="02040503050406030204" pitchFamily="18" charset="0"/>
+                                  </a:rPr>
+                                </m:ctrlPr>
+                              </m:sSubPr>
+                              <m:e>
+                                <m:acc>
+                                  <m:accPr>
+                                    <m:chr m:val="̇"/>
+                                    <m:ctrlPr>
+                                      <a:rPr lang="en-US" sz="1600" b="0" i="1" smtClean="0">
+                                        <a:latin typeface="Cambria Math" panose="02040503050406030204" pitchFamily="18" charset="0"/>
+                                      </a:rPr>
+                                    </m:ctrlPr>
+                                  </m:accPr>
+                                  <m:e>
+                                    <m:r>
+                                      <a:rPr lang="en-US" sz="1600" b="0" i="1" smtClean="0">
+                                        <a:latin typeface="Cambria Math" panose="02040503050406030204" pitchFamily="18" charset="0"/>
+                                      </a:rPr>
+                                      <m:t>𝜓</m:t>
+                                    </m:r>
+                                  </m:e>
+                                </m:acc>
+                              </m:e>
+                              <m:sub>
+                                <m:r>
+                                  <a:rPr lang="en-US" sz="1600" b="0" i="1" smtClean="0">
+                                    <a:latin typeface="Cambria Math" panose="02040503050406030204" pitchFamily="18" charset="0"/>
+                                  </a:rPr>
+                                  <m:t>𝑡</m:t>
+                                </m:r>
+                              </m:sub>
+                            </m:sSub>
+                          </m:e>
+                        </m:eqArr>
+                      </m:e>
+                    </m:d>
+                    <m:r>
+                      <a:rPr lang="en-US" sz="1600" b="0" i="0" smtClean="0">
+                        <a:latin typeface="Cambria Math" panose="02040503050406030204" pitchFamily="18" charset="0"/>
+                      </a:rPr>
+                      <m:t>=</m:t>
+                    </m:r>
+                    <m:d>
+                      <m:dPr>
+                        <m:ctrlPr>
+                          <a:rPr lang="en-US" sz="1600" b="0" i="1" smtClean="0">
+                            <a:latin typeface="Cambria Math" panose="02040503050406030204" pitchFamily="18" charset="0"/>
+                          </a:rPr>
+                        </m:ctrlPr>
+                      </m:dPr>
+                      <m:e>
+                        <m:m>
+                          <m:mPr>
+                            <m:mcs>
+                              <m:mc>
+                                <m:mcPr>
+                                  <m:count m:val="3"/>
+                                  <m:mcJc m:val="center"/>
+                                </m:mcPr>
+                              </m:mc>
+                            </m:mcs>
+                            <m:ctrlPr>
+                              <a:rPr lang="en-US" sz="1600" b="0" i="1" smtClean="0">
+                                <a:latin typeface="Cambria Math" panose="02040503050406030204" pitchFamily="18" charset="0"/>
+                              </a:rPr>
+                            </m:ctrlPr>
+                          </m:mPr>
+                          <m:mr>
+                            <m:e>
+                              <m:r>
+                                <m:rPr>
+                                  <m:brk m:alnAt="7"/>
+                                </m:rPr>
+                                <a:rPr lang="en-US" sz="1600" b="0" i="1" smtClean="0">
+                                  <a:latin typeface="Cambria Math" panose="02040503050406030204" pitchFamily="18" charset="0"/>
+                                </a:rPr>
+                                <m:t>1</m:t>
+                              </m:r>
+                            </m:e>
+                            <m:e>
+                              <m:func>
+                                <m:funcPr>
+                                  <m:ctrlPr>
+                                    <a:rPr lang="en-US" sz="1600" b="0" i="1" smtClean="0">
+                                      <a:latin typeface="Cambria Math" panose="02040503050406030204" pitchFamily="18" charset="0"/>
+                                    </a:rPr>
+                                  </m:ctrlPr>
+                                </m:funcPr>
+                                <m:fName>
+                                  <m:r>
+                                    <m:rPr>
+                                      <m:sty m:val="p"/>
+                                    </m:rPr>
+                                    <a:rPr lang="en-US" sz="1600" b="0" i="0" smtClean="0">
+                                      <a:latin typeface="Cambria Math" panose="02040503050406030204" pitchFamily="18" charset="0"/>
+                                    </a:rPr>
+                                    <m:t>sin</m:t>
+                                  </m:r>
+                                </m:fName>
+                                <m:e>
+                                  <m:sSub>
+                                    <m:sSubPr>
+                                      <m:ctrlPr>
+                                        <a:rPr lang="en-US" sz="1600" b="0" i="1" smtClean="0">
+                                          <a:latin typeface="Cambria Math" panose="02040503050406030204" pitchFamily="18" charset="0"/>
+                                        </a:rPr>
+                                      </m:ctrlPr>
+                                    </m:sSubPr>
+                                    <m:e>
+                                      <m:r>
+                                        <a:rPr lang="en-US" sz="1600" b="0" i="1" smtClean="0">
+                                          <a:latin typeface="Cambria Math" panose="02040503050406030204" pitchFamily="18" charset="0"/>
+                                        </a:rPr>
+                                        <m:t>𝜓</m:t>
+                                      </m:r>
+                                    </m:e>
+                                    <m:sub>
+                                      <m:r>
+                                        <a:rPr lang="en-US" sz="1600" b="0" i="1" smtClean="0">
+                                          <a:latin typeface="Cambria Math" panose="02040503050406030204" pitchFamily="18" charset="0"/>
+                                        </a:rPr>
+                                        <m:t>𝑡</m:t>
+                                      </m:r>
+                                    </m:sub>
+                                  </m:sSub>
+                                </m:e>
+                              </m:func>
+                              <m:r>
+                                <m:rPr>
+                                  <m:sty m:val="p"/>
+                                </m:rPr>
+                                <a:rPr lang="en-US" sz="1600" b="0" i="0" smtClean="0">
+                                  <a:latin typeface="Cambria Math" panose="02040503050406030204" pitchFamily="18" charset="0"/>
+                                </a:rPr>
+                                <m:t>tan</m:t>
+                              </m:r>
+                              <m:r>
+                                <a:rPr lang="en-US" sz="1600" b="0" i="1" smtClean="0">
+                                  <a:latin typeface="Cambria Math" panose="02040503050406030204" pitchFamily="18" charset="0"/>
+                                </a:rPr>
+                                <m:t>⁡</m:t>
+                              </m:r>
+                              <m:sSub>
+                                <m:sSubPr>
+                                  <m:ctrlPr>
+                                    <a:rPr lang="en-US" sz="1600" b="0" i="1" smtClean="0">
+                                      <a:latin typeface="Cambria Math" panose="02040503050406030204" pitchFamily="18" charset="0"/>
+                                    </a:rPr>
+                                  </m:ctrlPr>
+                                </m:sSubPr>
+                                <m:e>
+                                  <m:r>
+                                    <a:rPr lang="en-US" sz="1600" b="0" i="1" smtClean="0">
+                                      <a:latin typeface="Cambria Math" panose="02040503050406030204" pitchFamily="18" charset="0"/>
+                                    </a:rPr>
+                                    <m:t>𝜃</m:t>
+                                  </m:r>
+                                </m:e>
+                                <m:sub>
+                                  <m:r>
+                                    <a:rPr lang="en-US" sz="1600" b="0" i="1" smtClean="0">
+                                      <a:latin typeface="Cambria Math" panose="02040503050406030204" pitchFamily="18" charset="0"/>
+                                    </a:rPr>
+                                    <m:t>𝑡</m:t>
+                                  </m:r>
+                                </m:sub>
+                              </m:sSub>
+                            </m:e>
+                            <m:e>
+                              <m:func>
+                                <m:funcPr>
+                                  <m:ctrlPr>
+                                    <a:rPr lang="en-US" sz="1600" b="0" i="1" smtClean="0">
+                                      <a:latin typeface="Cambria Math" panose="02040503050406030204" pitchFamily="18" charset="0"/>
+                                    </a:rPr>
+                                  </m:ctrlPr>
+                                </m:funcPr>
+                                <m:fName>
+                                  <m:r>
+                                    <m:rPr>
+                                      <m:sty m:val="p"/>
+                                    </m:rPr>
+                                    <a:rPr lang="en-US" sz="1600" b="0" i="0" smtClean="0">
+                                      <a:latin typeface="Cambria Math" panose="02040503050406030204" pitchFamily="18" charset="0"/>
+                                    </a:rPr>
+                                    <m:t>cos</m:t>
+                                  </m:r>
+                                </m:fName>
+                                <m:e>
+                                  <m:sSub>
+                                    <m:sSubPr>
+                                      <m:ctrlPr>
+                                        <a:rPr lang="en-US" sz="1600" b="0" i="1" smtClean="0">
+                                          <a:latin typeface="Cambria Math" panose="02040503050406030204" pitchFamily="18" charset="0"/>
+                                        </a:rPr>
+                                      </m:ctrlPr>
+                                    </m:sSubPr>
+                                    <m:e>
+                                      <m:r>
+                                        <a:rPr lang="en-US" sz="1600" b="0" i="1" smtClean="0">
+                                          <a:latin typeface="Cambria Math" panose="02040503050406030204" pitchFamily="18" charset="0"/>
+                                        </a:rPr>
+                                        <m:t>𝜙</m:t>
+                                      </m:r>
+                                    </m:e>
+                                    <m:sub>
+                                      <m:r>
+                                        <a:rPr lang="en-US" sz="1600" b="0" i="1" smtClean="0">
+                                          <a:latin typeface="Cambria Math" panose="02040503050406030204" pitchFamily="18" charset="0"/>
+                                        </a:rPr>
+                                        <m:t>𝑡</m:t>
+                                      </m:r>
+                                    </m:sub>
+                                  </m:sSub>
+                                  <m:func>
+                                    <m:funcPr>
+                                      <m:ctrlPr>
+                                        <a:rPr lang="en-US" sz="1600" b="0" i="1" smtClean="0">
+                                          <a:latin typeface="Cambria Math" panose="02040503050406030204" pitchFamily="18" charset="0"/>
+                                        </a:rPr>
+                                      </m:ctrlPr>
+                                    </m:funcPr>
+                                    <m:fName>
+                                      <m:r>
+                                        <m:rPr>
+                                          <m:sty m:val="p"/>
+                                        </m:rPr>
+                                        <a:rPr lang="en-US" sz="1600" b="0" i="0" smtClean="0">
+                                          <a:latin typeface="Cambria Math" panose="02040503050406030204" pitchFamily="18" charset="0"/>
+                                        </a:rPr>
+                                        <m:t>tan</m:t>
+                                      </m:r>
+                                    </m:fName>
+                                    <m:e>
+                                      <m:sSub>
+                                        <m:sSubPr>
+                                          <m:ctrlPr>
+                                            <a:rPr lang="en-US" sz="1600" b="0" i="1" smtClean="0">
+                                              <a:latin typeface="Cambria Math" panose="02040503050406030204" pitchFamily="18" charset="0"/>
+                                            </a:rPr>
+                                          </m:ctrlPr>
+                                        </m:sSubPr>
+                                        <m:e>
+                                          <m:r>
+                                            <a:rPr lang="en-US" sz="1600" b="0" i="1" smtClean="0">
+                                              <a:latin typeface="Cambria Math" panose="02040503050406030204" pitchFamily="18" charset="0"/>
+                                            </a:rPr>
+                                            <m:t>𝜃</m:t>
+                                          </m:r>
+                                        </m:e>
+                                        <m:sub>
+                                          <m:r>
+                                            <a:rPr lang="en-US" sz="1600" b="0" i="1" smtClean="0">
+                                              <a:latin typeface="Cambria Math" panose="02040503050406030204" pitchFamily="18" charset="0"/>
+                                            </a:rPr>
+                                            <m:t>𝑡</m:t>
+                                          </m:r>
+                                        </m:sub>
+                                      </m:sSub>
+                                    </m:e>
+                                  </m:func>
+                                </m:e>
+                              </m:func>
+                            </m:e>
+                          </m:mr>
+                          <m:mr>
+                            <m:e>
+                              <m:r>
+                                <a:rPr lang="en-US" sz="1600" b="0" i="1" smtClean="0">
+                                  <a:latin typeface="Cambria Math" panose="02040503050406030204" pitchFamily="18" charset="0"/>
+                                </a:rPr>
+                                <m:t>0</m:t>
+                              </m:r>
+                            </m:e>
+                            <m:e>
+                              <m:func>
+                                <m:funcPr>
+                                  <m:ctrlPr>
+                                    <a:rPr lang="en-US" sz="1600" b="0" i="1" smtClean="0">
+                                      <a:latin typeface="Cambria Math" panose="02040503050406030204" pitchFamily="18" charset="0"/>
+                                    </a:rPr>
+                                  </m:ctrlPr>
+                                </m:funcPr>
+                                <m:fName>
+                                  <m:r>
+                                    <m:rPr>
+                                      <m:sty m:val="p"/>
+                                    </m:rPr>
+                                    <a:rPr lang="en-US" sz="1600" b="0" i="0" smtClean="0">
+                                      <a:latin typeface="Cambria Math" panose="02040503050406030204" pitchFamily="18" charset="0"/>
+                                    </a:rPr>
+                                    <m:t>cos</m:t>
+                                  </m:r>
+                                </m:fName>
+                                <m:e>
+                                  <m:sSub>
+                                    <m:sSubPr>
+                                      <m:ctrlPr>
+                                        <a:rPr lang="en-US" sz="1600" b="0" i="1" smtClean="0">
+                                          <a:latin typeface="Cambria Math" panose="02040503050406030204" pitchFamily="18" charset="0"/>
+                                        </a:rPr>
+                                      </m:ctrlPr>
+                                    </m:sSubPr>
+                                    <m:e>
+                                      <m:r>
+                                        <a:rPr lang="en-US" sz="1600" b="0" i="1" smtClean="0">
+                                          <a:latin typeface="Cambria Math" panose="02040503050406030204" pitchFamily="18" charset="0"/>
+                                        </a:rPr>
+                                        <m:t>𝜙</m:t>
+                                      </m:r>
+                                    </m:e>
+                                    <m:sub>
+                                      <m:r>
+                                        <a:rPr lang="en-US" sz="1600" b="0" i="1" smtClean="0">
+                                          <a:latin typeface="Cambria Math" panose="02040503050406030204" pitchFamily="18" charset="0"/>
+                                        </a:rPr>
+                                        <m:t>𝑡</m:t>
+                                      </m:r>
+                                    </m:sub>
+                                  </m:sSub>
+                                </m:e>
+                              </m:func>
+                            </m:e>
+                            <m:e>
+                              <m:r>
+                                <a:rPr lang="en-US" sz="1600" b="0" i="1" smtClean="0">
+                                  <a:latin typeface="Cambria Math" panose="02040503050406030204" pitchFamily="18" charset="0"/>
+                                </a:rPr>
+                                <m:t>−</m:t>
+                              </m:r>
+                              <m:func>
+                                <m:funcPr>
+                                  <m:ctrlPr>
+                                    <a:rPr lang="en-US" sz="1600" b="0" i="1" smtClean="0">
+                                      <a:latin typeface="Cambria Math" panose="02040503050406030204" pitchFamily="18" charset="0"/>
+                                    </a:rPr>
+                                  </m:ctrlPr>
+                                </m:funcPr>
+                                <m:fName>
+                                  <m:r>
+                                    <m:rPr>
+                                      <m:sty m:val="p"/>
+                                    </m:rPr>
+                                    <a:rPr lang="en-US" sz="1600" b="0" i="0" smtClean="0">
+                                      <a:latin typeface="Cambria Math" panose="02040503050406030204" pitchFamily="18" charset="0"/>
+                                    </a:rPr>
+                                    <m:t>sin</m:t>
+                                  </m:r>
+                                </m:fName>
+                                <m:e>
+                                  <m:sSub>
+                                    <m:sSubPr>
+                                      <m:ctrlPr>
+                                        <a:rPr lang="en-US" sz="1600" b="0" i="1" smtClean="0">
+                                          <a:latin typeface="Cambria Math" panose="02040503050406030204" pitchFamily="18" charset="0"/>
+                                        </a:rPr>
+                                      </m:ctrlPr>
+                                    </m:sSubPr>
+                                    <m:e>
+                                      <m:r>
+                                        <a:rPr lang="en-US" sz="1600" b="0" i="1" smtClean="0">
+                                          <a:latin typeface="Cambria Math" panose="02040503050406030204" pitchFamily="18" charset="0"/>
+                                        </a:rPr>
+                                        <m:t>𝜙</m:t>
+                                      </m:r>
+                                    </m:e>
+                                    <m:sub>
+                                      <m:r>
+                                        <a:rPr lang="en-US" sz="1600" b="0" i="1" smtClean="0">
+                                          <a:latin typeface="Cambria Math" panose="02040503050406030204" pitchFamily="18" charset="0"/>
+                                        </a:rPr>
+                                        <m:t>𝑡</m:t>
+                                      </m:r>
+                                    </m:sub>
+                                  </m:sSub>
+                                </m:e>
+                              </m:func>
+                            </m:e>
+                          </m:mr>
+                          <m:mr>
+                            <m:e>
+                              <m:r>
+                                <a:rPr lang="en-US" sz="1600" b="0" i="1" smtClean="0">
+                                  <a:latin typeface="Cambria Math" panose="02040503050406030204" pitchFamily="18" charset="0"/>
+                                </a:rPr>
+                                <m:t>0</m:t>
+                              </m:r>
+                            </m:e>
+                            <m:e>
+                              <m:f>
+                                <m:fPr>
+                                  <m:ctrlPr>
+                                    <a:rPr lang="en-US" sz="1600" b="0" i="1" smtClean="0">
+                                      <a:latin typeface="Cambria Math" panose="02040503050406030204" pitchFamily="18" charset="0"/>
+                                    </a:rPr>
+                                  </m:ctrlPr>
+                                </m:fPr>
+                                <m:num>
+                                  <m:func>
+                                    <m:funcPr>
+                                      <m:ctrlPr>
+                                        <a:rPr lang="en-US" sz="1600" b="0" i="1" smtClean="0">
+                                          <a:latin typeface="Cambria Math" panose="02040503050406030204" pitchFamily="18" charset="0"/>
+                                        </a:rPr>
+                                      </m:ctrlPr>
+                                    </m:funcPr>
+                                    <m:fName>
+                                      <m:r>
+                                        <m:rPr>
+                                          <m:sty m:val="p"/>
+                                        </m:rPr>
+                                        <a:rPr lang="en-US" sz="1600" b="0" i="0" smtClean="0">
+                                          <a:latin typeface="Cambria Math" panose="02040503050406030204" pitchFamily="18" charset="0"/>
+                                        </a:rPr>
+                                        <m:t>sin</m:t>
+                                      </m:r>
+                                    </m:fName>
+                                    <m:e>
+                                      <m:sSub>
+                                        <m:sSubPr>
+                                          <m:ctrlPr>
+                                            <a:rPr lang="en-US" sz="1600" b="0" i="1" smtClean="0">
+                                              <a:latin typeface="Cambria Math" panose="02040503050406030204" pitchFamily="18" charset="0"/>
+                                            </a:rPr>
+                                          </m:ctrlPr>
+                                        </m:sSubPr>
+                                        <m:e>
+                                          <m:r>
+                                            <a:rPr lang="en-US" sz="1600" b="0" i="1" smtClean="0">
+                                              <a:latin typeface="Cambria Math" panose="02040503050406030204" pitchFamily="18" charset="0"/>
+                                            </a:rPr>
+                                            <m:t>𝜙</m:t>
+                                          </m:r>
+                                        </m:e>
+                                        <m:sub>
+                                          <m:r>
+                                            <a:rPr lang="en-US" sz="1600" b="0" i="1" smtClean="0">
+                                              <a:latin typeface="Cambria Math" panose="02040503050406030204" pitchFamily="18" charset="0"/>
+                                            </a:rPr>
+                                            <m:t>𝑡</m:t>
+                                          </m:r>
+                                        </m:sub>
+                                      </m:sSub>
+                                    </m:e>
+                                  </m:func>
+                                </m:num>
+                                <m:den>
+                                  <m:func>
+                                    <m:funcPr>
+                                      <m:ctrlPr>
+                                        <a:rPr lang="en-US" sz="1600" b="0" i="1" smtClean="0">
+                                          <a:latin typeface="Cambria Math" panose="02040503050406030204" pitchFamily="18" charset="0"/>
+                                        </a:rPr>
+                                      </m:ctrlPr>
+                                    </m:funcPr>
+                                    <m:fName>
+                                      <m:r>
+                                        <m:rPr>
+                                          <m:sty m:val="p"/>
+                                        </m:rPr>
+                                        <a:rPr lang="en-US" sz="1600" b="0" i="0" smtClean="0">
+                                          <a:latin typeface="Cambria Math" panose="02040503050406030204" pitchFamily="18" charset="0"/>
+                                        </a:rPr>
+                                        <m:t>cos</m:t>
+                                      </m:r>
+                                    </m:fName>
+                                    <m:e>
+                                      <m:sSub>
+                                        <m:sSubPr>
+                                          <m:ctrlPr>
+                                            <a:rPr lang="en-US" sz="1600" b="0" i="1" smtClean="0">
+                                              <a:latin typeface="Cambria Math" panose="02040503050406030204" pitchFamily="18" charset="0"/>
+                                            </a:rPr>
+                                          </m:ctrlPr>
+                                        </m:sSubPr>
+                                        <m:e>
+                                          <m:r>
+                                            <a:rPr lang="en-US" sz="1600" b="0" i="1" smtClean="0">
+                                              <a:latin typeface="Cambria Math" panose="02040503050406030204" pitchFamily="18" charset="0"/>
+                                            </a:rPr>
+                                            <m:t>𝜃</m:t>
+                                          </m:r>
+                                        </m:e>
+                                        <m:sub>
+                                          <m:r>
+                                            <a:rPr lang="en-US" sz="1600" b="0" i="1" smtClean="0">
+                                              <a:latin typeface="Cambria Math" panose="02040503050406030204" pitchFamily="18" charset="0"/>
+                                            </a:rPr>
+                                            <m:t>𝑡</m:t>
+                                          </m:r>
+                                        </m:sub>
+                                      </m:sSub>
+                                    </m:e>
+                                  </m:func>
+                                </m:den>
+                              </m:f>
+                            </m:e>
+                            <m:e>
+                              <m:f>
+                                <m:fPr>
+                                  <m:ctrlPr>
+                                    <a:rPr lang="en-US" sz="1600" b="0" i="1" smtClean="0">
+                                      <a:latin typeface="Cambria Math" panose="02040503050406030204" pitchFamily="18" charset="0"/>
+                                    </a:rPr>
+                                  </m:ctrlPr>
+                                </m:fPr>
+                                <m:num>
+                                  <m:func>
+                                    <m:funcPr>
+                                      <m:ctrlPr>
+                                        <a:rPr lang="en-US" sz="1600" b="0" i="1" smtClean="0">
+                                          <a:latin typeface="Cambria Math" panose="02040503050406030204" pitchFamily="18" charset="0"/>
+                                        </a:rPr>
+                                      </m:ctrlPr>
+                                    </m:funcPr>
+                                    <m:fName>
+                                      <m:r>
+                                        <m:rPr>
+                                          <m:sty m:val="p"/>
+                                        </m:rPr>
+                                        <a:rPr lang="en-US" sz="1600" b="0" i="0" smtClean="0">
+                                          <a:latin typeface="Cambria Math" panose="02040503050406030204" pitchFamily="18" charset="0"/>
+                                        </a:rPr>
+                                        <m:t>cos</m:t>
+                                      </m:r>
+                                    </m:fName>
+                                    <m:e>
+                                      <m:sSub>
+                                        <m:sSubPr>
+                                          <m:ctrlPr>
+                                            <a:rPr lang="en-US" sz="1600" b="0" i="1" smtClean="0">
+                                              <a:latin typeface="Cambria Math" panose="02040503050406030204" pitchFamily="18" charset="0"/>
+                                            </a:rPr>
+                                          </m:ctrlPr>
+                                        </m:sSubPr>
+                                        <m:e>
+                                          <m:r>
+                                            <a:rPr lang="en-US" sz="1600" b="0" i="1" smtClean="0">
+                                              <a:latin typeface="Cambria Math" panose="02040503050406030204" pitchFamily="18" charset="0"/>
+                                            </a:rPr>
+                                            <m:t>𝜙</m:t>
+                                          </m:r>
+                                        </m:e>
+                                        <m:sub>
+                                          <m:r>
+                                            <a:rPr lang="en-US" sz="1600" b="0" i="1" smtClean="0">
+                                              <a:latin typeface="Cambria Math" panose="02040503050406030204" pitchFamily="18" charset="0"/>
+                                            </a:rPr>
+                                            <m:t>𝑡</m:t>
+                                          </m:r>
+                                        </m:sub>
+                                      </m:sSub>
+                                    </m:e>
+                                  </m:func>
+                                </m:num>
+                                <m:den>
+                                  <m:func>
+                                    <m:funcPr>
+                                      <m:ctrlPr>
+                                        <a:rPr lang="en-US" sz="1600" b="0" i="1" smtClean="0">
+                                          <a:latin typeface="Cambria Math" panose="02040503050406030204" pitchFamily="18" charset="0"/>
+                                        </a:rPr>
+                                      </m:ctrlPr>
+                                    </m:funcPr>
+                                    <m:fName>
+                                      <m:r>
+                                        <m:rPr>
+                                          <m:sty m:val="p"/>
+                                        </m:rPr>
+                                        <a:rPr lang="en-US" sz="1600" b="0" i="0" smtClean="0">
+                                          <a:latin typeface="Cambria Math" panose="02040503050406030204" pitchFamily="18" charset="0"/>
+                                        </a:rPr>
+                                        <m:t>cos</m:t>
+                                      </m:r>
+                                    </m:fName>
+                                    <m:e>
+                                      <m:sSub>
+                                        <m:sSubPr>
+                                          <m:ctrlPr>
+                                            <a:rPr lang="en-US" sz="1600" b="0" i="1" smtClean="0">
+                                              <a:latin typeface="Cambria Math" panose="02040503050406030204" pitchFamily="18" charset="0"/>
+                                            </a:rPr>
+                                          </m:ctrlPr>
+                                        </m:sSubPr>
+                                        <m:e>
+                                          <m:r>
+                                            <a:rPr lang="en-US" sz="1600" b="0" i="1" smtClean="0">
+                                              <a:latin typeface="Cambria Math" panose="02040503050406030204" pitchFamily="18" charset="0"/>
+                                            </a:rPr>
+                                            <m:t>𝜃</m:t>
+                                          </m:r>
+                                        </m:e>
+                                        <m:sub>
+                                          <m:r>
+                                            <a:rPr lang="en-US" sz="1600" b="0" i="1" smtClean="0">
+                                              <a:latin typeface="Cambria Math" panose="02040503050406030204" pitchFamily="18" charset="0"/>
+                                            </a:rPr>
+                                            <m:t>𝑡</m:t>
+                                          </m:r>
+                                        </m:sub>
+                                      </m:sSub>
+                                    </m:e>
+                                  </m:func>
+                                </m:den>
+                              </m:f>
+                            </m:e>
+                          </m:mr>
+                        </m:m>
+                      </m:e>
+                    </m:d>
+                    <m:sSub>
+                      <m:sSubPr>
+                        <m:ctrlPr>
+                          <a:rPr lang="en-US" sz="1600" b="0" i="1" smtClean="0">
+                            <a:latin typeface="Cambria Math" panose="02040503050406030204" pitchFamily="18" charset="0"/>
+                          </a:rPr>
+                        </m:ctrlPr>
+                      </m:sSubPr>
+                      <m:e>
+                        <m:r>
+                          <a:rPr lang="en-US" sz="1600" b="0" i="0" smtClean="0">
+                            <a:latin typeface="Cambria Math" panose="02040503050406030204" pitchFamily="18" charset="0"/>
+                          </a:rPr>
+                          <m:t>(</m:t>
+                        </m:r>
+                        <m:d>
+                          <m:dPr>
+                            <m:begChr m:val="{"/>
+                            <m:endChr m:val="}"/>
+                            <m:ctrlPr>
+                              <a:rPr lang="en-US" sz="1600" b="0" i="1" smtClean="0">
+                                <a:latin typeface="Cambria Math" panose="02040503050406030204" pitchFamily="18" charset="0"/>
+                              </a:rPr>
+                            </m:ctrlPr>
+                          </m:dPr>
+                          <m:e>
+                            <m:sSup>
+                              <m:sSupPr>
+                                <m:ctrlPr>
+                                  <a:rPr lang="en-US" sz="1600" b="0" i="1" smtClean="0">
+                                    <a:latin typeface="Cambria Math" panose="02040503050406030204" pitchFamily="18" charset="0"/>
+                                  </a:rPr>
+                                </m:ctrlPr>
+                              </m:sSupPr>
+                              <m:e>
+                                <m:r>
+                                  <a:rPr lang="en-US" sz="1600" b="0" i="1" smtClean="0">
+                                    <a:latin typeface="Cambria Math" panose="02040503050406030204" pitchFamily="18" charset="0"/>
+                                  </a:rPr>
+                                  <m:t>𝜔</m:t>
+                                </m:r>
+                              </m:e>
+                              <m:sup>
+                                <m:r>
+                                  <a:rPr lang="en-US" sz="1600" b="0" i="1" smtClean="0">
+                                    <a:latin typeface="Cambria Math" panose="02040503050406030204" pitchFamily="18" charset="0"/>
+                                  </a:rPr>
+                                  <m:t>𝐵𝑂</m:t>
+                                </m:r>
+                              </m:sup>
+                            </m:sSup>
+                          </m:e>
+                        </m:d>
+                      </m:e>
+                      <m:sub>
+                        <m:r>
+                          <m:rPr>
+                            <m:sty m:val="p"/>
+                          </m:rPr>
+                          <a:rPr lang="en-US" sz="1600" b="0" i="0" smtClean="0">
+                            <a:latin typeface="Cambria Math" panose="02040503050406030204" pitchFamily="18" charset="0"/>
+                          </a:rPr>
+                          <m:t>B</m:t>
+                        </m:r>
+                      </m:sub>
+                    </m:sSub>
+                    <m:r>
+                      <a:rPr lang="en-US" sz="1600" b="0" i="0" smtClean="0">
+                        <a:latin typeface="Cambria Math" panose="02040503050406030204" pitchFamily="18" charset="0"/>
+                      </a:rPr>
+                      <m:t>−</m:t>
+                    </m:r>
+                    <m:sSup>
+                      <m:sSupPr>
+                        <m:ctrlPr>
+                          <a:rPr lang="en-US" sz="1600" b="0" i="1" smtClean="0">
+                            <a:latin typeface="Cambria Math" panose="02040503050406030204" pitchFamily="18" charset="0"/>
+                          </a:rPr>
+                        </m:ctrlPr>
+                      </m:sSupPr>
+                      <m:e>
+                        <m:d>
+                          <m:dPr>
+                            <m:begChr m:val="["/>
+                            <m:endChr m:val="]"/>
+                            <m:ctrlPr>
+                              <a:rPr lang="en-US" sz="1600" b="0" i="1" smtClean="0">
+                                <a:latin typeface="Cambria Math" panose="02040503050406030204" pitchFamily="18" charset="0"/>
+                              </a:rPr>
+                            </m:ctrlPr>
+                          </m:dPr>
+                          <m:e>
+                            <m:r>
+                              <m:rPr>
+                                <m:sty m:val="p"/>
+                              </m:rPr>
+                              <a:rPr lang="en-US" sz="1600" b="0" i="0" smtClean="0">
+                                <a:latin typeface="Cambria Math" panose="02040503050406030204" pitchFamily="18" charset="0"/>
+                              </a:rPr>
+                              <m:t>c</m:t>
+                            </m:r>
+                          </m:e>
+                        </m:d>
+                      </m:e>
+                      <m:sup>
+                        <m:r>
+                          <m:rPr>
+                            <m:sty m:val="p"/>
+                          </m:rPr>
+                          <a:rPr lang="en-US" sz="1600" b="0" i="0" smtClean="0">
+                            <a:latin typeface="Cambria Math" panose="02040503050406030204" pitchFamily="18" charset="0"/>
+                          </a:rPr>
+                          <m:t>Bt</m:t>
+                        </m:r>
+                      </m:sup>
+                    </m:sSup>
+                    <m:d>
+                      <m:dPr>
+                        <m:ctrlPr>
+                          <a:rPr lang="en-US" sz="1600" b="0" i="1" smtClean="0">
+                            <a:latin typeface="Cambria Math" panose="02040503050406030204" pitchFamily="18" charset="0"/>
+                          </a:rPr>
+                        </m:ctrlPr>
+                      </m:dPr>
+                      <m:e>
+                        <m:eqArr>
+                          <m:eqArrPr>
+                            <m:ctrlPr>
+                              <a:rPr lang="en-US" sz="1600" b="0" i="1" smtClean="0">
+                                <a:latin typeface="Cambria Math" panose="02040503050406030204" pitchFamily="18" charset="0"/>
+                              </a:rPr>
+                            </m:ctrlPr>
+                          </m:eqArrPr>
+                          <m:e>
+                            <m:acc>
+                              <m:accPr>
+                                <m:chr m:val="̇"/>
+                                <m:ctrlPr>
+                                  <a:rPr lang="en-US" sz="1600" b="0" i="1" smtClean="0">
+                                    <a:latin typeface="Cambria Math" panose="02040503050406030204" pitchFamily="18" charset="0"/>
+                                  </a:rPr>
+                                </m:ctrlPr>
+                              </m:accPr>
+                              <m:e>
+                                <m:r>
+                                  <a:rPr lang="en-US" sz="1600" b="0" i="1" smtClean="0">
+                                    <a:latin typeface="Cambria Math" panose="02040503050406030204" pitchFamily="18" charset="0"/>
+                                  </a:rPr>
+                                  <m:t>𝜆</m:t>
+                                </m:r>
+                              </m:e>
+                            </m:acc>
+                            <m:func>
+                              <m:funcPr>
+                                <m:ctrlPr>
+                                  <a:rPr lang="en-US" sz="1600" b="0" i="1" smtClean="0">
+                                    <a:latin typeface="Cambria Math" panose="02040503050406030204" pitchFamily="18" charset="0"/>
+                                  </a:rPr>
+                                </m:ctrlPr>
+                              </m:funcPr>
+                              <m:fName>
+                                <m:r>
+                                  <m:rPr>
+                                    <m:sty m:val="p"/>
+                                  </m:rPr>
+                                  <a:rPr lang="en-US" sz="1600" b="0" i="0" smtClean="0">
+                                    <a:latin typeface="Cambria Math" panose="02040503050406030204" pitchFamily="18" charset="0"/>
+                                  </a:rPr>
+                                  <m:t>cos</m:t>
+                                </m:r>
+                              </m:fName>
+                              <m:e>
+                                <m:r>
+                                  <m:rPr>
+                                    <m:sty m:val="p"/>
+                                  </m:rPr>
+                                  <a:rPr lang="en-US" sz="1600" b="0" i="0" smtClean="0">
+                                    <a:latin typeface="Cambria Math" panose="02040503050406030204" pitchFamily="18" charset="0"/>
+                                  </a:rPr>
+                                  <m:t>ϕ</m:t>
+                                </m:r>
+                              </m:e>
+                            </m:func>
+                          </m:e>
+                          <m:e>
+                            <m:r>
+                              <a:rPr lang="en-US" sz="1600" b="0" i="1" smtClean="0">
+                                <a:latin typeface="Cambria Math" panose="02040503050406030204" pitchFamily="18" charset="0"/>
+                              </a:rPr>
+                              <m:t>−</m:t>
+                            </m:r>
+                            <m:acc>
+                              <m:accPr>
+                                <m:chr m:val="̇"/>
+                                <m:ctrlPr>
+                                  <a:rPr lang="en-US" sz="1600" b="0" i="1" smtClean="0">
+                                    <a:latin typeface="Cambria Math" panose="02040503050406030204" pitchFamily="18" charset="0"/>
+                                  </a:rPr>
+                                </m:ctrlPr>
+                              </m:accPr>
+                              <m:e>
+                                <m:r>
+                                  <m:rPr>
+                                    <m:sty m:val="p"/>
+                                  </m:rPr>
+                                  <a:rPr lang="en-US" sz="1600" b="0" i="0" smtClean="0">
+                                    <a:latin typeface="Cambria Math" panose="02040503050406030204" pitchFamily="18" charset="0"/>
+                                  </a:rPr>
+                                  <m:t>ϕ</m:t>
+                                </m:r>
+                              </m:e>
+                            </m:acc>
+                          </m:e>
+                          <m:e>
+                            <m:r>
+                              <a:rPr lang="en-US" sz="1600" b="0" i="1" smtClean="0">
+                                <a:latin typeface="Cambria Math" panose="02040503050406030204" pitchFamily="18" charset="0"/>
+                              </a:rPr>
+                              <m:t>−</m:t>
+                            </m:r>
+                            <m:acc>
+                              <m:accPr>
+                                <m:chr m:val="̇"/>
+                                <m:ctrlPr>
+                                  <a:rPr lang="en-US" sz="1600" b="0" i="1" smtClean="0">
+                                    <a:latin typeface="Cambria Math" panose="02040503050406030204" pitchFamily="18" charset="0"/>
+                                  </a:rPr>
+                                </m:ctrlPr>
+                              </m:accPr>
+                              <m:e>
+                                <m:r>
+                                  <a:rPr lang="en-US" sz="1600" b="0" i="1" smtClean="0">
+                                    <a:latin typeface="Cambria Math" panose="02040503050406030204" pitchFamily="18" charset="0"/>
+                                  </a:rPr>
+                                  <m:t>𝜆</m:t>
+                                </m:r>
+                              </m:e>
+                            </m:acc>
+                            <m:func>
+                              <m:funcPr>
+                                <m:ctrlPr>
+                                  <a:rPr lang="en-US" sz="1600" b="0" i="1" smtClean="0">
+                                    <a:latin typeface="Cambria Math" panose="02040503050406030204" pitchFamily="18" charset="0"/>
+                                  </a:rPr>
+                                </m:ctrlPr>
+                              </m:funcPr>
+                              <m:fName>
+                                <m:r>
+                                  <m:rPr>
+                                    <m:sty m:val="p"/>
+                                  </m:rPr>
+                                  <a:rPr lang="en-US" sz="1600" b="0" i="0" smtClean="0">
+                                    <a:latin typeface="Cambria Math" panose="02040503050406030204" pitchFamily="18" charset="0"/>
+                                  </a:rPr>
+                                  <m:t>sin</m:t>
+                                </m:r>
+                              </m:fName>
+                              <m:e>
+                                <m:r>
+                                  <m:rPr>
+                                    <m:sty m:val="p"/>
+                                  </m:rPr>
+                                  <a:rPr lang="en-US" sz="1600" b="0" i="0" smtClean="0">
+                                    <a:latin typeface="Cambria Math" panose="02040503050406030204" pitchFamily="18" charset="0"/>
+                                  </a:rPr>
+                                  <m:t>ϕ</m:t>
+                                </m:r>
+                              </m:e>
+                            </m:func>
+                          </m:e>
+                        </m:eqArr>
+                      </m:e>
+                    </m:d>
+                    <m:r>
+                      <a:rPr lang="en-US" sz="1600" b="0" i="1" smtClean="0">
+                        <a:latin typeface="Cambria Math" panose="02040503050406030204" pitchFamily="18" charset="0"/>
+                      </a:rPr>
+                      <m:t>)</m:t>
+                    </m:r>
+                  </m:oMath>
+                </a14:m>
+                <a:endParaRPr lang="en-US" sz="1600" b="0" dirty="0"/>
+              </a:p>
+              <a:p>
+                <a14:m>
+                  <m:oMath xmlns:m="http://schemas.openxmlformats.org/officeDocument/2006/math">
+                    <m:sSub>
+                      <m:sSubPr>
+                        <m:ctrlPr>
+                          <a:rPr lang="en-US" sz="1600" b="0" i="1" smtClean="0">
+                            <a:latin typeface="Cambria Math" panose="02040503050406030204" pitchFamily="18" charset="0"/>
+                          </a:rPr>
+                        </m:ctrlPr>
+                      </m:sSubPr>
+                      <m:e>
+                        <m:d>
+                          <m:dPr>
+                            <m:ctrlPr>
+                              <a:rPr lang="en-US" sz="1600" b="0" i="1" smtClean="0">
+                                <a:latin typeface="Cambria Math" panose="02040503050406030204" pitchFamily="18" charset="0"/>
+                              </a:rPr>
+                            </m:ctrlPr>
+                          </m:dPr>
+                          <m:e>
+                            <m:eqArr>
+                              <m:eqArrPr>
+                                <m:ctrlPr>
+                                  <a:rPr lang="en-US" sz="1600" b="0" i="1" smtClean="0">
+                                    <a:latin typeface="Cambria Math" panose="02040503050406030204" pitchFamily="18" charset="0"/>
+                                  </a:rPr>
+                                </m:ctrlPr>
+                              </m:eqArrPr>
+                              <m:e>
+                                <m:acc>
+                                  <m:accPr>
+                                    <m:chr m:val="̇"/>
+                                    <m:ctrlPr>
+                                      <a:rPr lang="en-US" sz="1600" b="0" i="1" smtClean="0">
+                                        <a:latin typeface="Cambria Math" panose="02040503050406030204" pitchFamily="18" charset="0"/>
+                                      </a:rPr>
+                                    </m:ctrlPr>
+                                  </m:accPr>
+                                  <m:e>
+                                    <m:r>
+                                      <a:rPr lang="en-US" sz="1600" b="0" i="1" smtClean="0">
+                                        <a:latin typeface="Cambria Math" panose="02040503050406030204" pitchFamily="18" charset="0"/>
+                                      </a:rPr>
+                                      <m:t>𝑝</m:t>
+                                    </m:r>
+                                  </m:e>
+                                </m:acc>
+                              </m:e>
+                              <m:e>
+                                <m:acc>
+                                  <m:accPr>
+                                    <m:chr m:val="̇"/>
+                                    <m:ctrlPr>
+                                      <a:rPr lang="en-US" sz="1600" b="0" i="1" smtClean="0">
+                                        <a:latin typeface="Cambria Math" panose="02040503050406030204" pitchFamily="18" charset="0"/>
+                                      </a:rPr>
+                                    </m:ctrlPr>
+                                  </m:accPr>
+                                  <m:e>
+                                    <m:r>
+                                      <a:rPr lang="en-US" sz="1600" b="0" i="1" smtClean="0">
+                                        <a:latin typeface="Cambria Math" panose="02040503050406030204" pitchFamily="18" charset="0"/>
+                                      </a:rPr>
+                                      <m:t>𝑞</m:t>
+                                    </m:r>
+                                  </m:e>
+                                </m:acc>
+                              </m:e>
+                              <m:e>
+                                <m:acc>
+                                  <m:accPr>
+                                    <m:chr m:val="̇"/>
+                                    <m:ctrlPr>
+                                      <a:rPr lang="en-US" sz="1600" b="0" i="1" smtClean="0">
+                                        <a:latin typeface="Cambria Math" panose="02040503050406030204" pitchFamily="18" charset="0"/>
+                                      </a:rPr>
+                                    </m:ctrlPr>
+                                  </m:accPr>
+                                  <m:e>
+                                    <m:r>
+                                      <a:rPr lang="en-US" sz="1600" b="0" i="1" smtClean="0">
+                                        <a:latin typeface="Cambria Math" panose="02040503050406030204" pitchFamily="18" charset="0"/>
+                                      </a:rPr>
+                                      <m:t>𝑟</m:t>
+                                    </m:r>
+                                  </m:e>
+                                </m:acc>
+                              </m:e>
+                            </m:eqArr>
+                          </m:e>
+                        </m:d>
+                      </m:e>
+                      <m:sub>
+                        <m:r>
+                          <a:rPr lang="en-US" sz="1600" b="0" i="1" smtClean="0">
+                            <a:latin typeface="Cambria Math" panose="02040503050406030204" pitchFamily="18" charset="0"/>
+                          </a:rPr>
+                          <m:t>𝐵</m:t>
+                        </m:r>
+                      </m:sub>
+                    </m:sSub>
+                    <m:r>
+                      <a:rPr lang="en-US" sz="1600" b="0" i="0" smtClean="0">
+                        <a:latin typeface="Cambria Math" panose="02040503050406030204" pitchFamily="18" charset="0"/>
+                      </a:rPr>
+                      <m:t>=−</m:t>
+                    </m:r>
+                    <m:sSup>
+                      <m:sSupPr>
+                        <m:ctrlPr>
+                          <a:rPr lang="en-US" sz="1600" b="0" i="1" smtClean="0">
+                            <a:latin typeface="Cambria Math" panose="02040503050406030204" pitchFamily="18" charset="0"/>
+                          </a:rPr>
+                        </m:ctrlPr>
+                      </m:sSupPr>
+                      <m:e>
+                        <m:r>
+                          <m:rPr>
+                            <m:sty m:val="p"/>
+                          </m:rPr>
+                          <a:rPr lang="en-US" sz="1600" b="0" i="0" smtClean="0">
+                            <a:latin typeface="Cambria Math" panose="02040503050406030204" pitchFamily="18" charset="0"/>
+                          </a:rPr>
+                          <m:t>J</m:t>
+                        </m:r>
+                      </m:e>
+                      <m:sup>
+                        <m:r>
+                          <a:rPr lang="en-US" sz="1600" b="0" i="0" smtClean="0">
+                            <a:latin typeface="Cambria Math" panose="02040503050406030204" pitchFamily="18" charset="0"/>
+                          </a:rPr>
+                          <m:t>−1</m:t>
+                        </m:r>
+                      </m:sup>
+                    </m:sSup>
+                    <m:r>
+                      <a:rPr lang="en-US" sz="1600" b="0" i="0" smtClean="0">
+                        <a:latin typeface="Cambria Math" panose="02040503050406030204" pitchFamily="18" charset="0"/>
+                      </a:rPr>
+                      <m:t>(</m:t>
+                    </m:r>
+                    <m:sSub>
+                      <m:sSubPr>
+                        <m:ctrlPr>
+                          <a:rPr lang="en-US" sz="1600" b="0" i="1" smtClean="0">
+                            <a:latin typeface="Cambria Math" panose="02040503050406030204" pitchFamily="18" charset="0"/>
+                          </a:rPr>
+                        </m:ctrlPr>
+                      </m:sSubPr>
+                      <m:e>
+                        <m:d>
+                          <m:dPr>
+                            <m:ctrlPr>
+                              <a:rPr lang="en-US" sz="1600" b="0" i="1" smtClean="0">
+                                <a:latin typeface="Cambria Math" panose="02040503050406030204" pitchFamily="18" charset="0"/>
+                              </a:rPr>
+                            </m:ctrlPr>
+                          </m:dPr>
+                          <m:e>
+                            <m:eqArr>
+                              <m:eqArrPr>
+                                <m:ctrlPr>
+                                  <a:rPr lang="en-US" sz="1600" b="0" i="1" smtClean="0">
+                                    <a:latin typeface="Cambria Math" panose="02040503050406030204" pitchFamily="18" charset="0"/>
+                                  </a:rPr>
+                                </m:ctrlPr>
+                              </m:eqArrPr>
+                              <m:e>
+                                <m:r>
+                                  <a:rPr lang="en-US" sz="1600" b="0" i="1" smtClean="0">
+                                    <a:latin typeface="Cambria Math" panose="02040503050406030204" pitchFamily="18" charset="0"/>
+                                  </a:rPr>
+                                  <m:t>𝑝</m:t>
+                                </m:r>
+                              </m:e>
+                              <m:e>
+                                <m:r>
+                                  <a:rPr lang="en-US" sz="1600" b="0" i="1" smtClean="0">
+                                    <a:latin typeface="Cambria Math" panose="02040503050406030204" pitchFamily="18" charset="0"/>
+                                  </a:rPr>
+                                  <m:t>𝑞</m:t>
+                                </m:r>
+                              </m:e>
+                              <m:e>
+                                <m:r>
+                                  <a:rPr lang="en-US" sz="1600" b="0" i="1" smtClean="0">
+                                    <a:latin typeface="Cambria Math" panose="02040503050406030204" pitchFamily="18" charset="0"/>
+                                  </a:rPr>
+                                  <m:t>𝑟</m:t>
+                                </m:r>
+                              </m:e>
+                            </m:eqArr>
+                          </m:e>
+                        </m:d>
+                      </m:e>
+                      <m:sub>
+                        <m:r>
+                          <a:rPr lang="en-US" sz="1600" b="0" i="1" smtClean="0">
+                            <a:latin typeface="Cambria Math" panose="02040503050406030204" pitchFamily="18" charset="0"/>
+                          </a:rPr>
+                          <m:t>𝐵</m:t>
+                        </m:r>
+                      </m:sub>
+                    </m:sSub>
+                    <m:r>
+                      <a:rPr lang="en-US" sz="1600" b="0" i="1" smtClean="0">
+                        <a:latin typeface="Cambria Math" panose="02040503050406030204" pitchFamily="18" charset="0"/>
+                      </a:rPr>
+                      <m:t>×</m:t>
+                    </m:r>
+                    <m:r>
+                      <a:rPr lang="en-US" sz="1600" b="0" i="1" smtClean="0">
+                        <a:latin typeface="Cambria Math" panose="02040503050406030204" pitchFamily="18" charset="0"/>
+                      </a:rPr>
+                      <m:t>𝐽</m:t>
+                    </m:r>
+                    <m:sSub>
+                      <m:sSubPr>
+                        <m:ctrlPr>
+                          <a:rPr lang="en-US" sz="1600" b="0" i="1" smtClean="0">
+                            <a:latin typeface="Cambria Math" panose="02040503050406030204" pitchFamily="18" charset="0"/>
+                          </a:rPr>
+                        </m:ctrlPr>
+                      </m:sSubPr>
+                      <m:e>
+                        <m:d>
+                          <m:dPr>
+                            <m:ctrlPr>
+                              <a:rPr lang="en-US" sz="1600" b="0" i="1" smtClean="0">
+                                <a:latin typeface="Cambria Math" panose="02040503050406030204" pitchFamily="18" charset="0"/>
+                              </a:rPr>
+                            </m:ctrlPr>
+                          </m:dPr>
+                          <m:e>
+                            <m:eqArr>
+                              <m:eqArrPr>
+                                <m:ctrlPr>
+                                  <a:rPr lang="en-US" sz="1600" b="0" i="1" smtClean="0">
+                                    <a:latin typeface="Cambria Math" panose="02040503050406030204" pitchFamily="18" charset="0"/>
+                                  </a:rPr>
+                                </m:ctrlPr>
+                              </m:eqArrPr>
+                              <m:e>
+                                <m:r>
+                                  <a:rPr lang="en-US" sz="1600" b="0" i="1" smtClean="0">
+                                    <a:latin typeface="Cambria Math" panose="02040503050406030204" pitchFamily="18" charset="0"/>
+                                  </a:rPr>
+                                  <m:t>𝑝</m:t>
+                                </m:r>
+                              </m:e>
+                              <m:e>
+                                <m:r>
+                                  <a:rPr lang="en-US" sz="1600" b="0" i="1" smtClean="0">
+                                    <a:latin typeface="Cambria Math" panose="02040503050406030204" pitchFamily="18" charset="0"/>
+                                  </a:rPr>
+                                  <m:t>𝑞</m:t>
+                                </m:r>
+                              </m:e>
+                              <m:e>
+                                <m:r>
+                                  <a:rPr lang="en-US" sz="1600" b="0" i="1" smtClean="0">
+                                    <a:latin typeface="Cambria Math" panose="02040503050406030204" pitchFamily="18" charset="0"/>
+                                  </a:rPr>
+                                  <m:t>𝑟</m:t>
+                                </m:r>
+                              </m:e>
+                            </m:eqArr>
+                          </m:e>
+                        </m:d>
+                      </m:e>
+                      <m:sub>
+                        <m:r>
+                          <a:rPr lang="en-US" sz="1600" b="0" i="1" smtClean="0">
+                            <a:latin typeface="Cambria Math" panose="02040503050406030204" pitchFamily="18" charset="0"/>
+                          </a:rPr>
+                          <m:t>𝐵</m:t>
+                        </m:r>
+                      </m:sub>
+                    </m:sSub>
+                    <m:r>
+                      <a:rPr lang="en-US" sz="1600" b="0" i="1" smtClean="0">
+                        <a:latin typeface="Cambria Math" panose="02040503050406030204" pitchFamily="18" charset="0"/>
+                      </a:rPr>
+                      <m:t>−</m:t>
+                    </m:r>
+                    <m:sSub>
+                      <m:sSubPr>
+                        <m:ctrlPr>
+                          <a:rPr lang="en-US" sz="1600" b="0" i="1" smtClean="0">
+                            <a:latin typeface="Cambria Math" panose="02040503050406030204" pitchFamily="18" charset="0"/>
+                          </a:rPr>
+                        </m:ctrlPr>
+                      </m:sSubPr>
+                      <m:e>
+                        <m:r>
+                          <a:rPr lang="en-US" sz="1600" b="0" i="1" smtClean="0">
+                            <a:latin typeface="Cambria Math" panose="02040503050406030204" pitchFamily="18" charset="0"/>
+                          </a:rPr>
+                          <m:t>𝑀</m:t>
+                        </m:r>
+                      </m:e>
+                      <m:sub>
+                        <m:r>
+                          <a:rPr lang="en-US" sz="1600" b="0" i="1" smtClean="0">
+                            <a:latin typeface="Cambria Math" panose="02040503050406030204" pitchFamily="18" charset="0"/>
+                          </a:rPr>
+                          <m:t>𝑡𝑜𝑡</m:t>
+                        </m:r>
+                        <m:r>
+                          <a:rPr lang="en-US" sz="1600" b="0" i="1" smtClean="0">
+                            <a:latin typeface="Cambria Math" panose="02040503050406030204" pitchFamily="18" charset="0"/>
+                          </a:rPr>
+                          <m:t>,</m:t>
+                        </m:r>
+                        <m:r>
+                          <a:rPr lang="en-US" sz="1600" b="0" i="1" smtClean="0">
+                            <a:latin typeface="Cambria Math" panose="02040503050406030204" pitchFamily="18" charset="0"/>
+                          </a:rPr>
+                          <m:t>𝐵</m:t>
+                        </m:r>
+                      </m:sub>
+                    </m:sSub>
+                    <m:r>
+                      <a:rPr lang="en-US" sz="1600" b="0" i="1" smtClean="0">
+                        <a:latin typeface="Cambria Math" panose="02040503050406030204" pitchFamily="18" charset="0"/>
+                      </a:rPr>
+                      <m:t>)</m:t>
+                    </m:r>
+                  </m:oMath>
+                </a14:m>
+                <a:endParaRPr lang="en-US" sz="1600" dirty="0"/>
+              </a:p>
+              <a:p>
+                <a14:m>
+                  <m:oMath xmlns:m="http://schemas.openxmlformats.org/officeDocument/2006/math">
+                    <m:acc>
+                      <m:accPr>
+                        <m:chr m:val="̇"/>
+                        <m:ctrlPr>
+                          <a:rPr lang="en-US" sz="1600" b="0" i="1" smtClean="0">
+                            <a:latin typeface="Cambria Math" panose="02040503050406030204" pitchFamily="18" charset="0"/>
+                          </a:rPr>
+                        </m:ctrlPr>
+                      </m:accPr>
+                      <m:e>
+                        <m:r>
+                          <a:rPr lang="en-US" sz="1600" b="0" i="1" smtClean="0">
+                            <a:latin typeface="Cambria Math" panose="02040503050406030204" pitchFamily="18" charset="0"/>
+                          </a:rPr>
+                          <m:t>𝜆</m:t>
+                        </m:r>
+                      </m:e>
+                    </m:acc>
+                    <m:r>
+                      <a:rPr lang="en-US" sz="1600" b="0" i="1" smtClean="0">
+                        <a:latin typeface="Cambria Math" panose="02040503050406030204" pitchFamily="18" charset="0"/>
+                      </a:rPr>
+                      <m:t>=</m:t>
+                    </m:r>
+                    <m:f>
+                      <m:fPr>
+                        <m:ctrlPr>
+                          <a:rPr lang="en-US" sz="1600" b="0" i="1" smtClean="0">
+                            <a:latin typeface="Cambria Math" panose="02040503050406030204" pitchFamily="18" charset="0"/>
+                          </a:rPr>
+                        </m:ctrlPr>
+                      </m:fPr>
+                      <m:num>
+                        <m:sSub>
+                          <m:sSubPr>
+                            <m:ctrlPr>
+                              <a:rPr lang="en-US" sz="1600" b="0" i="1" smtClean="0">
+                                <a:latin typeface="Cambria Math" panose="02040503050406030204" pitchFamily="18" charset="0"/>
+                              </a:rPr>
+                            </m:ctrlPr>
+                          </m:sSubPr>
+                          <m:e>
+                            <m:r>
+                              <a:rPr lang="en-US" sz="1600" b="0" i="1" smtClean="0">
+                                <a:latin typeface="Cambria Math" panose="02040503050406030204" pitchFamily="18" charset="0"/>
+                              </a:rPr>
+                              <m:t>𝑣</m:t>
+                            </m:r>
+                          </m:e>
+                          <m:sub>
+                            <m:r>
+                              <a:rPr lang="en-US" sz="1600" b="0" i="1" smtClean="0">
+                                <a:latin typeface="Cambria Math" panose="02040503050406030204" pitchFamily="18" charset="0"/>
+                              </a:rPr>
+                              <m:t>𝑘</m:t>
+                            </m:r>
+                            <m:r>
+                              <a:rPr lang="en-US" sz="1600" b="0" i="1" smtClean="0">
+                                <a:latin typeface="Cambria Math" panose="02040503050406030204" pitchFamily="18" charset="0"/>
+                              </a:rPr>
+                              <m:t>,</m:t>
+                            </m:r>
+                            <m:r>
+                              <a:rPr lang="en-US" sz="1600" b="0" i="1" smtClean="0">
+                                <a:latin typeface="Cambria Math" panose="02040503050406030204" pitchFamily="18" charset="0"/>
+                              </a:rPr>
+                              <m:t>𝑦</m:t>
+                            </m:r>
+                            <m:r>
+                              <a:rPr lang="en-US" sz="1600" b="0" i="1" smtClean="0">
+                                <a:latin typeface="Cambria Math" panose="02040503050406030204" pitchFamily="18" charset="0"/>
+                              </a:rPr>
+                              <m:t>,</m:t>
+                            </m:r>
+                            <m:r>
+                              <a:rPr lang="en-US" sz="1600" b="0" i="1" smtClean="0">
+                                <a:latin typeface="Cambria Math" panose="02040503050406030204" pitchFamily="18" charset="0"/>
+                              </a:rPr>
+                              <m:t>𝑡</m:t>
+                            </m:r>
+                          </m:sub>
+                        </m:sSub>
+                      </m:num>
+                      <m:den>
+                        <m:func>
+                          <m:funcPr>
+                            <m:ctrlPr>
+                              <a:rPr lang="en-US" sz="1600" b="0" i="1" smtClean="0">
+                                <a:latin typeface="Cambria Math" panose="02040503050406030204" pitchFamily="18" charset="0"/>
+                              </a:rPr>
+                            </m:ctrlPr>
+                          </m:funcPr>
+                          <m:fName>
+                            <m:r>
+                              <m:rPr>
+                                <m:sty m:val="p"/>
+                              </m:rPr>
+                              <a:rPr lang="en-US" sz="1600" b="0" i="0" smtClean="0">
+                                <a:latin typeface="Cambria Math" panose="02040503050406030204" pitchFamily="18" charset="0"/>
+                              </a:rPr>
+                              <m:t>cos</m:t>
+                            </m:r>
+                          </m:fName>
+                          <m:e>
+                            <m:r>
+                              <m:rPr>
+                                <m:sty m:val="p"/>
+                              </m:rPr>
+                              <a:rPr lang="en-US" sz="1600" b="0" i="0" smtClean="0">
+                                <a:latin typeface="Cambria Math" panose="02040503050406030204" pitchFamily="18" charset="0"/>
+                              </a:rPr>
+                              <m:t>ϕ</m:t>
+                            </m:r>
+                          </m:e>
+                        </m:func>
+                        <m:sSub>
+                          <m:sSubPr>
+                            <m:ctrlPr>
+                              <a:rPr lang="en-US" sz="1600" b="0" i="1" smtClean="0">
+                                <a:latin typeface="Cambria Math" panose="02040503050406030204" pitchFamily="18" charset="0"/>
+                              </a:rPr>
+                            </m:ctrlPr>
+                          </m:sSubPr>
+                          <m:e>
+                            <m:r>
+                              <a:rPr lang="en-US" sz="1600" b="0" i="1" smtClean="0">
+                                <a:latin typeface="Cambria Math" panose="02040503050406030204" pitchFamily="18" charset="0"/>
+                              </a:rPr>
+                              <m:t>h</m:t>
+                            </m:r>
+                          </m:e>
+                          <m:sub>
+                            <m:r>
+                              <a:rPr lang="en-US" sz="1600" b="0" i="1" smtClean="0">
+                                <a:latin typeface="Cambria Math" panose="02040503050406030204" pitchFamily="18" charset="0"/>
+                              </a:rPr>
+                              <m:t>𝑡</m:t>
+                            </m:r>
+                          </m:sub>
+                        </m:sSub>
+                      </m:den>
+                    </m:f>
+                  </m:oMath>
+                </a14:m>
+                <a:endParaRPr lang="en-US" sz="1600" dirty="0"/>
+              </a:p>
+              <a:p>
+                <a14:m>
+                  <m:oMath xmlns:m="http://schemas.openxmlformats.org/officeDocument/2006/math">
+                    <m:acc>
+                      <m:accPr>
+                        <m:chr m:val="̇"/>
+                        <m:ctrlPr>
+                          <a:rPr lang="en-US" sz="1600" b="0" i="1" smtClean="0">
+                            <a:latin typeface="Cambria Math" panose="02040503050406030204" pitchFamily="18" charset="0"/>
+                          </a:rPr>
+                        </m:ctrlPr>
+                      </m:accPr>
+                      <m:e>
+                        <m:r>
+                          <m:rPr>
+                            <m:sty m:val="p"/>
+                          </m:rPr>
+                          <a:rPr lang="en-US" sz="1600" b="0" i="0" smtClean="0">
+                            <a:latin typeface="Cambria Math" panose="02040503050406030204" pitchFamily="18" charset="0"/>
+                          </a:rPr>
+                          <m:t>ϕ</m:t>
+                        </m:r>
+                      </m:e>
+                    </m:acc>
+                    <m:r>
+                      <a:rPr lang="en-US" sz="1600" b="0" i="1" smtClean="0">
+                        <a:latin typeface="Cambria Math" panose="02040503050406030204" pitchFamily="18" charset="0"/>
+                      </a:rPr>
+                      <m:t>=</m:t>
+                    </m:r>
+                    <m:f>
+                      <m:fPr>
+                        <m:ctrlPr>
+                          <a:rPr lang="en-US" sz="1600" b="0" i="1" smtClean="0">
+                            <a:latin typeface="Cambria Math" panose="02040503050406030204" pitchFamily="18" charset="0"/>
+                          </a:rPr>
+                        </m:ctrlPr>
+                      </m:fPr>
+                      <m:num>
+                        <m:sSub>
+                          <m:sSubPr>
+                            <m:ctrlPr>
+                              <a:rPr lang="en-US" sz="1600" b="0" i="1" smtClean="0">
+                                <a:latin typeface="Cambria Math" panose="02040503050406030204" pitchFamily="18" charset="0"/>
+                              </a:rPr>
+                            </m:ctrlPr>
+                          </m:sSubPr>
+                          <m:e>
+                            <m:r>
+                              <a:rPr lang="en-US" sz="1600" b="0" i="1" smtClean="0">
+                                <a:latin typeface="Cambria Math" panose="02040503050406030204" pitchFamily="18" charset="0"/>
+                              </a:rPr>
+                              <m:t>𝑣</m:t>
+                            </m:r>
+                          </m:e>
+                          <m:sub>
+                            <m:r>
+                              <a:rPr lang="en-US" sz="1600" b="0" i="1" smtClean="0">
+                                <a:latin typeface="Cambria Math" panose="02040503050406030204" pitchFamily="18" charset="0"/>
+                              </a:rPr>
+                              <m:t>𝑘</m:t>
+                            </m:r>
+                            <m:r>
+                              <a:rPr lang="en-US" sz="1600" b="0" i="1" smtClean="0">
+                                <a:latin typeface="Cambria Math" panose="02040503050406030204" pitchFamily="18" charset="0"/>
+                              </a:rPr>
+                              <m:t>,</m:t>
+                            </m:r>
+                            <m:r>
+                              <a:rPr lang="en-US" sz="1600" b="0" i="1" smtClean="0">
+                                <a:latin typeface="Cambria Math" panose="02040503050406030204" pitchFamily="18" charset="0"/>
+                              </a:rPr>
+                              <m:t>𝑥</m:t>
+                            </m:r>
+                            <m:r>
+                              <a:rPr lang="en-US" sz="1600" b="0" i="1" smtClean="0">
+                                <a:latin typeface="Cambria Math" panose="02040503050406030204" pitchFamily="18" charset="0"/>
+                              </a:rPr>
+                              <m:t>,</m:t>
+                            </m:r>
+                            <m:r>
+                              <a:rPr lang="en-US" sz="1600" b="0" i="1" smtClean="0">
+                                <a:latin typeface="Cambria Math" panose="02040503050406030204" pitchFamily="18" charset="0"/>
+                              </a:rPr>
+                              <m:t>𝑡</m:t>
+                            </m:r>
+                          </m:sub>
+                        </m:sSub>
+                      </m:num>
+                      <m:den>
+                        <m:sSub>
+                          <m:sSubPr>
+                            <m:ctrlPr>
+                              <a:rPr lang="en-US" sz="1600" b="0" i="1" smtClean="0">
+                                <a:latin typeface="Cambria Math" panose="02040503050406030204" pitchFamily="18" charset="0"/>
+                              </a:rPr>
+                            </m:ctrlPr>
+                          </m:sSubPr>
+                          <m:e>
+                            <m:r>
+                              <a:rPr lang="en-US" sz="1600" b="0" i="1" smtClean="0">
+                                <a:latin typeface="Cambria Math" panose="02040503050406030204" pitchFamily="18" charset="0"/>
+                              </a:rPr>
+                              <m:t>h</m:t>
+                            </m:r>
+                          </m:e>
+                          <m:sub>
+                            <m:r>
+                              <a:rPr lang="en-US" sz="1600" b="0" i="1" smtClean="0">
+                                <a:latin typeface="Cambria Math" panose="02040503050406030204" pitchFamily="18" charset="0"/>
+                              </a:rPr>
+                              <m:t>𝑡</m:t>
+                            </m:r>
+                          </m:sub>
+                        </m:sSub>
+                      </m:den>
+                    </m:f>
+                  </m:oMath>
+                </a14:m>
+                <a:endParaRPr lang="en-US" sz="1600" dirty="0"/>
+              </a:p>
+              <a:p>
+                <a14:m>
+                  <m:oMath xmlns:m="http://schemas.openxmlformats.org/officeDocument/2006/math">
+                    <m:sSub>
+                      <m:sSubPr>
+                        <m:ctrlPr>
+                          <a:rPr lang="en-US" sz="1600" b="0" i="1" smtClean="0">
+                            <a:latin typeface="Cambria Math" panose="02040503050406030204" pitchFamily="18" charset="0"/>
+                          </a:rPr>
+                        </m:ctrlPr>
+                      </m:sSubPr>
+                      <m:e>
+                        <m:acc>
+                          <m:accPr>
+                            <m:chr m:val="̇"/>
+                            <m:ctrlPr>
+                              <a:rPr lang="en-US" sz="1600" b="0" i="1" smtClean="0">
+                                <a:latin typeface="Cambria Math" panose="02040503050406030204" pitchFamily="18" charset="0"/>
+                              </a:rPr>
+                            </m:ctrlPr>
+                          </m:accPr>
+                          <m:e>
+                            <m:r>
+                              <a:rPr lang="en-US" sz="1600" b="0" i="1" smtClean="0">
+                                <a:latin typeface="Cambria Math" panose="02040503050406030204" pitchFamily="18" charset="0"/>
+                              </a:rPr>
+                              <m:t>h</m:t>
+                            </m:r>
+                          </m:e>
+                        </m:acc>
+                      </m:e>
+                      <m:sub>
+                        <m:r>
+                          <a:rPr lang="en-US" sz="1600" b="0" i="1" smtClean="0">
+                            <a:latin typeface="Cambria Math" panose="02040503050406030204" pitchFamily="18" charset="0"/>
+                          </a:rPr>
+                          <m:t>𝑡</m:t>
+                        </m:r>
+                      </m:sub>
+                    </m:sSub>
+                    <m:r>
+                      <a:rPr lang="en-US" sz="1600" b="0" i="1" smtClean="0">
+                        <a:latin typeface="Cambria Math" panose="02040503050406030204" pitchFamily="18" charset="0"/>
+                      </a:rPr>
+                      <m:t>=</m:t>
+                    </m:r>
+                    <m:sSub>
+                      <m:sSubPr>
+                        <m:ctrlPr>
+                          <a:rPr lang="en-US" sz="1600" b="0" i="1" smtClean="0">
+                            <a:latin typeface="Cambria Math" panose="02040503050406030204" pitchFamily="18" charset="0"/>
+                          </a:rPr>
+                        </m:ctrlPr>
+                      </m:sSubPr>
+                      <m:e>
+                        <m:r>
+                          <a:rPr lang="en-US" sz="1600" b="0" i="1" smtClean="0">
+                            <a:latin typeface="Cambria Math" panose="02040503050406030204" pitchFamily="18" charset="0"/>
+                          </a:rPr>
+                          <m:t>−</m:t>
+                        </m:r>
+                        <m:r>
+                          <a:rPr lang="en-US" sz="1600" b="0" i="1" smtClean="0">
+                            <a:latin typeface="Cambria Math" panose="02040503050406030204" pitchFamily="18" charset="0"/>
+                          </a:rPr>
+                          <m:t>𝑣</m:t>
+                        </m:r>
+                      </m:e>
+                      <m:sub>
+                        <m:r>
+                          <a:rPr lang="en-US" sz="1600" b="0" i="1" smtClean="0">
+                            <a:latin typeface="Cambria Math" panose="02040503050406030204" pitchFamily="18" charset="0"/>
+                          </a:rPr>
+                          <m:t>𝑘</m:t>
+                        </m:r>
+                        <m:r>
+                          <a:rPr lang="en-US" sz="1600" b="0" i="1" smtClean="0">
+                            <a:latin typeface="Cambria Math" panose="02040503050406030204" pitchFamily="18" charset="0"/>
+                          </a:rPr>
+                          <m:t>,</m:t>
+                        </m:r>
+                        <m:r>
+                          <a:rPr lang="en-US" sz="1600" b="0" i="1" smtClean="0">
+                            <a:latin typeface="Cambria Math" panose="02040503050406030204" pitchFamily="18" charset="0"/>
+                          </a:rPr>
+                          <m:t>𝑥</m:t>
+                        </m:r>
+                        <m:r>
+                          <a:rPr lang="en-US" sz="1600" b="0" i="1" smtClean="0">
+                            <a:latin typeface="Cambria Math" panose="02040503050406030204" pitchFamily="18" charset="0"/>
+                          </a:rPr>
+                          <m:t>,</m:t>
+                        </m:r>
+                        <m:r>
+                          <a:rPr lang="en-US" sz="1600" b="0" i="1" smtClean="0">
+                            <a:latin typeface="Cambria Math" panose="02040503050406030204" pitchFamily="18" charset="0"/>
+                          </a:rPr>
+                          <m:t>𝑡</m:t>
+                        </m:r>
+                      </m:sub>
+                    </m:sSub>
+                  </m:oMath>
+                </a14:m>
+                <a:endParaRPr lang="en-US" sz="1600" dirty="0"/>
+              </a:p>
+              <a:p>
+                <a:endParaRPr lang="en-US" sz="1600" dirty="0"/>
+              </a:p>
+              <a:p>
+                <a:endParaRPr lang="en-US" sz="1600" dirty="0"/>
+              </a:p>
+              <a:p>
+                <a:endParaRPr lang="en-US" dirty="0"/>
+              </a:p>
+              <a:p>
+                <a:endParaRPr lang="en-US" dirty="0"/>
+              </a:p>
+            </p:txBody>
+          </p:sp>
+        </mc:Choice>
+        <mc:Fallback>
+          <p:sp>
+            <p:nvSpPr>
+              <p:cNvPr id="3" name="Content Placeholder 2">
+                <a:extLst>
+                  <a:ext uri="{FF2B5EF4-FFF2-40B4-BE49-F238E27FC236}">
+                    <a16:creationId xmlns:a16="http://schemas.microsoft.com/office/drawing/2014/main" id="{296B5D46-5A79-EB7D-76A6-0AAD08B77740}"/>
+                  </a:ext>
+                </a:extLst>
+              </p:cNvPr>
+              <p:cNvSpPr>
+                <a:spLocks noGrp="1" noRot="1" noChangeAspect="1" noMove="1" noResize="1" noEditPoints="1" noAdjustHandles="1" noChangeArrowheads="1" noChangeShapeType="1" noTextEdit="1"/>
+              </p:cNvSpPr>
+              <p:nvPr>
+                <p:ph idx="1"/>
+              </p:nvPr>
+            </p:nvSpPr>
+            <p:spPr>
+              <a:blipFill>
+                <a:blip r:embed="rId2"/>
+                <a:stretch>
+                  <a:fillRect l="-174"/>
+                </a:stretch>
+              </a:blipFill>
+            </p:spPr>
+            <p:txBody>
+              <a:bodyPr/>
+              <a:lstStyle/>
+              <a:p>
+                <a:r>
+                  <a:rPr lang="en-US">
+                    <a:noFill/>
+                  </a:rPr>
+                  <a:t> </a:t>
+                </a:r>
+              </a:p>
+            </p:txBody>
+          </p:sp>
+        </mc:Fallback>
+      </mc:AlternateContent>
+    </p:spTree>
+    <p:extLst>
+      <p:ext uri="{BB962C8B-B14F-4D97-AF65-F5344CB8AC3E}">
+        <p14:creationId xmlns:p14="http://schemas.microsoft.com/office/powerpoint/2010/main" val="736599594"/>
       </p:ext>
     </p:extLst>
   </p:cSld>

</xml_diff>

<commit_message>
started working on a making a controller for the linearized system
</commit_message>
<xml_diff>
--- a/rappStuff/rappLinearizedEquations.pptx
+++ b/rappStuff/rappLinearizedEquations.pptx
@@ -13,6 +13,8 @@
     <p:sldId id="261" r:id="rId7"/>
     <p:sldId id="262" r:id="rId8"/>
     <p:sldId id="263" r:id="rId9"/>
+    <p:sldId id="264" r:id="rId10"/>
+    <p:sldId id="265" r:id="rId11"/>
   </p:sldIdLst>
   <p:sldSz cx="12192000" cy="6858000"/>
   <p:notesSz cx="6858000" cy="9144000"/>
@@ -122,7 +124,7 @@
 <file path=ppt/revisionInfo.xml><?xml version="1.0" encoding="utf-8"?>
 <p1510:revInfo xmlns:a="http://schemas.openxmlformats.org/drawingml/2006/main" xmlns:r="http://schemas.openxmlformats.org/officeDocument/2006/relationships" xmlns:p1510="http://schemas.microsoft.com/office/powerpoint/2015/10/main">
   <p1510:revLst>
-    <p1510:client id="{FBA49C5B-85D7-4182-BFBB-632C38800DBC}" v="22" dt="2022-10-11T14:41:25.857"/>
+    <p1510:client id="{FBA49C5B-85D7-4182-BFBB-632C38800DBC}" v="23" dt="2022-10-17T17:00:52.241"/>
   </p1510:revLst>
 </p1510:revInfo>
 </file>
@@ -132,7 +134,7 @@
   <pc:docChgLst>
     <pc:chgData name="Jacob Fine" userId="01647bc0d57d62c9" providerId="LiveId" clId="{FBA49C5B-85D7-4182-BFBB-632C38800DBC}"/>
     <pc:docChg chg="undo redo custSel addSld delSld modSld">
-      <pc:chgData name="Jacob Fine" userId="01647bc0d57d62c9" providerId="LiveId" clId="{FBA49C5B-85D7-4182-BFBB-632C38800DBC}" dt="2022-10-11T14:41:26.913" v="47" actId="27636"/>
+      <pc:chgData name="Jacob Fine" userId="01647bc0d57d62c9" providerId="LiveId" clId="{FBA49C5B-85D7-4182-BFBB-632C38800DBC}" dt="2022-10-17T17:02:44.760" v="347" actId="27636"/>
       <pc:docMkLst>
         <pc:docMk/>
       </pc:docMkLst>
@@ -205,6 +207,76 @@
           </ac:spMkLst>
         </pc:spChg>
       </pc:sldChg>
+      <pc:sldChg chg="addSp delSp modSp new mod">
+        <pc:chgData name="Jacob Fine" userId="01647bc0d57d62c9" providerId="LiveId" clId="{FBA49C5B-85D7-4182-BFBB-632C38800DBC}" dt="2022-10-17T17:00:49.805" v="277" actId="14100"/>
+        <pc:sldMkLst>
+          <pc:docMk/>
+          <pc:sldMk cId="4080094793" sldId="264"/>
+        </pc:sldMkLst>
+        <pc:spChg chg="mod">
+          <ac:chgData name="Jacob Fine" userId="01647bc0d57d62c9" providerId="LiveId" clId="{FBA49C5B-85D7-4182-BFBB-632C38800DBC}" dt="2022-10-17T15:33:47.719" v="120" actId="20577"/>
+          <ac:spMkLst>
+            <pc:docMk/>
+            <pc:sldMk cId="4080094793" sldId="264"/>
+            <ac:spMk id="2" creationId="{D4CB53B6-71DA-7A3A-D35F-88D2C0DF793B}"/>
+          </ac:spMkLst>
+        </pc:spChg>
+        <pc:spChg chg="del">
+          <ac:chgData name="Jacob Fine" userId="01647bc0d57d62c9" providerId="LiveId" clId="{FBA49C5B-85D7-4182-BFBB-632C38800DBC}" dt="2022-10-17T14:37:56.632" v="49" actId="22"/>
+          <ac:spMkLst>
+            <pc:docMk/>
+            <pc:sldMk cId="4080094793" sldId="264"/>
+            <ac:spMk id="3" creationId="{35812936-6D93-134C-61B9-0B6DD3B27518}"/>
+          </ac:spMkLst>
+        </pc:spChg>
+        <pc:spChg chg="add mod">
+          <ac:chgData name="Jacob Fine" userId="01647bc0d57d62c9" providerId="LiveId" clId="{FBA49C5B-85D7-4182-BFBB-632C38800DBC}" dt="2022-10-17T17:00:39.458" v="274" actId="14100"/>
+          <ac:spMkLst>
+            <pc:docMk/>
+            <pc:sldMk cId="4080094793" sldId="264"/>
+            <ac:spMk id="7" creationId="{06B982F2-F8CD-0C63-AA81-B37F348AB9FB}"/>
+          </ac:spMkLst>
+        </pc:spChg>
+        <pc:picChg chg="add del mod ord">
+          <ac:chgData name="Jacob Fine" userId="01647bc0d57d62c9" providerId="LiveId" clId="{FBA49C5B-85D7-4182-BFBB-632C38800DBC}" dt="2022-10-17T15:31:22.492" v="50" actId="478"/>
+          <ac:picMkLst>
+            <pc:docMk/>
+            <pc:sldMk cId="4080094793" sldId="264"/>
+            <ac:picMk id="5" creationId="{C76BE0B8-0D2F-E3F9-05FD-8ADFE82E8E91}"/>
+          </ac:picMkLst>
+        </pc:picChg>
+        <pc:picChg chg="add mod">
+          <ac:chgData name="Jacob Fine" userId="01647bc0d57d62c9" providerId="LiveId" clId="{FBA49C5B-85D7-4182-BFBB-632C38800DBC}" dt="2022-10-17T17:00:49.805" v="277" actId="14100"/>
+          <ac:picMkLst>
+            <pc:docMk/>
+            <pc:sldMk cId="4080094793" sldId="264"/>
+            <ac:picMk id="9" creationId="{6C2B35EE-67AD-C524-B850-8445508DBBD3}"/>
+          </ac:picMkLst>
+        </pc:picChg>
+      </pc:sldChg>
+      <pc:sldChg chg="modSp add mod">
+        <pc:chgData name="Jacob Fine" userId="01647bc0d57d62c9" providerId="LiveId" clId="{FBA49C5B-85D7-4182-BFBB-632C38800DBC}" dt="2022-10-17T17:02:44.760" v="347" actId="27636"/>
+        <pc:sldMkLst>
+          <pc:docMk/>
+          <pc:sldMk cId="3300786520" sldId="265"/>
+        </pc:sldMkLst>
+        <pc:spChg chg="mod">
+          <ac:chgData name="Jacob Fine" userId="01647bc0d57d62c9" providerId="LiveId" clId="{FBA49C5B-85D7-4182-BFBB-632C38800DBC}" dt="2022-10-17T17:02:44.760" v="347" actId="27636"/>
+          <ac:spMkLst>
+            <pc:docMk/>
+            <pc:sldMk cId="3300786520" sldId="265"/>
+            <ac:spMk id="7" creationId="{06B982F2-F8CD-0C63-AA81-B37F348AB9FB}"/>
+          </ac:spMkLst>
+        </pc:spChg>
+        <pc:picChg chg="mod">
+          <ac:chgData name="Jacob Fine" userId="01647bc0d57d62c9" providerId="LiveId" clId="{FBA49C5B-85D7-4182-BFBB-632C38800DBC}" dt="2022-10-17T17:02:32.451" v="342" actId="14100"/>
+          <ac:picMkLst>
+            <pc:docMk/>
+            <pc:sldMk cId="3300786520" sldId="265"/>
+            <ac:picMk id="9" creationId="{6C2B35EE-67AD-C524-B850-8445508DBBD3}"/>
+          </ac:picMkLst>
+        </pc:picChg>
+      </pc:sldChg>
     </pc:docChg>
   </pc:docChgLst>
 </pc:chgInfo>
@@ -339,7 +411,7 @@
           <a:p>
             <a:fld id="{9A70D4AC-E78A-491F-8F71-1DF07F826345}" type="datetimeFigureOut">
               <a:rPr lang="en-US" smtClean="0"/>
-              <a:t>10/10/2022</a:t>
+              <a:t>10/17/2022</a:t>
             </a:fld>
             <a:endParaRPr lang="en-US"/>
           </a:p>
@@ -507,7 +579,7 @@
           <a:p>
             <a:fld id="{9A70D4AC-E78A-491F-8F71-1DF07F826345}" type="datetimeFigureOut">
               <a:rPr lang="en-US" smtClean="0"/>
-              <a:t>10/10/2022</a:t>
+              <a:t>10/17/2022</a:t>
             </a:fld>
             <a:endParaRPr lang="en-US"/>
           </a:p>
@@ -685,7 +757,7 @@
           <a:p>
             <a:fld id="{9A70D4AC-E78A-491F-8F71-1DF07F826345}" type="datetimeFigureOut">
               <a:rPr lang="en-US" smtClean="0"/>
-              <a:t>10/10/2022</a:t>
+              <a:t>10/17/2022</a:t>
             </a:fld>
             <a:endParaRPr lang="en-US"/>
           </a:p>
@@ -853,7 +925,7 @@
           <a:p>
             <a:fld id="{9A70D4AC-E78A-491F-8F71-1DF07F826345}" type="datetimeFigureOut">
               <a:rPr lang="en-US" smtClean="0"/>
-              <a:t>10/10/2022</a:t>
+              <a:t>10/17/2022</a:t>
             </a:fld>
             <a:endParaRPr lang="en-US"/>
           </a:p>
@@ -1098,7 +1170,7 @@
           <a:p>
             <a:fld id="{9A70D4AC-E78A-491F-8F71-1DF07F826345}" type="datetimeFigureOut">
               <a:rPr lang="en-US" smtClean="0"/>
-              <a:t>10/10/2022</a:t>
+              <a:t>10/17/2022</a:t>
             </a:fld>
             <a:endParaRPr lang="en-US"/>
           </a:p>
@@ -1327,7 +1399,7 @@
           <a:p>
             <a:fld id="{9A70D4AC-E78A-491F-8F71-1DF07F826345}" type="datetimeFigureOut">
               <a:rPr lang="en-US" smtClean="0"/>
-              <a:t>10/10/2022</a:t>
+              <a:t>10/17/2022</a:t>
             </a:fld>
             <a:endParaRPr lang="en-US"/>
           </a:p>
@@ -1691,7 +1763,7 @@
           <a:p>
             <a:fld id="{9A70D4AC-E78A-491F-8F71-1DF07F826345}" type="datetimeFigureOut">
               <a:rPr lang="en-US" smtClean="0"/>
-              <a:t>10/10/2022</a:t>
+              <a:t>10/17/2022</a:t>
             </a:fld>
             <a:endParaRPr lang="en-US"/>
           </a:p>
@@ -1808,7 +1880,7 @@
           <a:p>
             <a:fld id="{9A70D4AC-E78A-491F-8F71-1DF07F826345}" type="datetimeFigureOut">
               <a:rPr lang="en-US" smtClean="0"/>
-              <a:t>10/10/2022</a:t>
+              <a:t>10/17/2022</a:t>
             </a:fld>
             <a:endParaRPr lang="en-US"/>
           </a:p>
@@ -1903,7 +1975,7 @@
           <a:p>
             <a:fld id="{9A70D4AC-E78A-491F-8F71-1DF07F826345}" type="datetimeFigureOut">
               <a:rPr lang="en-US" smtClean="0"/>
-              <a:t>10/10/2022</a:t>
+              <a:t>10/17/2022</a:t>
             </a:fld>
             <a:endParaRPr lang="en-US"/>
           </a:p>
@@ -2178,7 +2250,7 @@
           <a:p>
             <a:fld id="{9A70D4AC-E78A-491F-8F71-1DF07F826345}" type="datetimeFigureOut">
               <a:rPr lang="en-US" smtClean="0"/>
-              <a:t>10/10/2022</a:t>
+              <a:t>10/17/2022</a:t>
             </a:fld>
             <a:endParaRPr lang="en-US"/>
           </a:p>
@@ -2430,7 +2502,7 @@
           <a:p>
             <a:fld id="{9A70D4AC-E78A-491F-8F71-1DF07F826345}" type="datetimeFigureOut">
               <a:rPr lang="en-US" smtClean="0"/>
-              <a:t>10/10/2022</a:t>
+              <a:t>10/17/2022</a:t>
             </a:fld>
             <a:endParaRPr lang="en-US"/>
           </a:p>
@@ -2641,7 +2713,7 @@
           <a:p>
             <a:fld id="{9A70D4AC-E78A-491F-8F71-1DF07F826345}" type="datetimeFigureOut">
               <a:rPr lang="en-US" smtClean="0"/>
-              <a:t>10/10/2022</a:t>
+              <a:t>10/17/2022</a:t>
             </a:fld>
             <a:endParaRPr lang="en-US"/>
           </a:p>
@@ -3100,6 +3172,294 @@
 </p:sld>
 </file>
 
+<file path=ppt/slides/slide10.xml><?xml version="1.0" encoding="utf-8"?>
+<p:sld xmlns:a="http://schemas.openxmlformats.org/drawingml/2006/main" xmlns:r="http://schemas.openxmlformats.org/officeDocument/2006/relationships" xmlns:p="http://schemas.openxmlformats.org/presentationml/2006/main">
+  <p:cSld>
+    <p:spTree>
+      <p:nvGrpSpPr>
+        <p:cNvPr id="1" name=""/>
+        <p:cNvGrpSpPr/>
+        <p:nvPr/>
+      </p:nvGrpSpPr>
+      <p:grpSpPr>
+        <a:xfrm>
+          <a:off x="0" y="0"/>
+          <a:ext cx="0" cy="0"/>
+          <a:chOff x="0" y="0"/>
+          <a:chExt cx="0" cy="0"/>
+        </a:xfrm>
+      </p:grpSpPr>
+      <p:sp>
+        <p:nvSpPr>
+          <p:cNvPr id="2" name="Title 1">
+            <a:extLst>
+              <a:ext uri="{FF2B5EF4-FFF2-40B4-BE49-F238E27FC236}">
+                <a16:creationId xmlns:a16="http://schemas.microsoft.com/office/drawing/2014/main" id="{D4CB53B6-71DA-7A3A-D35F-88D2C0DF793B}"/>
+              </a:ext>
+            </a:extLst>
+          </p:cNvPr>
+          <p:cNvSpPr>
+            <a:spLocks noGrp="1"/>
+          </p:cNvSpPr>
+          <p:nvPr>
+            <p:ph type="title"/>
+          </p:nvPr>
+        </p:nvSpPr>
+        <p:spPr/>
+        <p:txBody>
+          <a:bodyPr/>
+          <a:lstStyle/>
+          <a:p>
+            <a:r>
+              <a:rPr lang="en-US" dirty="0"/>
+              <a:t>State Order</a:t>
+            </a:r>
+          </a:p>
+        </p:txBody>
+      </p:sp>
+      <p:sp>
+        <p:nvSpPr>
+          <p:cNvPr id="7" name="Content Placeholder 6">
+            <a:extLst>
+              <a:ext uri="{FF2B5EF4-FFF2-40B4-BE49-F238E27FC236}">
+                <a16:creationId xmlns:a16="http://schemas.microsoft.com/office/drawing/2014/main" id="{06B982F2-F8CD-0C63-AA81-B37F348AB9FB}"/>
+              </a:ext>
+            </a:extLst>
+          </p:cNvPr>
+          <p:cNvSpPr>
+            <a:spLocks noGrp="1"/>
+          </p:cNvSpPr>
+          <p:nvPr>
+            <p:ph idx="1"/>
+          </p:nvPr>
+        </p:nvSpPr>
+        <p:spPr>
+          <a:xfrm>
+            <a:off x="838200" y="1825624"/>
+            <a:ext cx="2667000" cy="2746375"/>
+          </a:xfrm>
+        </p:spPr>
+        <p:txBody>
+          <a:bodyPr>
+            <a:normAutofit fontScale="92500" lnSpcReduction="10000"/>
+          </a:bodyPr>
+          <a:lstStyle/>
+          <a:p>
+            <a:pPr>
+              <a:lnSpc>
+                <a:spcPct val="100000"/>
+              </a:lnSpc>
+              <a:spcBef>
+                <a:spcPts val="0"/>
+              </a:spcBef>
+            </a:pPr>
+            <a:r>
+              <a:rPr lang="en-US" sz="1600" dirty="0" err="1"/>
+              <a:t>Va</a:t>
+            </a:r>
+            <a:endParaRPr lang="en-US" sz="1600" dirty="0"/>
+          </a:p>
+          <a:p>
+            <a:pPr>
+              <a:lnSpc>
+                <a:spcPct val="100000"/>
+              </a:lnSpc>
+              <a:spcBef>
+                <a:spcPts val="0"/>
+              </a:spcBef>
+            </a:pPr>
+            <a:r>
+              <a:rPr lang="en-US" sz="1600" dirty="0"/>
+              <a:t>Beta</a:t>
+            </a:r>
+          </a:p>
+          <a:p>
+            <a:pPr>
+              <a:lnSpc>
+                <a:spcPct val="100000"/>
+              </a:lnSpc>
+              <a:spcBef>
+                <a:spcPts val="0"/>
+              </a:spcBef>
+            </a:pPr>
+            <a:r>
+              <a:rPr lang="en-US" sz="1600" dirty="0"/>
+              <a:t>El</a:t>
+            </a:r>
+          </a:p>
+          <a:p>
+            <a:pPr>
+              <a:lnSpc>
+                <a:spcPct val="100000"/>
+              </a:lnSpc>
+              <a:spcBef>
+                <a:spcPts val="0"/>
+              </a:spcBef>
+            </a:pPr>
+            <a:r>
+              <a:rPr lang="en-US" sz="1600" dirty="0" err="1"/>
+              <a:t>Ht</a:t>
+            </a:r>
+            <a:endParaRPr lang="en-US" sz="1600" dirty="0"/>
+          </a:p>
+          <a:p>
+            <a:pPr>
+              <a:lnSpc>
+                <a:spcPct val="100000"/>
+              </a:lnSpc>
+              <a:spcBef>
+                <a:spcPts val="0"/>
+              </a:spcBef>
+            </a:pPr>
+            <a:r>
+              <a:rPr lang="en-US" sz="1600" dirty="0"/>
+              <a:t>Alpha</a:t>
+            </a:r>
+          </a:p>
+          <a:p>
+            <a:pPr>
+              <a:lnSpc>
+                <a:spcPct val="100000"/>
+              </a:lnSpc>
+              <a:spcBef>
+                <a:spcPts val="0"/>
+              </a:spcBef>
+            </a:pPr>
+            <a:r>
+              <a:rPr lang="en-US" sz="1600" dirty="0"/>
+              <a:t>Phi</a:t>
+            </a:r>
+          </a:p>
+          <a:p>
+            <a:pPr>
+              <a:lnSpc>
+                <a:spcPct val="100000"/>
+              </a:lnSpc>
+              <a:spcBef>
+                <a:spcPts val="0"/>
+              </a:spcBef>
+            </a:pPr>
+            <a:r>
+              <a:rPr lang="en-US" sz="1600" dirty="0"/>
+              <a:t>Theta</a:t>
+            </a:r>
+          </a:p>
+          <a:p>
+            <a:pPr>
+              <a:lnSpc>
+                <a:spcPct val="100000"/>
+              </a:lnSpc>
+              <a:spcBef>
+                <a:spcPts val="0"/>
+              </a:spcBef>
+            </a:pPr>
+            <a:r>
+              <a:rPr lang="en-US" sz="1600" dirty="0"/>
+              <a:t>Psi</a:t>
+            </a:r>
+          </a:p>
+          <a:p>
+            <a:pPr>
+              <a:lnSpc>
+                <a:spcPct val="100000"/>
+              </a:lnSpc>
+              <a:spcBef>
+                <a:spcPts val="0"/>
+              </a:spcBef>
+            </a:pPr>
+            <a:r>
+              <a:rPr lang="en-US" sz="1600" dirty="0"/>
+              <a:t>P</a:t>
+            </a:r>
+          </a:p>
+          <a:p>
+            <a:pPr>
+              <a:lnSpc>
+                <a:spcPct val="100000"/>
+              </a:lnSpc>
+              <a:spcBef>
+                <a:spcPts val="0"/>
+              </a:spcBef>
+            </a:pPr>
+            <a:r>
+              <a:rPr lang="en-US" sz="1600" dirty="0"/>
+              <a:t>Q</a:t>
+            </a:r>
+          </a:p>
+          <a:p>
+            <a:pPr>
+              <a:lnSpc>
+                <a:spcPct val="100000"/>
+              </a:lnSpc>
+              <a:spcBef>
+                <a:spcPts val="0"/>
+              </a:spcBef>
+            </a:pPr>
+            <a:r>
+              <a:rPr lang="en-US" sz="1600" dirty="0"/>
+              <a:t>R</a:t>
+            </a:r>
+          </a:p>
+          <a:p>
+            <a:pPr>
+              <a:lnSpc>
+                <a:spcPct val="100000"/>
+              </a:lnSpc>
+              <a:spcBef>
+                <a:spcPts val="0"/>
+              </a:spcBef>
+            </a:pPr>
+            <a:r>
+              <a:rPr lang="en-US" sz="1600" dirty="0"/>
+              <a:t>Az</a:t>
+            </a:r>
+            <a:endParaRPr lang="en-US" sz="1800" dirty="0"/>
+          </a:p>
+        </p:txBody>
+      </p:sp>
+      <p:pic>
+        <p:nvPicPr>
+          <p:cNvPr id="9" name="Picture 8">
+            <a:extLst>
+              <a:ext uri="{FF2B5EF4-FFF2-40B4-BE49-F238E27FC236}">
+                <a16:creationId xmlns:a16="http://schemas.microsoft.com/office/drawing/2014/main" id="{6C2B35EE-67AD-C524-B850-8445508DBBD3}"/>
+              </a:ext>
+            </a:extLst>
+          </p:cNvPr>
+          <p:cNvPicPr>
+            <a:picLocks noChangeAspect="1"/>
+          </p:cNvPicPr>
+          <p:nvPr/>
+        </p:nvPicPr>
+        <p:blipFill>
+          <a:blip r:embed="rId2"/>
+          <a:stretch>
+            <a:fillRect/>
+          </a:stretch>
+        </p:blipFill>
+        <p:spPr>
+          <a:xfrm>
+            <a:off x="1645604" y="1825625"/>
+            <a:ext cx="10324794" cy="2470150"/>
+          </a:xfrm>
+          <a:prstGeom prst="rect">
+            <a:avLst/>
+          </a:prstGeom>
+        </p:spPr>
+      </p:pic>
+    </p:spTree>
+    <p:extLst>
+      <p:ext uri="{BB962C8B-B14F-4D97-AF65-F5344CB8AC3E}">
+        <p14:creationId xmlns:p14="http://schemas.microsoft.com/office/powerpoint/2010/main" val="3300786520"/>
+      </p:ext>
+    </p:extLst>
+  </p:cSld>
+  <p:clrMapOvr>
+    <a:masterClrMapping/>
+  </p:clrMapOvr>
+</p:sld>
+</file>
+
 <file path=ppt/slides/slide2.xml><?xml version="1.0" encoding="utf-8"?>
 <p:sld xmlns:a="http://schemas.openxmlformats.org/drawingml/2006/main" xmlns:r="http://schemas.openxmlformats.org/officeDocument/2006/relationships" xmlns:p="http://schemas.openxmlformats.org/presentationml/2006/main">
   <p:cSld>
@@ -3650,8 +4010,8 @@
           </a:p>
         </p:txBody>
       </p:sp>
-      <mc:AlternateContent xmlns:mc="http://schemas.openxmlformats.org/markup-compatibility/2006">
-        <mc:Choice xmlns:a14="http://schemas.microsoft.com/office/drawing/2010/main" Requires="a14">
+      <mc:AlternateContent xmlns:mc="http://schemas.openxmlformats.org/markup-compatibility/2006" xmlns:a14="http://schemas.microsoft.com/office/drawing/2010/main">
+        <mc:Choice Requires="a14">
           <p:sp>
             <p:nvSpPr>
               <p:cNvPr id="3" name="Content Placeholder 2"/>
@@ -4699,7 +5059,7 @@
             </p:txBody>
           </p:sp>
         </mc:Choice>
-        <mc:Fallback>
+        <mc:Fallback xmlns="">
           <p:sp>
             <p:nvSpPr>
               <p:cNvPr id="3" name="Content Placeholder 2"/>
@@ -4785,8 +5145,8 @@
           </a:p>
         </p:txBody>
       </p:sp>
-      <mc:AlternateContent xmlns:mc="http://schemas.openxmlformats.org/markup-compatibility/2006">
-        <mc:Choice xmlns:a14="http://schemas.microsoft.com/office/drawing/2010/main" Requires="a14">
+      <mc:AlternateContent xmlns:mc="http://schemas.openxmlformats.org/markup-compatibility/2006" xmlns:a14="http://schemas.microsoft.com/office/drawing/2010/main">
+        <mc:Choice Requires="a14">
           <p:sp>
             <p:nvSpPr>
               <p:cNvPr id="3" name="Content Placeholder 2"/>
@@ -5801,7 +6161,7 @@
             </p:txBody>
           </p:sp>
         </mc:Choice>
-        <mc:Fallback>
+        <mc:Fallback xmlns="">
           <p:sp>
             <p:nvSpPr>
               <p:cNvPr id="3" name="Content Placeholder 2"/>
@@ -7117,8 +7477,8 @@
           </a:p>
         </p:txBody>
       </p:sp>
-      <mc:AlternateContent xmlns:mc="http://schemas.openxmlformats.org/markup-compatibility/2006">
-        <mc:Choice xmlns:a14="http://schemas.microsoft.com/office/drawing/2010/main" Requires="a14">
+      <mc:AlternateContent xmlns:mc="http://schemas.openxmlformats.org/markup-compatibility/2006" xmlns:a14="http://schemas.microsoft.com/office/drawing/2010/main">
+        <mc:Choice Requires="a14">
           <p:sp>
             <p:nvSpPr>
               <p:cNvPr id="3" name="Content Placeholder 2">
@@ -9882,7 +10242,7 @@
             </p:txBody>
           </p:sp>
         </mc:Choice>
-        <mc:Fallback>
+        <mc:Fallback xmlns="">
           <p:sp>
             <p:nvSpPr>
               <p:cNvPr id="3" name="Content Placeholder 2">
@@ -9926,6 +10286,206 @@
     <p:extLst>
       <p:ext uri="{BB962C8B-B14F-4D97-AF65-F5344CB8AC3E}">
         <p14:creationId xmlns:p14="http://schemas.microsoft.com/office/powerpoint/2010/main" val="736599594"/>
+      </p:ext>
+    </p:extLst>
+  </p:cSld>
+  <p:clrMapOvr>
+    <a:masterClrMapping/>
+  </p:clrMapOvr>
+</p:sld>
+</file>
+
+<file path=ppt/slides/slide9.xml><?xml version="1.0" encoding="utf-8"?>
+<p:sld xmlns:a="http://schemas.openxmlformats.org/drawingml/2006/main" xmlns:r="http://schemas.openxmlformats.org/officeDocument/2006/relationships" xmlns:p="http://schemas.openxmlformats.org/presentationml/2006/main">
+  <p:cSld>
+    <p:spTree>
+      <p:nvGrpSpPr>
+        <p:cNvPr id="1" name=""/>
+        <p:cNvGrpSpPr/>
+        <p:nvPr/>
+      </p:nvGrpSpPr>
+      <p:grpSpPr>
+        <a:xfrm>
+          <a:off x="0" y="0"/>
+          <a:ext cx="0" cy="0"/>
+          <a:chOff x="0" y="0"/>
+          <a:chExt cx="0" cy="0"/>
+        </a:xfrm>
+      </p:grpSpPr>
+      <p:sp>
+        <p:nvSpPr>
+          <p:cNvPr id="2" name="Title 1">
+            <a:extLst>
+              <a:ext uri="{FF2B5EF4-FFF2-40B4-BE49-F238E27FC236}">
+                <a16:creationId xmlns:a16="http://schemas.microsoft.com/office/drawing/2014/main" id="{D4CB53B6-71DA-7A3A-D35F-88D2C0DF793B}"/>
+              </a:ext>
+            </a:extLst>
+          </p:cNvPr>
+          <p:cNvSpPr>
+            <a:spLocks noGrp="1"/>
+          </p:cNvSpPr>
+          <p:nvPr>
+            <p:ph type="title"/>
+          </p:nvPr>
+        </p:nvSpPr>
+        <p:spPr/>
+        <p:txBody>
+          <a:bodyPr/>
+          <a:lstStyle/>
+          <a:p>
+            <a:r>
+              <a:rPr lang="en-US" dirty="0"/>
+              <a:t>State Order</a:t>
+            </a:r>
+          </a:p>
+        </p:txBody>
+      </p:sp>
+      <p:sp>
+        <p:nvSpPr>
+          <p:cNvPr id="7" name="Content Placeholder 6">
+            <a:extLst>
+              <a:ext uri="{FF2B5EF4-FFF2-40B4-BE49-F238E27FC236}">
+                <a16:creationId xmlns:a16="http://schemas.microsoft.com/office/drawing/2014/main" id="{06B982F2-F8CD-0C63-AA81-B37F348AB9FB}"/>
+              </a:ext>
+            </a:extLst>
+          </p:cNvPr>
+          <p:cNvSpPr>
+            <a:spLocks noGrp="1"/>
+          </p:cNvSpPr>
+          <p:nvPr>
+            <p:ph idx="1"/>
+          </p:nvPr>
+        </p:nvSpPr>
+        <p:spPr>
+          <a:xfrm>
+            <a:off x="838200" y="1825625"/>
+            <a:ext cx="2667000" cy="4351338"/>
+          </a:xfrm>
+        </p:spPr>
+        <p:txBody>
+          <a:bodyPr>
+            <a:normAutofit fontScale="85000" lnSpcReduction="20000"/>
+          </a:bodyPr>
+          <a:lstStyle/>
+          <a:p>
+            <a:r>
+              <a:rPr lang="en-US" sz="2300" dirty="0" err="1"/>
+              <a:t>Va</a:t>
+            </a:r>
+            <a:r>
+              <a:rPr lang="en-US" sz="2300" dirty="0"/>
+              <a:t>=integrator</a:t>
+            </a:r>
+          </a:p>
+          <a:p>
+            <a:r>
+              <a:rPr lang="en-US" sz="2300" dirty="0"/>
+              <a:t>Beta=integrator2</a:t>
+            </a:r>
+          </a:p>
+          <a:p>
+            <a:r>
+              <a:rPr lang="en-US" sz="2300" dirty="0"/>
+              <a:t>El=integrator10</a:t>
+            </a:r>
+          </a:p>
+          <a:p>
+            <a:r>
+              <a:rPr lang="en-US" sz="2300" dirty="0" err="1"/>
+              <a:t>Ht</a:t>
+            </a:r>
+            <a:r>
+              <a:rPr lang="en-US" sz="2300" dirty="0"/>
+              <a:t>=integrator11</a:t>
+            </a:r>
+          </a:p>
+          <a:p>
+            <a:r>
+              <a:rPr lang="en-US" sz="2300" dirty="0"/>
+              <a:t>Alpha=integrator1</a:t>
+            </a:r>
+          </a:p>
+          <a:p>
+            <a:r>
+              <a:rPr lang="en-US" sz="2300" dirty="0"/>
+              <a:t>Phi=integrator3</a:t>
+            </a:r>
+          </a:p>
+          <a:p>
+            <a:r>
+              <a:rPr lang="en-US" sz="2300" dirty="0"/>
+              <a:t>Theta=integrator4</a:t>
+            </a:r>
+          </a:p>
+          <a:p>
+            <a:r>
+              <a:rPr lang="en-US" sz="2300" dirty="0"/>
+              <a:t>Psi=integrator5</a:t>
+            </a:r>
+          </a:p>
+          <a:p>
+            <a:r>
+              <a:rPr lang="en-US" sz="2300" dirty="0"/>
+              <a:t>P=intrgrator6</a:t>
+            </a:r>
+          </a:p>
+          <a:p>
+            <a:r>
+              <a:rPr lang="en-US" sz="2300" dirty="0"/>
+              <a:t>Q=integrator7</a:t>
+            </a:r>
+          </a:p>
+          <a:p>
+            <a:r>
+              <a:rPr lang="en-US" sz="2300" dirty="0"/>
+              <a:t>R=integrator8</a:t>
+            </a:r>
+          </a:p>
+          <a:p>
+            <a:r>
+              <a:rPr lang="en-US" sz="2300" dirty="0"/>
+              <a:t>Az=integrator9</a:t>
+            </a:r>
+          </a:p>
+          <a:p>
+            <a:endParaRPr lang="en-US" dirty="0"/>
+          </a:p>
+        </p:txBody>
+      </p:sp>
+      <p:pic>
+        <p:nvPicPr>
+          <p:cNvPr id="9" name="Picture 8">
+            <a:extLst>
+              <a:ext uri="{FF2B5EF4-FFF2-40B4-BE49-F238E27FC236}">
+                <a16:creationId xmlns:a16="http://schemas.microsoft.com/office/drawing/2014/main" id="{6C2B35EE-67AD-C524-B850-8445508DBBD3}"/>
+              </a:ext>
+            </a:extLst>
+          </p:cNvPr>
+          <p:cNvPicPr>
+            <a:picLocks noChangeAspect="1"/>
+          </p:cNvPicPr>
+          <p:nvPr/>
+        </p:nvPicPr>
+        <p:blipFill>
+          <a:blip r:embed="rId2"/>
+          <a:stretch>
+            <a:fillRect/>
+          </a:stretch>
+        </p:blipFill>
+        <p:spPr>
+          <a:xfrm>
+            <a:off x="3817304" y="3175000"/>
+            <a:ext cx="7993058" cy="1912295"/>
+          </a:xfrm>
+          <a:prstGeom prst="rect">
+            <a:avLst/>
+          </a:prstGeom>
+        </p:spPr>
+      </p:pic>
+    </p:spTree>
+    <p:extLst>
+      <p:ext uri="{BB962C8B-B14F-4D97-AF65-F5344CB8AC3E}">
+        <p14:creationId xmlns:p14="http://schemas.microsoft.com/office/powerpoint/2010/main" val="4080094793"/>
       </p:ext>
     </p:extLst>
   </p:cSld>

</xml_diff>